<commit_message>
updates to presentations. Commenting out quotations styling (WIP)
</commit_message>
<xml_diff>
--- a/presentations/prod_support.pptx
+++ b/presentations/prod_support.pptx
@@ -6402,7 +6402,7 @@
           <a:p>
             <a:fld id="{FA6AF098-6159-9746-9D8A-604C3B2DE162}" type="datetimeFigureOut">
               <a:rPr lang="en-US" smtClean="0"/>
-              <a:t>11/12/20</a:t>
+              <a:t>11/23/20</a:t>
             </a:fld>
             <a:endParaRPr lang="en-US"/>
           </a:p>
@@ -8298,7 +8298,7 @@
           <a:p>
             <a:fld id="{99599B4E-256E-AD40-A7B8-8F0574836C36}" type="datetimeFigureOut">
               <a:rPr lang="en-US" smtClean="0"/>
-              <a:t>11/12/20</a:t>
+              <a:t>11/23/20</a:t>
             </a:fld>
             <a:endParaRPr lang="en-US"/>
           </a:p>
@@ -8498,7 +8498,7 @@
           <a:p>
             <a:fld id="{99599B4E-256E-AD40-A7B8-8F0574836C36}" type="datetimeFigureOut">
               <a:rPr lang="en-US" smtClean="0"/>
-              <a:t>11/12/20</a:t>
+              <a:t>11/23/20</a:t>
             </a:fld>
             <a:endParaRPr lang="en-US"/>
           </a:p>
@@ -8708,7 +8708,7 @@
           <a:p>
             <a:fld id="{99599B4E-256E-AD40-A7B8-8F0574836C36}" type="datetimeFigureOut">
               <a:rPr lang="en-US" smtClean="0"/>
-              <a:t>11/12/20</a:t>
+              <a:t>11/23/20</a:t>
             </a:fld>
             <a:endParaRPr lang="en-US"/>
           </a:p>
@@ -8908,7 +8908,7 @@
           <a:p>
             <a:fld id="{99599B4E-256E-AD40-A7B8-8F0574836C36}" type="datetimeFigureOut">
               <a:rPr lang="en-US" smtClean="0"/>
-              <a:t>11/12/20</a:t>
+              <a:t>11/23/20</a:t>
             </a:fld>
             <a:endParaRPr lang="en-US"/>
           </a:p>
@@ -9184,7 +9184,7 @@
           <a:p>
             <a:fld id="{99599B4E-256E-AD40-A7B8-8F0574836C36}" type="datetimeFigureOut">
               <a:rPr lang="en-US" smtClean="0"/>
-              <a:t>11/12/20</a:t>
+              <a:t>11/23/20</a:t>
             </a:fld>
             <a:endParaRPr lang="en-US"/>
           </a:p>
@@ -9452,7 +9452,7 @@
           <a:p>
             <a:fld id="{99599B4E-256E-AD40-A7B8-8F0574836C36}" type="datetimeFigureOut">
               <a:rPr lang="en-US" smtClean="0"/>
-              <a:t>11/12/20</a:t>
+              <a:t>11/23/20</a:t>
             </a:fld>
             <a:endParaRPr lang="en-US"/>
           </a:p>
@@ -9867,7 +9867,7 @@
           <a:p>
             <a:fld id="{99599B4E-256E-AD40-A7B8-8F0574836C36}" type="datetimeFigureOut">
               <a:rPr lang="en-US" smtClean="0"/>
-              <a:t>11/12/20</a:t>
+              <a:t>11/23/20</a:t>
             </a:fld>
             <a:endParaRPr lang="en-US"/>
           </a:p>
@@ -10009,7 +10009,7 @@
           <a:p>
             <a:fld id="{99599B4E-256E-AD40-A7B8-8F0574836C36}" type="datetimeFigureOut">
               <a:rPr lang="en-US" smtClean="0"/>
-              <a:t>11/12/20</a:t>
+              <a:t>11/23/20</a:t>
             </a:fld>
             <a:endParaRPr lang="en-US"/>
           </a:p>
@@ -10122,7 +10122,7 @@
           <a:p>
             <a:fld id="{99599B4E-256E-AD40-A7B8-8F0574836C36}" type="datetimeFigureOut">
               <a:rPr lang="en-US" smtClean="0"/>
-              <a:t>11/12/20</a:t>
+              <a:t>11/23/20</a:t>
             </a:fld>
             <a:endParaRPr lang="en-US"/>
           </a:p>
@@ -10435,7 +10435,7 @@
           <a:p>
             <a:fld id="{99599B4E-256E-AD40-A7B8-8F0574836C36}" type="datetimeFigureOut">
               <a:rPr lang="en-US" smtClean="0"/>
-              <a:t>11/12/20</a:t>
+              <a:t>11/23/20</a:t>
             </a:fld>
             <a:endParaRPr lang="en-US"/>
           </a:p>
@@ -10724,7 +10724,7 @@
           <a:p>
             <a:fld id="{99599B4E-256E-AD40-A7B8-8F0574836C36}" type="datetimeFigureOut">
               <a:rPr lang="en-US" smtClean="0"/>
-              <a:t>11/12/20</a:t>
+              <a:t>11/23/20</a:t>
             </a:fld>
             <a:endParaRPr lang="en-US"/>
           </a:p>
@@ -10967,7 +10967,7 @@
           <a:p>
             <a:fld id="{99599B4E-256E-AD40-A7B8-8F0574836C36}" type="datetimeFigureOut">
               <a:rPr lang="en-US" smtClean="0"/>
-              <a:t>11/12/20</a:t>
+              <a:t>11/23/20</a:t>
             </a:fld>
             <a:endParaRPr lang="en-US"/>
           </a:p>
@@ -11482,7 +11482,7 @@
           <a:p>
             <a:pPr algn="l"/>
             <a:r>
-              <a:rPr lang="en-US" sz="8100"/>
+              <a:rPr lang="en-US" sz="8100" dirty="0"/>
               <a:t>Sleeping with one eye open: Experiences in production support</a:t>
             </a:r>
           </a:p>
@@ -11685,6 +11685,36 @@
           </a:p>
         </p:txBody>
       </p:sp>
+      <p:pic>
+        <p:nvPicPr>
+          <p:cNvPr id="5" name="Picture 4" descr="A person smiling for the camera&#10;&#10;Description automatically generated">
+            <a:extLst>
+              <a:ext uri="{FF2B5EF4-FFF2-40B4-BE49-F238E27FC236}">
+                <a16:creationId xmlns:a16="http://schemas.microsoft.com/office/drawing/2014/main" id="{3BF2CA20-E13A-0740-AA0D-29AA133BC07F}"/>
+              </a:ext>
+            </a:extLst>
+          </p:cNvPr>
+          <p:cNvPicPr>
+            <a:picLocks noChangeAspect="1"/>
+          </p:cNvPicPr>
+          <p:nvPr/>
+        </p:nvPicPr>
+        <p:blipFill>
+          <a:blip r:embed="rId3"/>
+          <a:stretch>
+            <a:fillRect/>
+          </a:stretch>
+        </p:blipFill>
+        <p:spPr>
+          <a:xfrm>
+            <a:off x="9858375" y="4123439"/>
+            <a:ext cx="1551286" cy="1613337"/>
+          </a:xfrm>
+          <a:prstGeom prst="rect">
+            <a:avLst/>
+          </a:prstGeom>
+        </p:spPr>
+      </p:pic>
     </p:spTree>
     <p:extLst>
       <p:ext uri="{BB962C8B-B14F-4D97-AF65-F5344CB8AC3E}">
@@ -13717,10 +13747,10 @@
       </p:grpSpPr>
       <p:sp useBgFill="1">
         <p:nvSpPr>
-          <p:cNvPr id="54" name="Rectangle 53">
+          <p:cNvPr id="71" name="Rectangle 70">
             <a:extLst>
               <a:ext uri="{FF2B5EF4-FFF2-40B4-BE49-F238E27FC236}">
-                <a16:creationId xmlns:a16="http://schemas.microsoft.com/office/drawing/2014/main" id="{5074B721-7A55-47E5-B117-F7DAD67E867E}"/>
+                <a16:creationId xmlns:a16="http://schemas.microsoft.com/office/drawing/2014/main" id="{201CC55D-ED54-4C5C-95E6-10947BD1103B}"/>
               </a:ext>
               <a:ext uri="{C183D7F6-B498-43B3-948B-1728B52AA6E4}">
                 <adec:decorative xmlns:adec="http://schemas.microsoft.com/office/drawing/2017/decorative" val="1"/>
@@ -13741,7 +13771,7 @@
         <p:spPr>
           <a:xfrm>
             <a:off x="0" y="0"/>
-            <a:ext cx="12188952" cy="6858000"/>
+            <a:ext cx="12191999" cy="6857365"/>
           </a:xfrm>
           <a:prstGeom prst="rect">
             <a:avLst/>
@@ -13793,29 +13823,183 @@
         </p:nvSpPr>
         <p:spPr>
           <a:xfrm>
-            <a:off x="6353120" y="365125"/>
-            <a:ext cx="5393360" cy="1325563"/>
+            <a:off x="589560" y="856180"/>
+            <a:ext cx="4560584" cy="1128068"/>
           </a:xfrm>
         </p:spPr>
         <p:txBody>
-          <a:bodyPr>
+          <a:bodyPr anchor="ctr">
             <a:normAutofit/>
           </a:bodyPr>
           <a:lstStyle/>
           <a:p>
             <a:r>
-              <a:rPr lang="en-US"/>
+              <a:rPr lang="en-US" sz="3700"/>
               <a:t>Have your tools ready</a:t>
             </a:r>
           </a:p>
         </p:txBody>
       </p:sp>
+      <p:grpSp>
+        <p:nvGrpSpPr>
+          <p:cNvPr id="73" name="Group 72">
+            <a:extLst>
+              <a:ext uri="{FF2B5EF4-FFF2-40B4-BE49-F238E27FC236}">
+                <a16:creationId xmlns:a16="http://schemas.microsoft.com/office/drawing/2014/main" id="{1DE889C7-FAD6-4397-98E2-05D503484459}"/>
+              </a:ext>
+              <a:ext uri="{C183D7F6-B498-43B3-948B-1728B52AA6E4}">
+                <adec:decorative xmlns:adec="http://schemas.microsoft.com/office/drawing/2017/decorative" val="1"/>
+              </a:ext>
+            </a:extLst>
+          </p:cNvPr>
+          <p:cNvGrpSpPr>
+            <a:grpSpLocks noGrp="1" noUngrp="1" noRot="1" noChangeAspect="1" noMove="1" noResize="1"/>
+          </p:cNvGrpSpPr>
+          <p:nvPr>
+            <p:extLst>
+              <p:ext uri="{386F3935-93C4-4BCD-93E2-E3B085C9AB24}">
+                <p16:designElem xmlns:p16="http://schemas.microsoft.com/office/powerpoint/2015/main" val="1"/>
+              </p:ext>
+            </p:extLst>
+          </p:nvPr>
+        </p:nvGrpSpPr>
+        <p:grpSpPr>
+          <a:xfrm>
+            <a:off x="0" y="1083484"/>
+            <a:ext cx="355196" cy="673460"/>
+            <a:chOff x="0" y="823811"/>
+            <a:chExt cx="355196" cy="673460"/>
+          </a:xfrm>
+        </p:grpSpPr>
+        <p:sp>
+          <p:nvSpPr>
+            <p:cNvPr id="74" name="Rectangle 73">
+              <a:extLst>
+                <a:ext uri="{FF2B5EF4-FFF2-40B4-BE49-F238E27FC236}">
+                  <a16:creationId xmlns:a16="http://schemas.microsoft.com/office/drawing/2014/main" id="{F399A70F-F8CD-4992-9EF5-6CF15472E73F}"/>
+                </a:ext>
+                <a:ext uri="{C183D7F6-B498-43B3-948B-1728B52AA6E4}">
+                  <adec:decorative xmlns:adec="http://schemas.microsoft.com/office/drawing/2017/decorative" val="1"/>
+                </a:ext>
+              </a:extLst>
+            </p:cNvPr>
+            <p:cNvSpPr/>
+            <p:nvPr>
+              <p:extLst>
+                <p:ext uri="{386F3935-93C4-4BCD-93E2-E3B085C9AB24}">
+                  <p16:designElem xmlns:p16="http://schemas.microsoft.com/office/powerpoint/2015/main" val="1"/>
+                </p:ext>
+              </p:extLst>
+            </p:nvPr>
+          </p:nvSpPr>
+          <p:spPr>
+            <a:xfrm>
+              <a:off x="0" y="823811"/>
+              <a:ext cx="87363" cy="673460"/>
+            </a:xfrm>
+            <a:prstGeom prst="rect">
+              <a:avLst/>
+            </a:prstGeom>
+            <a:solidFill>
+              <a:schemeClr val="accent4"/>
+            </a:solidFill>
+            <a:ln>
+              <a:noFill/>
+            </a:ln>
+          </p:spPr>
+          <p:style>
+            <a:lnRef idx="2">
+              <a:schemeClr val="accent1">
+                <a:shade val="50000"/>
+              </a:schemeClr>
+            </a:lnRef>
+            <a:fillRef idx="1">
+              <a:schemeClr val="accent1"/>
+            </a:fillRef>
+            <a:effectRef idx="0">
+              <a:schemeClr val="accent1"/>
+            </a:effectRef>
+            <a:fontRef idx="minor">
+              <a:schemeClr val="lt1"/>
+            </a:fontRef>
+          </p:style>
+          <p:txBody>
+            <a:bodyPr rtlCol="0" anchor="ctr"/>
+            <a:lstStyle/>
+            <a:p>
+              <a:pPr algn="ctr"/>
+              <a:endParaRPr lang="en-US"/>
+            </a:p>
+          </p:txBody>
+        </p:sp>
+        <p:sp>
+          <p:nvSpPr>
+            <p:cNvPr id="75" name="Rectangle 74">
+              <a:extLst>
+                <a:ext uri="{FF2B5EF4-FFF2-40B4-BE49-F238E27FC236}">
+                  <a16:creationId xmlns:a16="http://schemas.microsoft.com/office/drawing/2014/main" id="{48F4FEDC-6D80-458C-A665-075D9B9500FD}"/>
+                </a:ext>
+                <a:ext uri="{C183D7F6-B498-43B3-948B-1728B52AA6E4}">
+                  <adec:decorative xmlns:adec="http://schemas.microsoft.com/office/drawing/2017/decorative" val="1"/>
+                </a:ext>
+              </a:extLst>
+            </p:cNvPr>
+            <p:cNvSpPr/>
+            <p:nvPr>
+              <p:extLst>
+                <p:ext uri="{386F3935-93C4-4BCD-93E2-E3B085C9AB24}">
+                  <p16:designElem xmlns:p16="http://schemas.microsoft.com/office/powerpoint/2015/main" val="1"/>
+                </p:ext>
+              </p:extLst>
+            </p:nvPr>
+          </p:nvSpPr>
+          <p:spPr>
+            <a:xfrm>
+              <a:off x="159341" y="823811"/>
+              <a:ext cx="195855" cy="673460"/>
+            </a:xfrm>
+            <a:prstGeom prst="rect">
+              <a:avLst/>
+            </a:prstGeom>
+            <a:solidFill>
+              <a:schemeClr val="accent4"/>
+            </a:solidFill>
+            <a:ln>
+              <a:noFill/>
+            </a:ln>
+          </p:spPr>
+          <p:style>
+            <a:lnRef idx="2">
+              <a:schemeClr val="accent1">
+                <a:shade val="50000"/>
+              </a:schemeClr>
+            </a:lnRef>
+            <a:fillRef idx="1">
+              <a:schemeClr val="accent1"/>
+            </a:fillRef>
+            <a:effectRef idx="0">
+              <a:schemeClr val="accent1"/>
+            </a:effectRef>
+            <a:fontRef idx="minor">
+              <a:schemeClr val="lt1"/>
+            </a:fontRef>
+          </p:style>
+          <p:txBody>
+            <a:bodyPr rtlCol="0" anchor="ctr"/>
+            <a:lstStyle/>
+            <a:p>
+              <a:pPr algn="ctr"/>
+              <a:endParaRPr lang="en-US"/>
+            </a:p>
+          </p:txBody>
+        </p:sp>
+      </p:grpSp>
       <p:sp>
         <p:nvSpPr>
-          <p:cNvPr id="56" name="Freeform: Shape 55">
+          <p:cNvPr id="77" name="Rectangle 76">
             <a:extLst>
               <a:ext uri="{FF2B5EF4-FFF2-40B4-BE49-F238E27FC236}">
-                <a16:creationId xmlns:a16="http://schemas.microsoft.com/office/drawing/2014/main" id="{5A3987B4-5CBA-4CB7-862B-56A9917A2D35}"/>
+                <a16:creationId xmlns:a16="http://schemas.microsoft.com/office/drawing/2014/main" id="{3873B707-463F-40B0-8227-E8CC6C67EB25}"/>
               </a:ext>
               <a:ext uri="{C183D7F6-B498-43B3-948B-1728B52AA6E4}">
                 <adec:decorative xmlns:adec="http://schemas.microsoft.com/office/drawing/2017/decorative" val="1"/>
@@ -13834,199 +14018,15 @@
           </p:nvPr>
         </p:nvSpPr>
         <p:spPr>
-          <a:xfrm>
-            <a:off x="582435" y="0"/>
-            <a:ext cx="1290924" cy="700685"/>
+          <a:xfrm flipH="1">
+            <a:off x="665085" y="2090569"/>
+            <a:ext cx="4297680" cy="27432"/>
           </a:xfrm>
-          <a:custGeom>
+          <a:prstGeom prst="rect">
             <a:avLst/>
-            <a:gdLst>
-              <a:gd name="connsiteX0" fmla="*/ 0 w 1290924"/>
-              <a:gd name="connsiteY0" fmla="*/ 0 h 700685"/>
-              <a:gd name="connsiteX1" fmla="*/ 125445 w 1290924"/>
-              <a:gd name="connsiteY1" fmla="*/ 0 h 700685"/>
-              <a:gd name="connsiteX2" fmla="*/ 125445 w 1290924"/>
-              <a:gd name="connsiteY2" fmla="*/ 529211 h 700685"/>
-              <a:gd name="connsiteX3" fmla="*/ 1040371 w 1290924"/>
-              <a:gd name="connsiteY3" fmla="*/ 0 h 700685"/>
-              <a:gd name="connsiteX4" fmla="*/ 1290924 w 1290924"/>
-              <a:gd name="connsiteY4" fmla="*/ 0 h 700685"/>
-              <a:gd name="connsiteX5" fmla="*/ 94085 w 1290924"/>
-              <a:gd name="connsiteY5" fmla="*/ 692290 h 700685"/>
-              <a:gd name="connsiteX6" fmla="*/ 62724 w 1290924"/>
-              <a:gd name="connsiteY6" fmla="*/ 700685 h 700685"/>
-              <a:gd name="connsiteX7" fmla="*/ 0 w 1290924"/>
-              <a:gd name="connsiteY7" fmla="*/ 637963 h 700685"/>
-            </a:gdLst>
-            <a:ahLst/>
-            <a:cxnLst>
-              <a:cxn ang="0">
-                <a:pos x="connsiteX0" y="connsiteY0"/>
-              </a:cxn>
-              <a:cxn ang="0">
-                <a:pos x="connsiteX1" y="connsiteY1"/>
-              </a:cxn>
-              <a:cxn ang="0">
-                <a:pos x="connsiteX2" y="connsiteY2"/>
-              </a:cxn>
-              <a:cxn ang="0">
-                <a:pos x="connsiteX3" y="connsiteY3"/>
-              </a:cxn>
-              <a:cxn ang="0">
-                <a:pos x="connsiteX4" y="connsiteY4"/>
-              </a:cxn>
-              <a:cxn ang="0">
-                <a:pos x="connsiteX5" y="connsiteY5"/>
-              </a:cxn>
-              <a:cxn ang="0">
-                <a:pos x="connsiteX6" y="connsiteY6"/>
-              </a:cxn>
-              <a:cxn ang="0">
-                <a:pos x="connsiteX7" y="connsiteY7"/>
-              </a:cxn>
-            </a:cxnLst>
-            <a:rect l="l" t="t" r="r" b="b"/>
-            <a:pathLst>
-              <a:path w="1290924" h="700685">
-                <a:moveTo>
-                  <a:pt x="0" y="0"/>
-                </a:moveTo>
-                <a:lnTo>
-                  <a:pt x="125445" y="0"/>
-                </a:lnTo>
-                <a:lnTo>
-                  <a:pt x="125445" y="529211"/>
-                </a:lnTo>
-                <a:lnTo>
-                  <a:pt x="1040371" y="0"/>
-                </a:lnTo>
-                <a:lnTo>
-                  <a:pt x="1290924" y="0"/>
-                </a:lnTo>
-                <a:lnTo>
-                  <a:pt x="94085" y="692290"/>
-                </a:lnTo>
-                <a:cubicBezTo>
-                  <a:pt x="84551" y="697800"/>
-                  <a:pt x="73733" y="700695"/>
-                  <a:pt x="62724" y="700685"/>
-                </a:cubicBezTo>
-                <a:cubicBezTo>
-                  <a:pt x="28082" y="700685"/>
-                  <a:pt x="0" y="672604"/>
-                  <a:pt x="0" y="637963"/>
-                </a:cubicBezTo>
-                <a:close/>
-              </a:path>
-            </a:pathLst>
-          </a:custGeom>
+          </a:prstGeom>
           <a:solidFill>
-            <a:schemeClr val="accent6"/>
-          </a:solidFill>
-          <a:ln w="9525" cap="flat">
-            <a:noFill/>
-            <a:prstDash val="solid"/>
-            <a:miter/>
-          </a:ln>
-        </p:spPr>
-        <p:txBody>
-          <a:bodyPr wrap="square" rtlCol="0" anchor="ctr">
-            <a:noAutofit/>
-          </a:bodyPr>
-          <a:lstStyle/>
-          <a:p>
-            <a:endParaRPr lang="en-US" dirty="0"/>
-          </a:p>
-        </p:txBody>
-      </p:sp>
-      <p:sp>
-        <p:nvSpPr>
-          <p:cNvPr id="58" name="Freeform: Shape 57">
-            <a:extLst>
-              <a:ext uri="{FF2B5EF4-FFF2-40B4-BE49-F238E27FC236}">
-                <a16:creationId xmlns:a16="http://schemas.microsoft.com/office/drawing/2014/main" id="{CB147A70-DC29-4DDF-A34C-2B82C6E2295E}"/>
-              </a:ext>
-              <a:ext uri="{C183D7F6-B498-43B3-948B-1728B52AA6E4}">
-                <adec:decorative xmlns:adec="http://schemas.microsoft.com/office/drawing/2017/decorative" val="1"/>
-              </a:ext>
-            </a:extLst>
-          </p:cNvPr>
-          <p:cNvSpPr>
-            <a:spLocks noGrp="1" noRot="1" noChangeAspect="1" noMove="1" noResize="1" noEditPoints="1" noAdjustHandles="1" noChangeArrowheads="1" noChangeShapeType="1" noTextEdit="1"/>
-          </p:cNvSpPr>
-          <p:nvPr>
-            <p:extLst>
-              <p:ext uri="{386F3935-93C4-4BCD-93E2-E3B085C9AB24}">
-                <p16:designElem xmlns:p16="http://schemas.microsoft.com/office/powerpoint/2015/main" val="1"/>
-              </p:ext>
-            </p:extLst>
-          </p:nvPr>
-        </p:nvSpPr>
-        <p:spPr>
-          <a:xfrm>
-            <a:off x="2844800" y="-701"/>
-            <a:ext cx="842502" cy="329392"/>
-          </a:xfrm>
-          <a:custGeom>
-            <a:avLst/>
-            <a:gdLst>
-              <a:gd name="connsiteX0" fmla="*/ 0 w 1135066"/>
-              <a:gd name="connsiteY0" fmla="*/ 0 h 477997"/>
-              <a:gd name="connsiteX1" fmla="*/ 1135066 w 1135066"/>
-              <a:gd name="connsiteY1" fmla="*/ 0 h 477997"/>
-              <a:gd name="connsiteX2" fmla="*/ 1133370 w 1135066"/>
-              <a:gd name="connsiteY2" fmla="*/ 16827 h 477997"/>
-              <a:gd name="connsiteX3" fmla="*/ 567533 w 1135066"/>
-              <a:gd name="connsiteY3" fmla="*/ 477997 h 477997"/>
-              <a:gd name="connsiteX4" fmla="*/ 1696 w 1135066"/>
-              <a:gd name="connsiteY4" fmla="*/ 16827 h 477997"/>
-            </a:gdLst>
-            <a:ahLst/>
-            <a:cxnLst>
-              <a:cxn ang="0">
-                <a:pos x="connsiteX0" y="connsiteY0"/>
-              </a:cxn>
-              <a:cxn ang="0">
-                <a:pos x="connsiteX1" y="connsiteY1"/>
-              </a:cxn>
-              <a:cxn ang="0">
-                <a:pos x="connsiteX2" y="connsiteY2"/>
-              </a:cxn>
-              <a:cxn ang="0">
-                <a:pos x="connsiteX3" y="connsiteY3"/>
-              </a:cxn>
-              <a:cxn ang="0">
-                <a:pos x="connsiteX4" y="connsiteY4"/>
-              </a:cxn>
-            </a:cxnLst>
-            <a:rect l="l" t="t" r="r" b="b"/>
-            <a:pathLst>
-              <a:path w="1135066" h="477997">
-                <a:moveTo>
-                  <a:pt x="0" y="0"/>
-                </a:moveTo>
-                <a:lnTo>
-                  <a:pt x="1135066" y="0"/>
-                </a:lnTo>
-                <a:lnTo>
-                  <a:pt x="1133370" y="16827"/>
-                </a:lnTo>
-                <a:cubicBezTo>
-                  <a:pt x="1079514" y="280016"/>
-                  <a:pt x="846644" y="477997"/>
-                  <a:pt x="567533" y="477997"/>
-                </a:cubicBezTo>
-                <a:cubicBezTo>
-                  <a:pt x="288422" y="477997"/>
-                  <a:pt x="55552" y="280016"/>
-                  <a:pt x="1696" y="16827"/>
-                </a:cubicBezTo>
-                <a:close/>
-              </a:path>
-            </a:pathLst>
-          </a:custGeom>
-          <a:solidFill>
-            <a:schemeClr val="accent5"/>
+            <a:schemeClr val="accent4"/>
           </a:solidFill>
           <a:ln>
             <a:noFill/>
@@ -14049,9 +14049,7 @@
           </a:fontRef>
         </p:style>
         <p:txBody>
-          <a:bodyPr wrap="square" rtlCol="0" anchor="ctr">
-            <a:noAutofit/>
-          </a:bodyPr>
+          <a:bodyPr rtlCol="0" anchor="ctr"/>
           <a:lstStyle/>
           <a:p>
             <a:pPr algn="ctr"/>
@@ -14059,300 +14057,6 @@
           </a:p>
         </p:txBody>
       </p:sp>
-      <p:pic>
-        <p:nvPicPr>
-          <p:cNvPr id="11" name="Picture 10" descr="Icon&#10;&#10;Description automatically generated">
-            <a:extLst>
-              <a:ext uri="{FF2B5EF4-FFF2-40B4-BE49-F238E27FC236}">
-                <a16:creationId xmlns:a16="http://schemas.microsoft.com/office/drawing/2014/main" id="{4A87817B-5F1F-6540-B4CA-8CD67E290E64}"/>
-              </a:ext>
-            </a:extLst>
-          </p:cNvPr>
-          <p:cNvPicPr>
-            <a:picLocks noChangeAspect="1"/>
-          </p:cNvPicPr>
-          <p:nvPr/>
-        </p:nvPicPr>
-        <p:blipFill>
-          <a:blip r:embed="rId3"/>
-          <a:stretch>
-            <a:fillRect/>
-          </a:stretch>
-        </p:blipFill>
-        <p:spPr>
-          <a:xfrm>
-            <a:off x="582435" y="880072"/>
-            <a:ext cx="2533422" cy="2533422"/>
-          </a:xfrm>
-          <a:custGeom>
-            <a:avLst/>
-            <a:gdLst/>
-            <a:ahLst/>
-            <a:cxnLst/>
-            <a:rect l="l" t="t" r="r" b="b"/>
-            <a:pathLst>
-              <a:path w="3064284" h="3064284">
-                <a:moveTo>
-                  <a:pt x="166483" y="0"/>
-                </a:moveTo>
-                <a:lnTo>
-                  <a:pt x="2897801" y="0"/>
-                </a:lnTo>
-                <a:cubicBezTo>
-                  <a:pt x="2989747" y="0"/>
-                  <a:pt x="3064284" y="74537"/>
-                  <a:pt x="3064284" y="166483"/>
-                </a:cubicBezTo>
-                <a:lnTo>
-                  <a:pt x="3064284" y="2897801"/>
-                </a:lnTo>
-                <a:cubicBezTo>
-                  <a:pt x="3064284" y="2989747"/>
-                  <a:pt x="2989747" y="3064284"/>
-                  <a:pt x="2897801" y="3064284"/>
-                </a:cubicBezTo>
-                <a:lnTo>
-                  <a:pt x="166483" y="3064284"/>
-                </a:lnTo>
-                <a:cubicBezTo>
-                  <a:pt x="74537" y="3064284"/>
-                  <a:pt x="0" y="2989747"/>
-                  <a:pt x="0" y="2897801"/>
-                </a:cubicBezTo>
-                <a:lnTo>
-                  <a:pt x="0" y="166483"/>
-                </a:lnTo>
-                <a:cubicBezTo>
-                  <a:pt x="0" y="74537"/>
-                  <a:pt x="74537" y="0"/>
-                  <a:pt x="166483" y="0"/>
-                </a:cubicBezTo>
-                <a:close/>
-              </a:path>
-            </a:pathLst>
-          </a:custGeom>
-        </p:spPr>
-      </p:pic>
-      <p:pic>
-        <p:nvPicPr>
-          <p:cNvPr id="7" name="Picture 6">
-            <a:extLst>
-              <a:ext uri="{FF2B5EF4-FFF2-40B4-BE49-F238E27FC236}">
-                <a16:creationId xmlns:a16="http://schemas.microsoft.com/office/drawing/2014/main" id="{66ECD53A-A161-5844-89A2-A1A6B8F64998}"/>
-              </a:ext>
-            </a:extLst>
-          </p:cNvPr>
-          <p:cNvPicPr>
-            <a:picLocks noChangeAspect="1"/>
-          </p:cNvPicPr>
-          <p:nvPr/>
-        </p:nvPicPr>
-        <p:blipFill>
-          <a:blip r:embed="rId4"/>
-          <a:srcRect t="6615" b="6615"/>
-          <a:stretch/>
-        </p:blipFill>
-        <p:spPr>
-          <a:xfrm>
-            <a:off x="3354974" y="664923"/>
-            <a:ext cx="2548728" cy="2211531"/>
-          </a:xfrm>
-          <a:custGeom>
-            <a:avLst/>
-            <a:gdLst/>
-            <a:ahLst/>
-            <a:cxnLst/>
-            <a:rect l="l" t="t" r="r" b="b"/>
-            <a:pathLst>
-              <a:path w="2548728" h="2548728">
-                <a:moveTo>
-                  <a:pt x="107301" y="0"/>
-                </a:moveTo>
-                <a:lnTo>
-                  <a:pt x="2441427" y="0"/>
-                </a:lnTo>
-                <a:cubicBezTo>
-                  <a:pt x="2500688" y="0"/>
-                  <a:pt x="2548728" y="48040"/>
-                  <a:pt x="2548728" y="107301"/>
-                </a:cubicBezTo>
-                <a:lnTo>
-                  <a:pt x="2548728" y="2441427"/>
-                </a:lnTo>
-                <a:cubicBezTo>
-                  <a:pt x="2548728" y="2500688"/>
-                  <a:pt x="2500688" y="2548728"/>
-                  <a:pt x="2441427" y="2548728"/>
-                </a:cubicBezTo>
-                <a:lnTo>
-                  <a:pt x="107301" y="2548728"/>
-                </a:lnTo>
-                <a:cubicBezTo>
-                  <a:pt x="48040" y="2548728"/>
-                  <a:pt x="0" y="2500688"/>
-                  <a:pt x="0" y="2441427"/>
-                </a:cubicBezTo>
-                <a:lnTo>
-                  <a:pt x="0" y="107301"/>
-                </a:lnTo>
-                <a:cubicBezTo>
-                  <a:pt x="0" y="48040"/>
-                  <a:pt x="48040" y="0"/>
-                  <a:pt x="107301" y="0"/>
-                </a:cubicBezTo>
-                <a:close/>
-              </a:path>
-            </a:pathLst>
-          </a:custGeom>
-        </p:spPr>
-      </p:pic>
-      <p:pic>
-        <p:nvPicPr>
-          <p:cNvPr id="14" name="Picture 13" descr="Icon&#10;&#10;Description automatically generated">
-            <a:extLst>
-              <a:ext uri="{FF2B5EF4-FFF2-40B4-BE49-F238E27FC236}">
-                <a16:creationId xmlns:a16="http://schemas.microsoft.com/office/drawing/2014/main" id="{7CD99937-3257-CB4D-BF54-D45690D58913}"/>
-              </a:ext>
-            </a:extLst>
-          </p:cNvPr>
-          <p:cNvPicPr>
-            <a:picLocks noChangeAspect="1"/>
-          </p:cNvPicPr>
-          <p:nvPr/>
-        </p:nvPicPr>
-        <p:blipFill>
-          <a:blip r:embed="rId5"/>
-          <a:stretch>
-            <a:fillRect/>
-          </a:stretch>
-        </p:blipFill>
-        <p:spPr>
-          <a:xfrm>
-            <a:off x="582435" y="3624263"/>
-            <a:ext cx="2552700" cy="2552700"/>
-          </a:xfrm>
-          <a:custGeom>
-            <a:avLst/>
-            <a:gdLst/>
-            <a:ahLst/>
-            <a:cxnLst/>
-            <a:rect l="l" t="t" r="r" b="b"/>
-            <a:pathLst>
-              <a:path w="1999274" h="2247255">
-                <a:moveTo>
-                  <a:pt x="108501" y="0"/>
-                </a:moveTo>
-                <a:lnTo>
-                  <a:pt x="1890773" y="0"/>
-                </a:lnTo>
-                <a:cubicBezTo>
-                  <a:pt x="1950696" y="0"/>
-                  <a:pt x="1999274" y="48578"/>
-                  <a:pt x="1999274" y="108501"/>
-                </a:cubicBezTo>
-                <a:lnTo>
-                  <a:pt x="1999274" y="2138754"/>
-                </a:lnTo>
-                <a:cubicBezTo>
-                  <a:pt x="1999274" y="2198677"/>
-                  <a:pt x="1950696" y="2247255"/>
-                  <a:pt x="1890773" y="2247255"/>
-                </a:cubicBezTo>
-                <a:lnTo>
-                  <a:pt x="108501" y="2247255"/>
-                </a:lnTo>
-                <a:cubicBezTo>
-                  <a:pt x="48578" y="2247255"/>
-                  <a:pt x="0" y="2198677"/>
-                  <a:pt x="0" y="2138754"/>
-                </a:cubicBezTo>
-                <a:lnTo>
-                  <a:pt x="0" y="108501"/>
-                </a:lnTo>
-                <a:cubicBezTo>
-                  <a:pt x="0" y="48578"/>
-                  <a:pt x="48578" y="0"/>
-                  <a:pt x="108501" y="0"/>
-                </a:cubicBezTo>
-                <a:close/>
-              </a:path>
-            </a:pathLst>
-          </a:custGeom>
-        </p:spPr>
-      </p:pic>
-      <p:pic>
-        <p:nvPicPr>
-          <p:cNvPr id="5" name="Picture 4" descr="Logo, icon&#10;&#10;Description automatically generated">
-            <a:extLst>
-              <a:ext uri="{FF2B5EF4-FFF2-40B4-BE49-F238E27FC236}">
-                <a16:creationId xmlns:a16="http://schemas.microsoft.com/office/drawing/2014/main" id="{5E2B5672-1FA4-634F-AA2A-5738232A7061}"/>
-              </a:ext>
-            </a:extLst>
-          </p:cNvPr>
-          <p:cNvPicPr>
-            <a:picLocks noChangeAspect="1"/>
-          </p:cNvPicPr>
-          <p:nvPr/>
-        </p:nvPicPr>
-        <p:blipFill rotWithShape="1">
-          <a:blip r:embed="rId6"/>
-          <a:srcRect t="3740" r="-4" b="-4"/>
-          <a:stretch/>
-        </p:blipFill>
-        <p:spPr>
-          <a:xfrm>
-            <a:off x="3349533" y="3260061"/>
-            <a:ext cx="2533423" cy="2438676"/>
-          </a:xfrm>
-          <a:custGeom>
-            <a:avLst/>
-            <a:gdLst/>
-            <a:ahLst/>
-            <a:cxnLst/>
-            <a:rect l="l" t="t" r="r" b="b"/>
-            <a:pathLst>
-              <a:path w="1999274" h="2247255">
-                <a:moveTo>
-                  <a:pt x="108501" y="0"/>
-                </a:moveTo>
-                <a:lnTo>
-                  <a:pt x="1890773" y="0"/>
-                </a:lnTo>
-                <a:cubicBezTo>
-                  <a:pt x="1950696" y="0"/>
-                  <a:pt x="1999274" y="48578"/>
-                  <a:pt x="1999274" y="108501"/>
-                </a:cubicBezTo>
-                <a:lnTo>
-                  <a:pt x="1999274" y="2138754"/>
-                </a:lnTo>
-                <a:cubicBezTo>
-                  <a:pt x="1999274" y="2198677"/>
-                  <a:pt x="1950696" y="2247255"/>
-                  <a:pt x="1890773" y="2247255"/>
-                </a:cubicBezTo>
-                <a:lnTo>
-                  <a:pt x="108501" y="2247255"/>
-                </a:lnTo>
-                <a:cubicBezTo>
-                  <a:pt x="48578" y="2247255"/>
-                  <a:pt x="0" y="2198677"/>
-                  <a:pt x="0" y="2138754"/>
-                </a:cubicBezTo>
-                <a:lnTo>
-                  <a:pt x="0" y="108501"/>
-                </a:lnTo>
-                <a:cubicBezTo>
-                  <a:pt x="0" y="48578"/>
-                  <a:pt x="48578" y="0"/>
-                  <a:pt x="108501" y="0"/>
-                </a:cubicBezTo>
-                <a:close/>
-              </a:path>
-            </a:pathLst>
-          </a:custGeom>
-        </p:spPr>
-      </p:pic>
       <p:sp>
         <p:nvSpPr>
           <p:cNvPr id="3" name="Content Placeholder 2">
@@ -14371,36 +14075,36 @@
         </p:nvSpPr>
         <p:spPr>
           <a:xfrm>
-            <a:off x="6353119" y="1825625"/>
-            <a:ext cx="5393361" cy="4351338"/>
+            <a:off x="590719" y="2330505"/>
+            <a:ext cx="4559425" cy="3979585"/>
           </a:xfrm>
         </p:spPr>
         <p:txBody>
           <a:bodyPr anchor="ctr">
-            <a:normAutofit/>
+            <a:noAutofit/>
           </a:bodyPr>
           <a:lstStyle/>
           <a:p>
             <a:r>
-              <a:rPr lang="en-US" dirty="0"/>
+              <a:rPr lang="en-US" sz="3600" dirty="0"/>
               <a:t>Access</a:t>
             </a:r>
           </a:p>
           <a:p>
             <a:r>
-              <a:rPr lang="en-US" dirty="0"/>
+              <a:rPr lang="en-US" sz="3600" dirty="0"/>
               <a:t>Run books</a:t>
             </a:r>
           </a:p>
           <a:p>
             <a:r>
-              <a:rPr lang="en-US" dirty="0"/>
+              <a:rPr lang="en-US" sz="3600" dirty="0"/>
               <a:t>Reports</a:t>
             </a:r>
           </a:p>
           <a:p>
             <a:r>
-              <a:rPr lang="en-US" dirty="0"/>
+              <a:rPr lang="en-US" sz="3600" dirty="0"/>
               <a:t>Communication</a:t>
             </a:r>
           </a:p>
@@ -14408,10 +14112,10 @@
       </p:sp>
       <p:sp>
         <p:nvSpPr>
-          <p:cNvPr id="60" name="Freeform: Shape 59">
+          <p:cNvPr id="79" name="Rectangle 78">
             <a:extLst>
               <a:ext uri="{FF2B5EF4-FFF2-40B4-BE49-F238E27FC236}">
-                <a16:creationId xmlns:a16="http://schemas.microsoft.com/office/drawing/2014/main" id="{D1B80E9C-CF8A-440B-B8F5-54BF121BF458}"/>
+                <a16:creationId xmlns:a16="http://schemas.microsoft.com/office/drawing/2014/main" id="{C13237C8-E62C-4F0D-A318-BD6FB6C2D138}"/>
               </a:ext>
               <a:ext uri="{C183D7F6-B498-43B3-948B-1728B52AA6E4}">
                 <adec:decorative xmlns:adec="http://schemas.microsoft.com/office/drawing/2017/decorative" val="1"/>
@@ -14430,78 +14134,15 @@
           </p:nvPr>
         </p:nvSpPr>
         <p:spPr>
-          <a:xfrm>
-            <a:off x="2208993" y="6356350"/>
-            <a:ext cx="1211855" cy="501650"/>
+          <a:xfrm flipH="1">
+            <a:off x="10697670" y="0"/>
+            <a:ext cx="1494330" cy="6858000"/>
           </a:xfrm>
-          <a:custGeom>
+          <a:prstGeom prst="rect">
             <a:avLst/>
-            <a:gdLst>
-              <a:gd name="connsiteX0" fmla="*/ 995532 w 1991064"/>
-              <a:gd name="connsiteY0" fmla="*/ 0 h 824205"/>
-              <a:gd name="connsiteX1" fmla="*/ 1984823 w 1991064"/>
-              <a:gd name="connsiteY1" fmla="*/ 784423 h 824205"/>
-              <a:gd name="connsiteX2" fmla="*/ 1991064 w 1991064"/>
-              <a:gd name="connsiteY2" fmla="*/ 824205 h 824205"/>
-              <a:gd name="connsiteX3" fmla="*/ 0 w 1991064"/>
-              <a:gd name="connsiteY3" fmla="*/ 824205 h 824205"/>
-              <a:gd name="connsiteX4" fmla="*/ 6241 w 1991064"/>
-              <a:gd name="connsiteY4" fmla="*/ 784423 h 824205"/>
-              <a:gd name="connsiteX5" fmla="*/ 995532 w 1991064"/>
-              <a:gd name="connsiteY5" fmla="*/ 0 h 824205"/>
-            </a:gdLst>
-            <a:ahLst/>
-            <a:cxnLst>
-              <a:cxn ang="0">
-                <a:pos x="connsiteX0" y="connsiteY0"/>
-              </a:cxn>
-              <a:cxn ang="0">
-                <a:pos x="connsiteX1" y="connsiteY1"/>
-              </a:cxn>
-              <a:cxn ang="0">
-                <a:pos x="connsiteX2" y="connsiteY2"/>
-              </a:cxn>
-              <a:cxn ang="0">
-                <a:pos x="connsiteX3" y="connsiteY3"/>
-              </a:cxn>
-              <a:cxn ang="0">
-                <a:pos x="connsiteX4" y="connsiteY4"/>
-              </a:cxn>
-              <a:cxn ang="0">
-                <a:pos x="connsiteX5" y="connsiteY5"/>
-              </a:cxn>
-            </a:cxnLst>
-            <a:rect l="l" t="t" r="r" b="b"/>
-            <a:pathLst>
-              <a:path w="1991064" h="824205">
-                <a:moveTo>
-                  <a:pt x="995532" y="0"/>
-                </a:moveTo>
-                <a:cubicBezTo>
-                  <a:pt x="1483521" y="0"/>
-                  <a:pt x="1890663" y="336754"/>
-                  <a:pt x="1984823" y="784423"/>
-                </a:cubicBezTo>
-                <a:lnTo>
-                  <a:pt x="1991064" y="824205"/>
-                </a:lnTo>
-                <a:lnTo>
-                  <a:pt x="0" y="824205"/>
-                </a:lnTo>
-                <a:lnTo>
-                  <a:pt x="6241" y="784423"/>
-                </a:lnTo>
-                <a:cubicBezTo>
-                  <a:pt x="100402" y="336754"/>
-                  <a:pt x="507544" y="0"/>
-                  <a:pt x="995532" y="0"/>
-                </a:cubicBezTo>
-                <a:close/>
-              </a:path>
-            </a:pathLst>
-          </a:custGeom>
+          </a:prstGeom>
           <a:solidFill>
-            <a:schemeClr val="accent2"/>
+            <a:schemeClr val="accent4"/>
           </a:solidFill>
           <a:ln>
             <a:noFill/>
@@ -14524,22 +14165,20 @@
           </a:fontRef>
         </p:style>
         <p:txBody>
-          <a:bodyPr wrap="square" rtlCol="0" anchor="ctr">
-            <a:noAutofit/>
-          </a:bodyPr>
+          <a:bodyPr rtlCol="0" anchor="ctr"/>
           <a:lstStyle/>
           <a:p>
             <a:pPr algn="ctr"/>
-            <a:endParaRPr lang="en-US" dirty="0"/>
+            <a:endParaRPr lang="en-US"/>
           </a:p>
         </p:txBody>
       </p:sp>
       <p:sp>
         <p:nvSpPr>
-          <p:cNvPr id="62" name="Freeform: Shape 61">
+          <p:cNvPr id="81" name="Rectangle 80">
             <a:extLst>
               <a:ext uri="{FF2B5EF4-FFF2-40B4-BE49-F238E27FC236}">
-                <a16:creationId xmlns:a16="http://schemas.microsoft.com/office/drawing/2014/main" id="{F1FF25AD-D64E-45A0-B2D0-F4A6AB092614}"/>
+                <a16:creationId xmlns:a16="http://schemas.microsoft.com/office/drawing/2014/main" id="{19C9EAEA-39D0-4B0E-A0EB-51E7B26740B1}"/>
               </a:ext>
               <a:ext uri="{C183D7F6-B498-43B3-948B-1728B52AA6E4}">
                 <adec:decorative xmlns:adec="http://schemas.microsoft.com/office/drawing/2017/decorative" val="1"/>
@@ -14558,301 +14197,97 @@
           </p:nvPr>
         </p:nvSpPr>
         <p:spPr>
-          <a:xfrm rot="21195502">
-            <a:off x="3940987" y="6009537"/>
-            <a:ext cx="1702506" cy="951685"/>
+          <a:xfrm>
+            <a:off x="5685810" y="513853"/>
+            <a:ext cx="6009366" cy="5834577"/>
           </a:xfrm>
-          <a:custGeom>
+          <a:prstGeom prst="rect">
             <a:avLst/>
-            <a:gdLst>
-              <a:gd name="connsiteX0" fmla="*/ 1585229 w 1702506"/>
-              <a:gd name="connsiteY0" fmla="*/ 764759 h 951685"/>
-              <a:gd name="connsiteX1" fmla="*/ 1623024 w 1702506"/>
-              <a:gd name="connsiteY1" fmla="*/ 792810 h 951685"/>
-              <a:gd name="connsiteX2" fmla="*/ 1702506 w 1702506"/>
-              <a:gd name="connsiteY2" fmla="*/ 951685 h 951685"/>
-              <a:gd name="connsiteX3" fmla="*/ 1551862 w 1702506"/>
-              <a:gd name="connsiteY3" fmla="*/ 933877 h 951685"/>
-              <a:gd name="connsiteX4" fmla="*/ 1513200 w 1702506"/>
-              <a:gd name="connsiteY4" fmla="*/ 856627 h 951685"/>
-              <a:gd name="connsiteX5" fmla="*/ 1538499 w 1702506"/>
-              <a:gd name="connsiteY5" fmla="*/ 770415 h 951685"/>
-              <a:gd name="connsiteX6" fmla="*/ 1585229 w 1702506"/>
-              <a:gd name="connsiteY6" fmla="*/ 764759 h 951685"/>
-              <a:gd name="connsiteX7" fmla="*/ 933455 w 1702506"/>
-              <a:gd name="connsiteY7" fmla="*/ 161308 h 951685"/>
-              <a:gd name="connsiteX8" fmla="*/ 957797 w 1702506"/>
-              <a:gd name="connsiteY8" fmla="*/ 167970 h 951685"/>
-              <a:gd name="connsiteX9" fmla="*/ 1286982 w 1702506"/>
-              <a:gd name="connsiteY9" fmla="*/ 387616 h 951685"/>
-              <a:gd name="connsiteX10" fmla="*/ 1293725 w 1702506"/>
-              <a:gd name="connsiteY10" fmla="*/ 477075 h 951685"/>
-              <a:gd name="connsiteX11" fmla="*/ 1245453 w 1702506"/>
-              <a:gd name="connsiteY11" fmla="*/ 499154 h 951685"/>
-              <a:gd name="connsiteX12" fmla="*/ 1245167 w 1702506"/>
-              <a:gd name="connsiteY12" fmla="*/ 499154 h 951685"/>
-              <a:gd name="connsiteX13" fmla="*/ 1203638 w 1702506"/>
-              <a:gd name="connsiteY13" fmla="*/ 484104 h 951685"/>
-              <a:gd name="connsiteX14" fmla="*/ 900647 w 1702506"/>
-              <a:gd name="connsiteY14" fmla="*/ 281508 h 951685"/>
-              <a:gd name="connsiteX15" fmla="*/ 872454 w 1702506"/>
-              <a:gd name="connsiteY15" fmla="*/ 196164 h 951685"/>
-              <a:gd name="connsiteX16" fmla="*/ 933455 w 1702506"/>
-              <a:gd name="connsiteY16" fmla="*/ 161308 h 951685"/>
-              <a:gd name="connsiteX17" fmla="*/ 454020 w 1702506"/>
-              <a:gd name="connsiteY17" fmla="*/ 13474 h 951685"/>
-              <a:gd name="connsiteX18" fmla="*/ 477919 w 1702506"/>
-              <a:gd name="connsiteY18" fmla="*/ 21437 h 951685"/>
-              <a:gd name="connsiteX19" fmla="*/ 509236 w 1702506"/>
-              <a:gd name="connsiteY19" fmla="*/ 84182 h 951685"/>
-              <a:gd name="connsiteX20" fmla="*/ 445829 w 1702506"/>
-              <a:gd name="connsiteY20" fmla="*/ 139871 h 951685"/>
-              <a:gd name="connsiteX21" fmla="*/ 437447 w 1702506"/>
-              <a:gd name="connsiteY21" fmla="*/ 139395 h 951685"/>
-              <a:gd name="connsiteX22" fmla="*/ 73211 w 1702506"/>
-              <a:gd name="connsiteY22" fmla="*/ 137204 h 951685"/>
-              <a:gd name="connsiteX23" fmla="*/ 749 w 1702506"/>
-              <a:gd name="connsiteY23" fmla="*/ 84082 h 951685"/>
-              <a:gd name="connsiteX24" fmla="*/ 53871 w 1702506"/>
-              <a:gd name="connsiteY24" fmla="*/ 11621 h 951685"/>
-              <a:gd name="connsiteX25" fmla="*/ 58352 w 1702506"/>
-              <a:gd name="connsiteY25" fmla="*/ 11093 h 951685"/>
-              <a:gd name="connsiteX26" fmla="*/ 454020 w 1702506"/>
-              <a:gd name="connsiteY26" fmla="*/ 13474 h 951685"/>
-            </a:gdLst>
-            <a:ahLst/>
-            <a:cxnLst>
-              <a:cxn ang="0">
-                <a:pos x="connsiteX0" y="connsiteY0"/>
-              </a:cxn>
-              <a:cxn ang="0">
-                <a:pos x="connsiteX1" y="connsiteY1"/>
-              </a:cxn>
-              <a:cxn ang="0">
-                <a:pos x="connsiteX2" y="connsiteY2"/>
-              </a:cxn>
-              <a:cxn ang="0">
-                <a:pos x="connsiteX3" y="connsiteY3"/>
-              </a:cxn>
-              <a:cxn ang="0">
-                <a:pos x="connsiteX4" y="connsiteY4"/>
-              </a:cxn>
-              <a:cxn ang="0">
-                <a:pos x="connsiteX5" y="connsiteY5"/>
-              </a:cxn>
-              <a:cxn ang="0">
-                <a:pos x="connsiteX6" y="connsiteY6"/>
-              </a:cxn>
-              <a:cxn ang="0">
-                <a:pos x="connsiteX7" y="connsiteY7"/>
-              </a:cxn>
-              <a:cxn ang="0">
-                <a:pos x="connsiteX8" y="connsiteY8"/>
-              </a:cxn>
-              <a:cxn ang="0">
-                <a:pos x="connsiteX9" y="connsiteY9"/>
-              </a:cxn>
-              <a:cxn ang="0">
-                <a:pos x="connsiteX10" y="connsiteY10"/>
-              </a:cxn>
-              <a:cxn ang="0">
-                <a:pos x="connsiteX11" y="connsiteY11"/>
-              </a:cxn>
-              <a:cxn ang="0">
-                <a:pos x="connsiteX12" y="connsiteY12"/>
-              </a:cxn>
-              <a:cxn ang="0">
-                <a:pos x="connsiteX13" y="connsiteY13"/>
-              </a:cxn>
-              <a:cxn ang="0">
-                <a:pos x="connsiteX14" y="connsiteY14"/>
-              </a:cxn>
-              <a:cxn ang="0">
-                <a:pos x="connsiteX15" y="connsiteY15"/>
-              </a:cxn>
-              <a:cxn ang="0">
-                <a:pos x="connsiteX16" y="connsiteY16"/>
-              </a:cxn>
-              <a:cxn ang="0">
-                <a:pos x="connsiteX17" y="connsiteY17"/>
-              </a:cxn>
-              <a:cxn ang="0">
-                <a:pos x="connsiteX18" y="connsiteY18"/>
-              </a:cxn>
-              <a:cxn ang="0">
-                <a:pos x="connsiteX19" y="connsiteY19"/>
-              </a:cxn>
-              <a:cxn ang="0">
-                <a:pos x="connsiteX20" y="connsiteY20"/>
-              </a:cxn>
-              <a:cxn ang="0">
-                <a:pos x="connsiteX21" y="connsiteY21"/>
-              </a:cxn>
-              <a:cxn ang="0">
-                <a:pos x="connsiteX22" y="connsiteY22"/>
-              </a:cxn>
-              <a:cxn ang="0">
-                <a:pos x="connsiteX23" y="connsiteY23"/>
-              </a:cxn>
-              <a:cxn ang="0">
-                <a:pos x="connsiteX24" y="connsiteY24"/>
-              </a:cxn>
-              <a:cxn ang="0">
-                <a:pos x="connsiteX25" y="connsiteY25"/>
-              </a:cxn>
-              <a:cxn ang="0">
-                <a:pos x="connsiteX26" y="connsiteY26"/>
-              </a:cxn>
-            </a:cxnLst>
-            <a:rect l="l" t="t" r="r" b="b"/>
-            <a:pathLst>
-              <a:path w="1702506" h="951685">
-                <a:moveTo>
-                  <a:pt x="1585229" y="764759"/>
-                </a:moveTo>
-                <a:cubicBezTo>
-                  <a:pt x="1600438" y="768789"/>
-                  <a:pt x="1614156" y="778436"/>
-                  <a:pt x="1623024" y="792810"/>
-                </a:cubicBezTo>
-                <a:lnTo>
-                  <a:pt x="1702506" y="951685"/>
-                </a:lnTo>
-                <a:lnTo>
-                  <a:pt x="1551862" y="933877"/>
-                </a:lnTo>
-                <a:lnTo>
-                  <a:pt x="1513200" y="856627"/>
-                </a:lnTo>
-                <a:cubicBezTo>
-                  <a:pt x="1496379" y="825834"/>
-                  <a:pt x="1507704" y="787236"/>
-                  <a:pt x="1538499" y="770415"/>
-                </a:cubicBezTo>
-                <a:cubicBezTo>
-                  <a:pt x="1553325" y="762319"/>
-                  <a:pt x="1570022" y="760730"/>
-                  <a:pt x="1585229" y="764759"/>
-                </a:cubicBezTo>
-                <a:close/>
-                <a:moveTo>
-                  <a:pt x="933455" y="161308"/>
-                </a:moveTo>
-                <a:cubicBezTo>
-                  <a:pt x="941692" y="161855"/>
-                  <a:pt x="949960" y="164024"/>
-                  <a:pt x="957797" y="167970"/>
-                </a:cubicBezTo>
-                <a:cubicBezTo>
-                  <a:pt x="1076184" y="227289"/>
-                  <a:pt x="1186759" y="301068"/>
-                  <a:pt x="1286982" y="387616"/>
-                </a:cubicBezTo>
-                <a:cubicBezTo>
-                  <a:pt x="1313547" y="410457"/>
-                  <a:pt x="1316565" y="450510"/>
-                  <a:pt x="1293725" y="477075"/>
-                </a:cubicBezTo>
-                <a:cubicBezTo>
-                  <a:pt x="1281638" y="491137"/>
-                  <a:pt x="1263998" y="499204"/>
-                  <a:pt x="1245453" y="499154"/>
-                </a:cubicBezTo>
-                <a:lnTo>
-                  <a:pt x="1245167" y="499154"/>
-                </a:lnTo>
-                <a:cubicBezTo>
-                  <a:pt x="1229965" y="499301"/>
-                  <a:pt x="1215220" y="493956"/>
-                  <a:pt x="1203638" y="484104"/>
-                </a:cubicBezTo>
-                <a:cubicBezTo>
-                  <a:pt x="1111407" y="404300"/>
-                  <a:pt x="1009633" y="336248"/>
-                  <a:pt x="900647" y="281508"/>
-                </a:cubicBezTo>
-                <a:cubicBezTo>
-                  <a:pt x="869295" y="265726"/>
-                  <a:pt x="856672" y="227516"/>
-                  <a:pt x="872454" y="196164"/>
-                </a:cubicBezTo>
-                <a:cubicBezTo>
-                  <a:pt x="884289" y="172649"/>
-                  <a:pt x="908742" y="159670"/>
-                  <a:pt x="933455" y="161308"/>
-                </a:cubicBezTo>
-                <a:close/>
-                <a:moveTo>
-                  <a:pt x="454020" y="13474"/>
-                </a:moveTo>
-                <a:cubicBezTo>
-                  <a:pt x="462713" y="14543"/>
-                  <a:pt x="470778" y="17324"/>
-                  <a:pt x="477919" y="21437"/>
-                </a:cubicBezTo>
-                <a:cubicBezTo>
-                  <a:pt x="499341" y="33775"/>
-                  <a:pt x="512445" y="58102"/>
-                  <a:pt x="509236" y="84182"/>
-                </a:cubicBezTo>
-                <a:cubicBezTo>
-                  <a:pt x="505303" y="116151"/>
-                  <a:pt x="478038" y="140098"/>
-                  <a:pt x="445829" y="139871"/>
-                </a:cubicBezTo>
-                <a:cubicBezTo>
-                  <a:pt x="443027" y="139899"/>
-                  <a:pt x="440227" y="139740"/>
-                  <a:pt x="437447" y="139395"/>
-                </a:cubicBezTo>
-                <a:cubicBezTo>
-                  <a:pt x="316592" y="123615"/>
-                  <a:pt x="194247" y="122878"/>
-                  <a:pt x="73211" y="137204"/>
-                </a:cubicBezTo>
-                <a:cubicBezTo>
-                  <a:pt x="38532" y="142545"/>
-                  <a:pt x="6090" y="118762"/>
-                  <a:pt x="749" y="84082"/>
-                </a:cubicBezTo>
-                <a:cubicBezTo>
-                  <a:pt x="-4591" y="49403"/>
-                  <a:pt x="19192" y="16961"/>
-                  <a:pt x="53871" y="11621"/>
-                </a:cubicBezTo>
-                <a:cubicBezTo>
-                  <a:pt x="55358" y="11392"/>
-                  <a:pt x="56852" y="11216"/>
-                  <a:pt x="58352" y="11093"/>
-                </a:cubicBezTo>
-                <a:cubicBezTo>
-                  <a:pt x="189834" y="-4456"/>
-                  <a:pt x="322735" y="-3656"/>
-                  <a:pt x="454020" y="13474"/>
-                </a:cubicBezTo>
-                <a:close/>
-              </a:path>
-            </a:pathLst>
-          </a:custGeom>
+          </a:prstGeom>
           <a:solidFill>
-            <a:schemeClr val="accent4"/>
+            <a:schemeClr val="bg1"/>
           </a:solidFill>
-          <a:ln w="9525" cap="flat">
+          <a:ln>
             <a:noFill/>
-            <a:prstDash val="solid"/>
-            <a:miter/>
           </a:ln>
+          <a:effectLst>
+            <a:outerShdw blurRad="139700" dist="127000" dir="5400000" algn="t" rotWithShape="0">
+              <a:prstClr val="black">
+                <a:alpha val="15000"/>
+              </a:prstClr>
+            </a:outerShdw>
+          </a:effectLst>
         </p:spPr>
+        <p:style>
+          <a:lnRef idx="2">
+            <a:schemeClr val="accent1">
+              <a:shade val="50000"/>
+            </a:schemeClr>
+          </a:lnRef>
+          <a:fillRef idx="1">
+            <a:schemeClr val="accent1"/>
+          </a:fillRef>
+          <a:effectRef idx="0">
+            <a:schemeClr val="accent1"/>
+          </a:effectRef>
+          <a:fontRef idx="minor">
+            <a:schemeClr val="lt1"/>
+          </a:fontRef>
+        </p:style>
         <p:txBody>
-          <a:bodyPr wrap="square" rtlCol="0" anchor="ctr">
-            <a:noAutofit/>
-          </a:bodyPr>
+          <a:bodyPr rtlCol="0" anchor="ctr"/>
           <a:lstStyle/>
           <a:p>
+            <a:pPr algn="ctr"/>
             <a:endParaRPr lang="en-US"/>
           </a:p>
         </p:txBody>
       </p:sp>
+      <p:pic>
+        <p:nvPicPr>
+          <p:cNvPr id="1026" name="Picture 2" descr="alt text">
+            <a:extLst>
+              <a:ext uri="{FF2B5EF4-FFF2-40B4-BE49-F238E27FC236}">
+                <a16:creationId xmlns:a16="http://schemas.microsoft.com/office/drawing/2014/main" id="{51C6C39A-3516-1146-AD04-36CE3ACE459D}"/>
+              </a:ext>
+            </a:extLst>
+          </p:cNvPr>
+          <p:cNvPicPr>
+            <a:picLocks noChangeAspect="1" noChangeArrowheads="1"/>
+          </p:cNvPicPr>
+          <p:nvPr/>
+        </p:nvPicPr>
+        <p:blipFill rotWithShape="1">
+          <a:blip r:embed="rId3">
+            <a:extLst>
+              <a:ext uri="{28A0092B-C50C-407E-A947-70E740481C1C}">
+                <a14:useLocalDpi xmlns:a14="http://schemas.microsoft.com/office/drawing/2010/main" val="0"/>
+              </a:ext>
+            </a:extLst>
+          </a:blip>
+          <a:srcRect l="6390" r="6183" b="-1"/>
+          <a:stretch/>
+        </p:blipFill>
+        <p:spPr bwMode="auto">
+          <a:xfrm>
+            <a:off x="5977788" y="799352"/>
+            <a:ext cx="5425410" cy="5259296"/>
+          </a:xfrm>
+          <a:prstGeom prst="rect">
+            <a:avLst/>
+          </a:prstGeom>
+          <a:noFill/>
+          <a:extLst>
+            <a:ext uri="{909E8E84-426E-40DD-AFC4-6F175D3DCCD1}">
+              <a14:hiddenFill xmlns:a14="http://schemas.microsoft.com/office/drawing/2010/main">
+                <a:solidFill>
+                  <a:srgbClr val="FFFFFF"/>
+                </a:solidFill>
+              </a14:hiddenFill>
+            </a:ext>
+          </a:extLst>
+        </p:spPr>
+      </p:pic>
     </p:spTree>
     <p:extLst>
       <p:ext uri="{BB962C8B-B14F-4D97-AF65-F5344CB8AC3E}">

</xml_diff>

<commit_message>
Added some notes to slides and some talks
</commit_message>
<xml_diff>
--- a/presentations/prod_support.pptx
+++ b/presentations/prod_support.pptx
@@ -9,8 +9,8 @@
   </p:notesMasterIdLst>
   <p:sldIdLst>
     <p:sldId id="256" r:id="rId2"/>
-    <p:sldId id="264" r:id="rId3"/>
-    <p:sldId id="257" r:id="rId4"/>
+    <p:sldId id="257" r:id="rId3"/>
+    <p:sldId id="264" r:id="rId4"/>
     <p:sldId id="258" r:id="rId5"/>
     <p:sldId id="259" r:id="rId6"/>
     <p:sldId id="260" r:id="rId7"/>
@@ -2547,6 +2547,421 @@
 </file>
 
 <file path=ppt/diagrams/data1.xml><?xml version="1.0" encoding="utf-8"?>
+<dgm:dataModel xmlns:dgm="http://schemas.openxmlformats.org/drawingml/2006/diagram" xmlns:a="http://schemas.openxmlformats.org/drawingml/2006/main">
+  <dgm:ptLst>
+    <dgm:pt modelId="{B97148FC-8022-4E41-90BF-3A26D1D8E529}" type="doc">
+      <dgm:prSet loTypeId="urn:microsoft.com/office/officeart/2005/8/layout/cycle5" loCatId="" qsTypeId="urn:microsoft.com/office/officeart/2005/8/quickstyle/simple1" qsCatId="simple" csTypeId="urn:microsoft.com/office/officeart/2005/8/colors/accent1_2" csCatId="accent1" phldr="1"/>
+      <dgm:spPr/>
+      <dgm:t>
+        <a:bodyPr/>
+        <a:lstStyle/>
+        <a:p>
+          <a:endParaRPr lang="en-GB"/>
+        </a:p>
+      </dgm:t>
+    </dgm:pt>
+    <dgm:pt modelId="{3DAD6F9E-42C4-9C4C-9CBF-4BFD5A74CD4E}">
+      <dgm:prSet phldrT="[Text]"/>
+      <dgm:spPr>
+        <a:solidFill>
+          <a:schemeClr val="accent3"/>
+        </a:solidFill>
+      </dgm:spPr>
+      <dgm:t>
+        <a:bodyPr/>
+        <a:lstStyle/>
+        <a:p>
+          <a:r>
+            <a:rPr lang="en-GB" dirty="0"/>
+            <a:t>Requirement</a:t>
+          </a:r>
+        </a:p>
+      </dgm:t>
+    </dgm:pt>
+    <dgm:pt modelId="{50CD3392-183E-8647-9173-C2507C854A21}" type="parTrans" cxnId="{8CD95589-9396-304B-A360-259C3CF3D00D}">
+      <dgm:prSet/>
+      <dgm:spPr/>
+      <dgm:t>
+        <a:bodyPr/>
+        <a:lstStyle/>
+        <a:p>
+          <a:endParaRPr lang="en-GB"/>
+        </a:p>
+      </dgm:t>
+    </dgm:pt>
+    <dgm:pt modelId="{E7C3FA4C-E972-3D43-87CC-FEED9075893B}" type="sibTrans" cxnId="{8CD95589-9396-304B-A360-259C3CF3D00D}">
+      <dgm:prSet/>
+      <dgm:spPr/>
+      <dgm:t>
+        <a:bodyPr/>
+        <a:lstStyle/>
+        <a:p>
+          <a:endParaRPr lang="en-GB"/>
+        </a:p>
+      </dgm:t>
+    </dgm:pt>
+    <dgm:pt modelId="{DBCCD44D-8FA5-4745-BDD7-D1B4B5994643}">
+      <dgm:prSet phldrT="[Text]"/>
+      <dgm:spPr>
+        <a:solidFill>
+          <a:schemeClr val="accent3"/>
+        </a:solidFill>
+      </dgm:spPr>
+      <dgm:t>
+        <a:bodyPr/>
+        <a:lstStyle/>
+        <a:p>
+          <a:r>
+            <a:rPr lang="en-GB" dirty="0"/>
+            <a:t>Design</a:t>
+          </a:r>
+        </a:p>
+      </dgm:t>
+    </dgm:pt>
+    <dgm:pt modelId="{9083FE28-FE83-E148-B4E4-81989D158B4E}" type="parTrans" cxnId="{F175A150-D7DA-A246-BE39-64FFC520C555}">
+      <dgm:prSet/>
+      <dgm:spPr/>
+      <dgm:t>
+        <a:bodyPr/>
+        <a:lstStyle/>
+        <a:p>
+          <a:endParaRPr lang="en-GB"/>
+        </a:p>
+      </dgm:t>
+    </dgm:pt>
+    <dgm:pt modelId="{E06B33AC-3350-6A47-A563-EA9F91B33095}" type="sibTrans" cxnId="{F175A150-D7DA-A246-BE39-64FFC520C555}">
+      <dgm:prSet/>
+      <dgm:spPr/>
+      <dgm:t>
+        <a:bodyPr/>
+        <a:lstStyle/>
+        <a:p>
+          <a:endParaRPr lang="en-GB"/>
+        </a:p>
+      </dgm:t>
+    </dgm:pt>
+    <dgm:pt modelId="{51604D7E-B1CE-4A4E-A7A1-0CB05BADDC77}">
+      <dgm:prSet phldrT="[Text]"/>
+      <dgm:spPr>
+        <a:solidFill>
+          <a:schemeClr val="bg2">
+            <a:lumMod val="75000"/>
+          </a:schemeClr>
+        </a:solidFill>
+      </dgm:spPr>
+      <dgm:t>
+        <a:bodyPr/>
+        <a:lstStyle/>
+        <a:p>
+          <a:r>
+            <a:rPr lang="en-GB" dirty="0"/>
+            <a:t>Implementation</a:t>
+          </a:r>
+        </a:p>
+      </dgm:t>
+    </dgm:pt>
+    <dgm:pt modelId="{AA24F77B-D71B-2D4F-8E5D-8BF14ACFB230}" type="parTrans" cxnId="{45E9D908-CA39-DC4D-BB49-FE15BB3D3B77}">
+      <dgm:prSet/>
+      <dgm:spPr/>
+      <dgm:t>
+        <a:bodyPr/>
+        <a:lstStyle/>
+        <a:p>
+          <a:endParaRPr lang="en-GB"/>
+        </a:p>
+      </dgm:t>
+    </dgm:pt>
+    <dgm:pt modelId="{471C13BE-B2A6-514C-9302-17C35D76F71A}" type="sibTrans" cxnId="{45E9D908-CA39-DC4D-BB49-FE15BB3D3B77}">
+      <dgm:prSet/>
+      <dgm:spPr/>
+      <dgm:t>
+        <a:bodyPr/>
+        <a:lstStyle/>
+        <a:p>
+          <a:endParaRPr lang="en-GB"/>
+        </a:p>
+      </dgm:t>
+    </dgm:pt>
+    <dgm:pt modelId="{15D52097-5850-A642-A977-0348AA2963FA}">
+      <dgm:prSet phldrT="[Text]"/>
+      <dgm:spPr>
+        <a:solidFill>
+          <a:schemeClr val="bg2">
+            <a:lumMod val="75000"/>
+          </a:schemeClr>
+        </a:solidFill>
+      </dgm:spPr>
+      <dgm:t>
+        <a:bodyPr/>
+        <a:lstStyle/>
+        <a:p>
+          <a:r>
+            <a:rPr lang="en-GB" dirty="0"/>
+            <a:t>Testing</a:t>
+          </a:r>
+        </a:p>
+      </dgm:t>
+    </dgm:pt>
+    <dgm:pt modelId="{26FCF447-A234-7043-8666-AC6B823E9329}" type="parTrans" cxnId="{787CB9DC-4BF8-214F-8127-61684B5342CD}">
+      <dgm:prSet/>
+      <dgm:spPr/>
+      <dgm:t>
+        <a:bodyPr/>
+        <a:lstStyle/>
+        <a:p>
+          <a:endParaRPr lang="en-GB"/>
+        </a:p>
+      </dgm:t>
+    </dgm:pt>
+    <dgm:pt modelId="{C123C68C-6D48-B841-9BD5-3D529B83B9D4}" type="sibTrans" cxnId="{787CB9DC-4BF8-214F-8127-61684B5342CD}">
+      <dgm:prSet/>
+      <dgm:spPr/>
+      <dgm:t>
+        <a:bodyPr/>
+        <a:lstStyle/>
+        <a:p>
+          <a:endParaRPr lang="en-GB"/>
+        </a:p>
+      </dgm:t>
+    </dgm:pt>
+    <dgm:pt modelId="{8DB640C8-4593-0440-BE91-A4C826E5650F}">
+      <dgm:prSet phldrT="[Text]"/>
+      <dgm:spPr>
+        <a:solidFill>
+          <a:schemeClr val="bg2">
+            <a:lumMod val="75000"/>
+          </a:schemeClr>
+        </a:solidFill>
+      </dgm:spPr>
+      <dgm:t>
+        <a:bodyPr/>
+        <a:lstStyle/>
+        <a:p>
+          <a:r>
+            <a:rPr lang="en-GB" dirty="0"/>
+            <a:t>Integration</a:t>
+          </a:r>
+        </a:p>
+      </dgm:t>
+    </dgm:pt>
+    <dgm:pt modelId="{44B0A483-2303-DA42-BD1F-8FDC220D2F06}" type="parTrans" cxnId="{2692FF34-354E-9646-92F8-973336C22353}">
+      <dgm:prSet/>
+      <dgm:spPr/>
+      <dgm:t>
+        <a:bodyPr/>
+        <a:lstStyle/>
+        <a:p>
+          <a:endParaRPr lang="en-GB"/>
+        </a:p>
+      </dgm:t>
+    </dgm:pt>
+    <dgm:pt modelId="{4AE7C4B4-A10E-C644-9777-7BF73F80F40A}" type="sibTrans" cxnId="{2692FF34-354E-9646-92F8-973336C22353}">
+      <dgm:prSet/>
+      <dgm:spPr/>
+      <dgm:t>
+        <a:bodyPr/>
+        <a:lstStyle/>
+        <a:p>
+          <a:endParaRPr lang="en-GB"/>
+        </a:p>
+      </dgm:t>
+    </dgm:pt>
+    <dgm:pt modelId="{FA798CD4-4D65-B045-9270-A196157B8BCB}">
+      <dgm:prSet phldrT="[Text]"/>
+      <dgm:spPr>
+        <a:solidFill>
+          <a:schemeClr val="accent2"/>
+        </a:solidFill>
+      </dgm:spPr>
+      <dgm:t>
+        <a:bodyPr/>
+        <a:lstStyle/>
+        <a:p>
+          <a:r>
+            <a:rPr lang="en-GB" dirty="0"/>
+            <a:t>Maintenance</a:t>
+          </a:r>
+        </a:p>
+      </dgm:t>
+    </dgm:pt>
+    <dgm:pt modelId="{28F3D07C-434C-524B-8370-7A0CA5EC74E6}" type="parTrans" cxnId="{BC267897-282A-A247-ABA7-9DA2D488DC62}">
+      <dgm:prSet/>
+      <dgm:spPr/>
+      <dgm:t>
+        <a:bodyPr/>
+        <a:lstStyle/>
+        <a:p>
+          <a:endParaRPr lang="en-GB"/>
+        </a:p>
+      </dgm:t>
+    </dgm:pt>
+    <dgm:pt modelId="{E16B1802-228F-014F-9533-ECFBE83229A2}" type="sibTrans" cxnId="{BC267897-282A-A247-ABA7-9DA2D488DC62}">
+      <dgm:prSet/>
+      <dgm:spPr/>
+      <dgm:t>
+        <a:bodyPr/>
+        <a:lstStyle/>
+        <a:p>
+          <a:endParaRPr lang="en-GB"/>
+        </a:p>
+      </dgm:t>
+    </dgm:pt>
+    <dgm:pt modelId="{E6693980-67ED-3A45-AC68-462E03F41108}" type="pres">
+      <dgm:prSet presAssocID="{B97148FC-8022-4E41-90BF-3A26D1D8E529}" presName="cycle" presStyleCnt="0">
+        <dgm:presLayoutVars>
+          <dgm:dir/>
+          <dgm:resizeHandles val="exact"/>
+        </dgm:presLayoutVars>
+      </dgm:prSet>
+      <dgm:spPr/>
+    </dgm:pt>
+    <dgm:pt modelId="{B513119F-EF57-CC4D-B321-5389838214AA}" type="pres">
+      <dgm:prSet presAssocID="{3DAD6F9E-42C4-9C4C-9CBF-4BFD5A74CD4E}" presName="node" presStyleLbl="node1" presStyleIdx="0" presStyleCnt="6">
+        <dgm:presLayoutVars>
+          <dgm:bulletEnabled val="1"/>
+        </dgm:presLayoutVars>
+      </dgm:prSet>
+      <dgm:spPr/>
+    </dgm:pt>
+    <dgm:pt modelId="{3F37B7B6-ECE0-D949-B612-345EBC33CF99}" type="pres">
+      <dgm:prSet presAssocID="{3DAD6F9E-42C4-9C4C-9CBF-4BFD5A74CD4E}" presName="spNode" presStyleCnt="0"/>
+      <dgm:spPr/>
+    </dgm:pt>
+    <dgm:pt modelId="{64234121-9420-6E4B-9813-FE7CDCFF06CC}" type="pres">
+      <dgm:prSet presAssocID="{E7C3FA4C-E972-3D43-87CC-FEED9075893B}" presName="sibTrans" presStyleLbl="sibTrans1D1" presStyleIdx="0" presStyleCnt="6"/>
+      <dgm:spPr/>
+    </dgm:pt>
+    <dgm:pt modelId="{F55F4D2D-C738-B64A-8FCE-D2EE61193C80}" type="pres">
+      <dgm:prSet presAssocID="{DBCCD44D-8FA5-4745-BDD7-D1B4B5994643}" presName="node" presStyleLbl="node1" presStyleIdx="1" presStyleCnt="6">
+        <dgm:presLayoutVars>
+          <dgm:bulletEnabled val="1"/>
+        </dgm:presLayoutVars>
+      </dgm:prSet>
+      <dgm:spPr/>
+    </dgm:pt>
+    <dgm:pt modelId="{96E26667-A3E9-394C-A4DE-AD4C3670BE18}" type="pres">
+      <dgm:prSet presAssocID="{DBCCD44D-8FA5-4745-BDD7-D1B4B5994643}" presName="spNode" presStyleCnt="0"/>
+      <dgm:spPr/>
+    </dgm:pt>
+    <dgm:pt modelId="{351EC126-16D9-3F44-8792-574690044FAD}" type="pres">
+      <dgm:prSet presAssocID="{E06B33AC-3350-6A47-A563-EA9F91B33095}" presName="sibTrans" presStyleLbl="sibTrans1D1" presStyleIdx="1" presStyleCnt="6"/>
+      <dgm:spPr/>
+    </dgm:pt>
+    <dgm:pt modelId="{393E29D0-504D-1C4C-AFCF-16ACBE48BF82}" type="pres">
+      <dgm:prSet presAssocID="{51604D7E-B1CE-4A4E-A7A1-0CB05BADDC77}" presName="node" presStyleLbl="node1" presStyleIdx="2" presStyleCnt="6">
+        <dgm:presLayoutVars>
+          <dgm:bulletEnabled val="1"/>
+        </dgm:presLayoutVars>
+      </dgm:prSet>
+      <dgm:spPr/>
+    </dgm:pt>
+    <dgm:pt modelId="{13C6419D-BAAB-9F41-9BE7-3744E6FAD355}" type="pres">
+      <dgm:prSet presAssocID="{51604D7E-B1CE-4A4E-A7A1-0CB05BADDC77}" presName="spNode" presStyleCnt="0"/>
+      <dgm:spPr/>
+    </dgm:pt>
+    <dgm:pt modelId="{2BA852DD-3CFA-DD4F-BAF2-A10FB3275BF2}" type="pres">
+      <dgm:prSet presAssocID="{471C13BE-B2A6-514C-9302-17C35D76F71A}" presName="sibTrans" presStyleLbl="sibTrans1D1" presStyleIdx="2" presStyleCnt="6"/>
+      <dgm:spPr/>
+    </dgm:pt>
+    <dgm:pt modelId="{E4496E0D-FD86-7844-89A1-3C1D3AC747AA}" type="pres">
+      <dgm:prSet presAssocID="{15D52097-5850-A642-A977-0348AA2963FA}" presName="node" presStyleLbl="node1" presStyleIdx="3" presStyleCnt="6">
+        <dgm:presLayoutVars>
+          <dgm:bulletEnabled val="1"/>
+        </dgm:presLayoutVars>
+      </dgm:prSet>
+      <dgm:spPr/>
+    </dgm:pt>
+    <dgm:pt modelId="{63B7EE1E-FA48-714E-AA65-95105242BA19}" type="pres">
+      <dgm:prSet presAssocID="{15D52097-5850-A642-A977-0348AA2963FA}" presName="spNode" presStyleCnt="0"/>
+      <dgm:spPr/>
+    </dgm:pt>
+    <dgm:pt modelId="{248590C3-C8E7-5443-BFDD-2A8D52788C5D}" type="pres">
+      <dgm:prSet presAssocID="{C123C68C-6D48-B841-9BD5-3D529B83B9D4}" presName="sibTrans" presStyleLbl="sibTrans1D1" presStyleIdx="3" presStyleCnt="6"/>
+      <dgm:spPr/>
+    </dgm:pt>
+    <dgm:pt modelId="{C9FEBAAD-D528-EE40-B0E0-23E4A0043BE8}" type="pres">
+      <dgm:prSet presAssocID="{8DB640C8-4593-0440-BE91-A4C826E5650F}" presName="node" presStyleLbl="node1" presStyleIdx="4" presStyleCnt="6">
+        <dgm:presLayoutVars>
+          <dgm:bulletEnabled val="1"/>
+        </dgm:presLayoutVars>
+      </dgm:prSet>
+      <dgm:spPr/>
+    </dgm:pt>
+    <dgm:pt modelId="{DC386814-EE5B-F844-B86C-E3C386A97265}" type="pres">
+      <dgm:prSet presAssocID="{8DB640C8-4593-0440-BE91-A4C826E5650F}" presName="spNode" presStyleCnt="0"/>
+      <dgm:spPr/>
+    </dgm:pt>
+    <dgm:pt modelId="{767246D9-AD61-784C-B10D-4948D0B82340}" type="pres">
+      <dgm:prSet presAssocID="{4AE7C4B4-A10E-C644-9777-7BF73F80F40A}" presName="sibTrans" presStyleLbl="sibTrans1D1" presStyleIdx="4" presStyleCnt="6"/>
+      <dgm:spPr/>
+    </dgm:pt>
+    <dgm:pt modelId="{FF196E73-934D-9442-87C0-3038C52A66E9}" type="pres">
+      <dgm:prSet presAssocID="{FA798CD4-4D65-B045-9270-A196157B8BCB}" presName="node" presStyleLbl="node1" presStyleIdx="5" presStyleCnt="6">
+        <dgm:presLayoutVars>
+          <dgm:bulletEnabled val="1"/>
+        </dgm:presLayoutVars>
+      </dgm:prSet>
+      <dgm:spPr/>
+    </dgm:pt>
+    <dgm:pt modelId="{FEC5D680-F1B3-E245-8544-58FB311D4D0E}" type="pres">
+      <dgm:prSet presAssocID="{FA798CD4-4D65-B045-9270-A196157B8BCB}" presName="spNode" presStyleCnt="0"/>
+      <dgm:spPr/>
+    </dgm:pt>
+    <dgm:pt modelId="{C23323CF-63B9-4A4A-819C-42397A90D8DD}" type="pres">
+      <dgm:prSet presAssocID="{E16B1802-228F-014F-9533-ECFBE83229A2}" presName="sibTrans" presStyleLbl="sibTrans1D1" presStyleIdx="5" presStyleCnt="6"/>
+      <dgm:spPr/>
+    </dgm:pt>
+  </dgm:ptLst>
+  <dgm:cxnLst>
+    <dgm:cxn modelId="{45E9D908-CA39-DC4D-BB49-FE15BB3D3B77}" srcId="{B97148FC-8022-4E41-90BF-3A26D1D8E529}" destId="{51604D7E-B1CE-4A4E-A7A1-0CB05BADDC77}" srcOrd="2" destOrd="0" parTransId="{AA24F77B-D71B-2D4F-8E5D-8BF14ACFB230}" sibTransId="{471C13BE-B2A6-514C-9302-17C35D76F71A}"/>
+    <dgm:cxn modelId="{2CF3450B-432F-CE40-A5DD-0AF5D7C13951}" type="presOf" srcId="{15D52097-5850-A642-A977-0348AA2963FA}" destId="{E4496E0D-FD86-7844-89A1-3C1D3AC747AA}" srcOrd="0" destOrd="0" presId="urn:microsoft.com/office/officeart/2005/8/layout/cycle5"/>
+    <dgm:cxn modelId="{2692FF34-354E-9646-92F8-973336C22353}" srcId="{B97148FC-8022-4E41-90BF-3A26D1D8E529}" destId="{8DB640C8-4593-0440-BE91-A4C826E5650F}" srcOrd="4" destOrd="0" parTransId="{44B0A483-2303-DA42-BD1F-8FDC220D2F06}" sibTransId="{4AE7C4B4-A10E-C644-9777-7BF73F80F40A}"/>
+    <dgm:cxn modelId="{B3BECD4A-D9FF-AE4E-AEAC-1D48955E1AAE}" type="presOf" srcId="{51604D7E-B1CE-4A4E-A7A1-0CB05BADDC77}" destId="{393E29D0-504D-1C4C-AFCF-16ACBE48BF82}" srcOrd="0" destOrd="0" presId="urn:microsoft.com/office/officeart/2005/8/layout/cycle5"/>
+    <dgm:cxn modelId="{F175A150-D7DA-A246-BE39-64FFC520C555}" srcId="{B97148FC-8022-4E41-90BF-3A26D1D8E529}" destId="{DBCCD44D-8FA5-4745-BDD7-D1B4B5994643}" srcOrd="1" destOrd="0" parTransId="{9083FE28-FE83-E148-B4E4-81989D158B4E}" sibTransId="{E06B33AC-3350-6A47-A563-EA9F91B33095}"/>
+    <dgm:cxn modelId="{662F2F55-46A7-BD45-9029-109355C46F43}" type="presOf" srcId="{C123C68C-6D48-B841-9BD5-3D529B83B9D4}" destId="{248590C3-C8E7-5443-BFDD-2A8D52788C5D}" srcOrd="0" destOrd="0" presId="urn:microsoft.com/office/officeart/2005/8/layout/cycle5"/>
+    <dgm:cxn modelId="{2986DC56-3699-844A-9D18-C45F3FCF59F3}" type="presOf" srcId="{DBCCD44D-8FA5-4745-BDD7-D1B4B5994643}" destId="{F55F4D2D-C738-B64A-8FCE-D2EE61193C80}" srcOrd="0" destOrd="0" presId="urn:microsoft.com/office/officeart/2005/8/layout/cycle5"/>
+    <dgm:cxn modelId="{F37C8958-FF41-5347-922D-2C2A29C1F032}" type="presOf" srcId="{8DB640C8-4593-0440-BE91-A4C826E5650F}" destId="{C9FEBAAD-D528-EE40-B0E0-23E4A0043BE8}" srcOrd="0" destOrd="0" presId="urn:microsoft.com/office/officeart/2005/8/layout/cycle5"/>
+    <dgm:cxn modelId="{1BF33975-D3DE-8E44-B787-90F1F5653375}" type="presOf" srcId="{FA798CD4-4D65-B045-9270-A196157B8BCB}" destId="{FF196E73-934D-9442-87C0-3038C52A66E9}" srcOrd="0" destOrd="0" presId="urn:microsoft.com/office/officeart/2005/8/layout/cycle5"/>
+    <dgm:cxn modelId="{8CD95589-9396-304B-A360-259C3CF3D00D}" srcId="{B97148FC-8022-4E41-90BF-3A26D1D8E529}" destId="{3DAD6F9E-42C4-9C4C-9CBF-4BFD5A74CD4E}" srcOrd="0" destOrd="0" parTransId="{50CD3392-183E-8647-9173-C2507C854A21}" sibTransId="{E7C3FA4C-E972-3D43-87CC-FEED9075893B}"/>
+    <dgm:cxn modelId="{7178D791-6841-CE48-864F-D4BACCF7BE29}" type="presOf" srcId="{471C13BE-B2A6-514C-9302-17C35D76F71A}" destId="{2BA852DD-3CFA-DD4F-BAF2-A10FB3275BF2}" srcOrd="0" destOrd="0" presId="urn:microsoft.com/office/officeart/2005/8/layout/cycle5"/>
+    <dgm:cxn modelId="{BC267897-282A-A247-ABA7-9DA2D488DC62}" srcId="{B97148FC-8022-4E41-90BF-3A26D1D8E529}" destId="{FA798CD4-4D65-B045-9270-A196157B8BCB}" srcOrd="5" destOrd="0" parTransId="{28F3D07C-434C-524B-8370-7A0CA5EC74E6}" sibTransId="{E16B1802-228F-014F-9533-ECFBE83229A2}"/>
+    <dgm:cxn modelId="{638460A1-37B6-B445-8B4B-23A61F25444B}" type="presOf" srcId="{3DAD6F9E-42C4-9C4C-9CBF-4BFD5A74CD4E}" destId="{B513119F-EF57-CC4D-B321-5389838214AA}" srcOrd="0" destOrd="0" presId="urn:microsoft.com/office/officeart/2005/8/layout/cycle5"/>
+    <dgm:cxn modelId="{C18A34BC-F959-814C-8CC2-7EE4760C828E}" type="presOf" srcId="{E06B33AC-3350-6A47-A563-EA9F91B33095}" destId="{351EC126-16D9-3F44-8792-574690044FAD}" srcOrd="0" destOrd="0" presId="urn:microsoft.com/office/officeart/2005/8/layout/cycle5"/>
+    <dgm:cxn modelId="{5D1C47BC-B2D2-BB4E-87FB-94D34273A144}" type="presOf" srcId="{4AE7C4B4-A10E-C644-9777-7BF73F80F40A}" destId="{767246D9-AD61-784C-B10D-4948D0B82340}" srcOrd="0" destOrd="0" presId="urn:microsoft.com/office/officeart/2005/8/layout/cycle5"/>
+    <dgm:cxn modelId="{EFB800D5-E05C-F54B-A180-BCC3CE232150}" type="presOf" srcId="{E16B1802-228F-014F-9533-ECFBE83229A2}" destId="{C23323CF-63B9-4A4A-819C-42397A90D8DD}" srcOrd="0" destOrd="0" presId="urn:microsoft.com/office/officeart/2005/8/layout/cycle5"/>
+    <dgm:cxn modelId="{787CB9DC-4BF8-214F-8127-61684B5342CD}" srcId="{B97148FC-8022-4E41-90BF-3A26D1D8E529}" destId="{15D52097-5850-A642-A977-0348AA2963FA}" srcOrd="3" destOrd="0" parTransId="{26FCF447-A234-7043-8666-AC6B823E9329}" sibTransId="{C123C68C-6D48-B841-9BD5-3D529B83B9D4}"/>
+    <dgm:cxn modelId="{F7945DDD-52BD-9248-914F-1DCA7C4A3475}" type="presOf" srcId="{B97148FC-8022-4E41-90BF-3A26D1D8E529}" destId="{E6693980-67ED-3A45-AC68-462E03F41108}" srcOrd="0" destOrd="0" presId="urn:microsoft.com/office/officeart/2005/8/layout/cycle5"/>
+    <dgm:cxn modelId="{2B1DEEEA-F500-2B43-B4F5-F758D83FE481}" type="presOf" srcId="{E7C3FA4C-E972-3D43-87CC-FEED9075893B}" destId="{64234121-9420-6E4B-9813-FE7CDCFF06CC}" srcOrd="0" destOrd="0" presId="urn:microsoft.com/office/officeart/2005/8/layout/cycle5"/>
+    <dgm:cxn modelId="{8367C414-3EA9-1F43-B376-AB367A04C682}" type="presParOf" srcId="{E6693980-67ED-3A45-AC68-462E03F41108}" destId="{B513119F-EF57-CC4D-B321-5389838214AA}" srcOrd="0" destOrd="0" presId="urn:microsoft.com/office/officeart/2005/8/layout/cycle5"/>
+    <dgm:cxn modelId="{89686604-84D4-8C46-94C7-90E3E4EFDF0F}" type="presParOf" srcId="{E6693980-67ED-3A45-AC68-462E03F41108}" destId="{3F37B7B6-ECE0-D949-B612-345EBC33CF99}" srcOrd="1" destOrd="0" presId="urn:microsoft.com/office/officeart/2005/8/layout/cycle5"/>
+    <dgm:cxn modelId="{5860F6E3-D2AF-0C48-903F-0993FFE507B0}" type="presParOf" srcId="{E6693980-67ED-3A45-AC68-462E03F41108}" destId="{64234121-9420-6E4B-9813-FE7CDCFF06CC}" srcOrd="2" destOrd="0" presId="urn:microsoft.com/office/officeart/2005/8/layout/cycle5"/>
+    <dgm:cxn modelId="{7C45C476-E23C-034A-9AFF-855A194BDBF4}" type="presParOf" srcId="{E6693980-67ED-3A45-AC68-462E03F41108}" destId="{F55F4D2D-C738-B64A-8FCE-D2EE61193C80}" srcOrd="3" destOrd="0" presId="urn:microsoft.com/office/officeart/2005/8/layout/cycle5"/>
+    <dgm:cxn modelId="{D7D54A14-C74E-984F-877B-5A1E09194794}" type="presParOf" srcId="{E6693980-67ED-3A45-AC68-462E03F41108}" destId="{96E26667-A3E9-394C-A4DE-AD4C3670BE18}" srcOrd="4" destOrd="0" presId="urn:microsoft.com/office/officeart/2005/8/layout/cycle5"/>
+    <dgm:cxn modelId="{7CD712E4-F2D4-EF44-AC75-70F2DF245C01}" type="presParOf" srcId="{E6693980-67ED-3A45-AC68-462E03F41108}" destId="{351EC126-16D9-3F44-8792-574690044FAD}" srcOrd="5" destOrd="0" presId="urn:microsoft.com/office/officeart/2005/8/layout/cycle5"/>
+    <dgm:cxn modelId="{2DB88A26-F394-5740-BEB3-341DE03C2952}" type="presParOf" srcId="{E6693980-67ED-3A45-AC68-462E03F41108}" destId="{393E29D0-504D-1C4C-AFCF-16ACBE48BF82}" srcOrd="6" destOrd="0" presId="urn:microsoft.com/office/officeart/2005/8/layout/cycle5"/>
+    <dgm:cxn modelId="{26745DB4-B033-684A-9BB0-EAB2714D9E9A}" type="presParOf" srcId="{E6693980-67ED-3A45-AC68-462E03F41108}" destId="{13C6419D-BAAB-9F41-9BE7-3744E6FAD355}" srcOrd="7" destOrd="0" presId="urn:microsoft.com/office/officeart/2005/8/layout/cycle5"/>
+    <dgm:cxn modelId="{08290314-84DC-684B-AFDC-E7A978BFAA22}" type="presParOf" srcId="{E6693980-67ED-3A45-AC68-462E03F41108}" destId="{2BA852DD-3CFA-DD4F-BAF2-A10FB3275BF2}" srcOrd="8" destOrd="0" presId="urn:microsoft.com/office/officeart/2005/8/layout/cycle5"/>
+    <dgm:cxn modelId="{196D0643-EF98-3041-A941-528EA4F6C5D0}" type="presParOf" srcId="{E6693980-67ED-3A45-AC68-462E03F41108}" destId="{E4496E0D-FD86-7844-89A1-3C1D3AC747AA}" srcOrd="9" destOrd="0" presId="urn:microsoft.com/office/officeart/2005/8/layout/cycle5"/>
+    <dgm:cxn modelId="{67B2DCE5-DBA3-DE42-8D11-11C6344BD93C}" type="presParOf" srcId="{E6693980-67ED-3A45-AC68-462E03F41108}" destId="{63B7EE1E-FA48-714E-AA65-95105242BA19}" srcOrd="10" destOrd="0" presId="urn:microsoft.com/office/officeart/2005/8/layout/cycle5"/>
+    <dgm:cxn modelId="{978AB307-5A37-9147-AC2D-0432D8FCC43D}" type="presParOf" srcId="{E6693980-67ED-3A45-AC68-462E03F41108}" destId="{248590C3-C8E7-5443-BFDD-2A8D52788C5D}" srcOrd="11" destOrd="0" presId="urn:microsoft.com/office/officeart/2005/8/layout/cycle5"/>
+    <dgm:cxn modelId="{4F0152F5-E1E7-2041-BA11-B688EFF1EEB8}" type="presParOf" srcId="{E6693980-67ED-3A45-AC68-462E03F41108}" destId="{C9FEBAAD-D528-EE40-B0E0-23E4A0043BE8}" srcOrd="12" destOrd="0" presId="urn:microsoft.com/office/officeart/2005/8/layout/cycle5"/>
+    <dgm:cxn modelId="{853ADFA0-FA32-0B4D-A685-BA7E1B9E11D1}" type="presParOf" srcId="{E6693980-67ED-3A45-AC68-462E03F41108}" destId="{DC386814-EE5B-F844-B86C-E3C386A97265}" srcOrd="13" destOrd="0" presId="urn:microsoft.com/office/officeart/2005/8/layout/cycle5"/>
+    <dgm:cxn modelId="{43DFB218-45F9-3D48-A0B6-85A51F97F584}" type="presParOf" srcId="{E6693980-67ED-3A45-AC68-462E03F41108}" destId="{767246D9-AD61-784C-B10D-4948D0B82340}" srcOrd="14" destOrd="0" presId="urn:microsoft.com/office/officeart/2005/8/layout/cycle5"/>
+    <dgm:cxn modelId="{57B1BC8F-578D-6C41-8501-3EE015B759B3}" type="presParOf" srcId="{E6693980-67ED-3A45-AC68-462E03F41108}" destId="{FF196E73-934D-9442-87C0-3038C52A66E9}" srcOrd="15" destOrd="0" presId="urn:microsoft.com/office/officeart/2005/8/layout/cycle5"/>
+    <dgm:cxn modelId="{F5F166E6-67B2-554F-9821-4112F3FC0254}" type="presParOf" srcId="{E6693980-67ED-3A45-AC68-462E03F41108}" destId="{FEC5D680-F1B3-E245-8544-58FB311D4D0E}" srcOrd="16" destOrd="0" presId="urn:microsoft.com/office/officeart/2005/8/layout/cycle5"/>
+    <dgm:cxn modelId="{31267A82-4A90-8D45-AE9C-2B5BE39CBD1D}" type="presParOf" srcId="{E6693980-67ED-3A45-AC68-462E03F41108}" destId="{C23323CF-63B9-4A4A-819C-42397A90D8DD}" srcOrd="17" destOrd="0" presId="urn:microsoft.com/office/officeart/2005/8/layout/cycle5"/>
+  </dgm:cxnLst>
+  <dgm:bg/>
+  <dgm:whole/>
+  <dgm:extLst>
+    <a:ext uri="http://schemas.microsoft.com/office/drawing/2008/diagram">
+      <dsp:dataModelExt xmlns:dsp="http://schemas.microsoft.com/office/drawing/2008/diagram" relId="rId7" minVer="http://schemas.openxmlformats.org/drawingml/2006/diagram"/>
+    </a:ext>
+  </dgm:extLst>
+</dgm:dataModel>
+</file>
+
+<file path=ppt/diagrams/data2.xml><?xml version="1.0" encoding="utf-8"?>
 <dgm:dataModel xmlns:dgm="http://schemas.openxmlformats.org/drawingml/2006/diagram" xmlns:a="http://schemas.openxmlformats.org/drawingml/2006/main">
   <dgm:ptLst>
     <dgm:pt modelId="{5B90D19C-A642-416F-B1F2-AE25B3F402D9}" type="doc">
@@ -3013,421 +3428,6 @@
 </dgm:dataModel>
 </file>
 
-<file path=ppt/diagrams/data2.xml><?xml version="1.0" encoding="utf-8"?>
-<dgm:dataModel xmlns:dgm="http://schemas.openxmlformats.org/drawingml/2006/diagram" xmlns:a="http://schemas.openxmlformats.org/drawingml/2006/main">
-  <dgm:ptLst>
-    <dgm:pt modelId="{B97148FC-8022-4E41-90BF-3A26D1D8E529}" type="doc">
-      <dgm:prSet loTypeId="urn:microsoft.com/office/officeart/2005/8/layout/cycle5" loCatId="" qsTypeId="urn:microsoft.com/office/officeart/2005/8/quickstyle/simple1" qsCatId="simple" csTypeId="urn:microsoft.com/office/officeart/2005/8/colors/accent1_2" csCatId="accent1" phldr="1"/>
-      <dgm:spPr/>
-      <dgm:t>
-        <a:bodyPr/>
-        <a:lstStyle/>
-        <a:p>
-          <a:endParaRPr lang="en-GB"/>
-        </a:p>
-      </dgm:t>
-    </dgm:pt>
-    <dgm:pt modelId="{3DAD6F9E-42C4-9C4C-9CBF-4BFD5A74CD4E}">
-      <dgm:prSet phldrT="[Text]"/>
-      <dgm:spPr>
-        <a:solidFill>
-          <a:schemeClr val="accent3"/>
-        </a:solidFill>
-      </dgm:spPr>
-      <dgm:t>
-        <a:bodyPr/>
-        <a:lstStyle/>
-        <a:p>
-          <a:r>
-            <a:rPr lang="en-GB" dirty="0"/>
-            <a:t>Requirement</a:t>
-          </a:r>
-        </a:p>
-      </dgm:t>
-    </dgm:pt>
-    <dgm:pt modelId="{50CD3392-183E-8647-9173-C2507C854A21}" type="parTrans" cxnId="{8CD95589-9396-304B-A360-259C3CF3D00D}">
-      <dgm:prSet/>
-      <dgm:spPr/>
-      <dgm:t>
-        <a:bodyPr/>
-        <a:lstStyle/>
-        <a:p>
-          <a:endParaRPr lang="en-GB"/>
-        </a:p>
-      </dgm:t>
-    </dgm:pt>
-    <dgm:pt modelId="{E7C3FA4C-E972-3D43-87CC-FEED9075893B}" type="sibTrans" cxnId="{8CD95589-9396-304B-A360-259C3CF3D00D}">
-      <dgm:prSet/>
-      <dgm:spPr/>
-      <dgm:t>
-        <a:bodyPr/>
-        <a:lstStyle/>
-        <a:p>
-          <a:endParaRPr lang="en-GB"/>
-        </a:p>
-      </dgm:t>
-    </dgm:pt>
-    <dgm:pt modelId="{DBCCD44D-8FA5-4745-BDD7-D1B4B5994643}">
-      <dgm:prSet phldrT="[Text]"/>
-      <dgm:spPr>
-        <a:solidFill>
-          <a:schemeClr val="accent3"/>
-        </a:solidFill>
-      </dgm:spPr>
-      <dgm:t>
-        <a:bodyPr/>
-        <a:lstStyle/>
-        <a:p>
-          <a:r>
-            <a:rPr lang="en-GB" dirty="0"/>
-            <a:t>Design</a:t>
-          </a:r>
-        </a:p>
-      </dgm:t>
-    </dgm:pt>
-    <dgm:pt modelId="{9083FE28-FE83-E148-B4E4-81989D158B4E}" type="parTrans" cxnId="{F175A150-D7DA-A246-BE39-64FFC520C555}">
-      <dgm:prSet/>
-      <dgm:spPr/>
-      <dgm:t>
-        <a:bodyPr/>
-        <a:lstStyle/>
-        <a:p>
-          <a:endParaRPr lang="en-GB"/>
-        </a:p>
-      </dgm:t>
-    </dgm:pt>
-    <dgm:pt modelId="{E06B33AC-3350-6A47-A563-EA9F91B33095}" type="sibTrans" cxnId="{F175A150-D7DA-A246-BE39-64FFC520C555}">
-      <dgm:prSet/>
-      <dgm:spPr/>
-      <dgm:t>
-        <a:bodyPr/>
-        <a:lstStyle/>
-        <a:p>
-          <a:endParaRPr lang="en-GB"/>
-        </a:p>
-      </dgm:t>
-    </dgm:pt>
-    <dgm:pt modelId="{51604D7E-B1CE-4A4E-A7A1-0CB05BADDC77}">
-      <dgm:prSet phldrT="[Text]"/>
-      <dgm:spPr>
-        <a:solidFill>
-          <a:schemeClr val="bg2">
-            <a:lumMod val="75000"/>
-          </a:schemeClr>
-        </a:solidFill>
-      </dgm:spPr>
-      <dgm:t>
-        <a:bodyPr/>
-        <a:lstStyle/>
-        <a:p>
-          <a:r>
-            <a:rPr lang="en-GB" dirty="0"/>
-            <a:t>Implementation</a:t>
-          </a:r>
-        </a:p>
-      </dgm:t>
-    </dgm:pt>
-    <dgm:pt modelId="{AA24F77B-D71B-2D4F-8E5D-8BF14ACFB230}" type="parTrans" cxnId="{45E9D908-CA39-DC4D-BB49-FE15BB3D3B77}">
-      <dgm:prSet/>
-      <dgm:spPr/>
-      <dgm:t>
-        <a:bodyPr/>
-        <a:lstStyle/>
-        <a:p>
-          <a:endParaRPr lang="en-GB"/>
-        </a:p>
-      </dgm:t>
-    </dgm:pt>
-    <dgm:pt modelId="{471C13BE-B2A6-514C-9302-17C35D76F71A}" type="sibTrans" cxnId="{45E9D908-CA39-DC4D-BB49-FE15BB3D3B77}">
-      <dgm:prSet/>
-      <dgm:spPr/>
-      <dgm:t>
-        <a:bodyPr/>
-        <a:lstStyle/>
-        <a:p>
-          <a:endParaRPr lang="en-GB"/>
-        </a:p>
-      </dgm:t>
-    </dgm:pt>
-    <dgm:pt modelId="{15D52097-5850-A642-A977-0348AA2963FA}">
-      <dgm:prSet phldrT="[Text]"/>
-      <dgm:spPr>
-        <a:solidFill>
-          <a:schemeClr val="bg2">
-            <a:lumMod val="75000"/>
-          </a:schemeClr>
-        </a:solidFill>
-      </dgm:spPr>
-      <dgm:t>
-        <a:bodyPr/>
-        <a:lstStyle/>
-        <a:p>
-          <a:r>
-            <a:rPr lang="en-GB" dirty="0"/>
-            <a:t>Testing</a:t>
-          </a:r>
-        </a:p>
-      </dgm:t>
-    </dgm:pt>
-    <dgm:pt modelId="{26FCF447-A234-7043-8666-AC6B823E9329}" type="parTrans" cxnId="{787CB9DC-4BF8-214F-8127-61684B5342CD}">
-      <dgm:prSet/>
-      <dgm:spPr/>
-      <dgm:t>
-        <a:bodyPr/>
-        <a:lstStyle/>
-        <a:p>
-          <a:endParaRPr lang="en-GB"/>
-        </a:p>
-      </dgm:t>
-    </dgm:pt>
-    <dgm:pt modelId="{C123C68C-6D48-B841-9BD5-3D529B83B9D4}" type="sibTrans" cxnId="{787CB9DC-4BF8-214F-8127-61684B5342CD}">
-      <dgm:prSet/>
-      <dgm:spPr/>
-      <dgm:t>
-        <a:bodyPr/>
-        <a:lstStyle/>
-        <a:p>
-          <a:endParaRPr lang="en-GB"/>
-        </a:p>
-      </dgm:t>
-    </dgm:pt>
-    <dgm:pt modelId="{8DB640C8-4593-0440-BE91-A4C826E5650F}">
-      <dgm:prSet phldrT="[Text]"/>
-      <dgm:spPr>
-        <a:solidFill>
-          <a:schemeClr val="bg2">
-            <a:lumMod val="75000"/>
-          </a:schemeClr>
-        </a:solidFill>
-      </dgm:spPr>
-      <dgm:t>
-        <a:bodyPr/>
-        <a:lstStyle/>
-        <a:p>
-          <a:r>
-            <a:rPr lang="en-GB" dirty="0"/>
-            <a:t>Integration</a:t>
-          </a:r>
-        </a:p>
-      </dgm:t>
-    </dgm:pt>
-    <dgm:pt modelId="{44B0A483-2303-DA42-BD1F-8FDC220D2F06}" type="parTrans" cxnId="{2692FF34-354E-9646-92F8-973336C22353}">
-      <dgm:prSet/>
-      <dgm:spPr/>
-      <dgm:t>
-        <a:bodyPr/>
-        <a:lstStyle/>
-        <a:p>
-          <a:endParaRPr lang="en-GB"/>
-        </a:p>
-      </dgm:t>
-    </dgm:pt>
-    <dgm:pt modelId="{4AE7C4B4-A10E-C644-9777-7BF73F80F40A}" type="sibTrans" cxnId="{2692FF34-354E-9646-92F8-973336C22353}">
-      <dgm:prSet/>
-      <dgm:spPr/>
-      <dgm:t>
-        <a:bodyPr/>
-        <a:lstStyle/>
-        <a:p>
-          <a:endParaRPr lang="en-GB"/>
-        </a:p>
-      </dgm:t>
-    </dgm:pt>
-    <dgm:pt modelId="{FA798CD4-4D65-B045-9270-A196157B8BCB}">
-      <dgm:prSet phldrT="[Text]"/>
-      <dgm:spPr>
-        <a:solidFill>
-          <a:schemeClr val="accent2"/>
-        </a:solidFill>
-      </dgm:spPr>
-      <dgm:t>
-        <a:bodyPr/>
-        <a:lstStyle/>
-        <a:p>
-          <a:r>
-            <a:rPr lang="en-GB" dirty="0"/>
-            <a:t>Maintenance</a:t>
-          </a:r>
-        </a:p>
-      </dgm:t>
-    </dgm:pt>
-    <dgm:pt modelId="{28F3D07C-434C-524B-8370-7A0CA5EC74E6}" type="parTrans" cxnId="{BC267897-282A-A247-ABA7-9DA2D488DC62}">
-      <dgm:prSet/>
-      <dgm:spPr/>
-      <dgm:t>
-        <a:bodyPr/>
-        <a:lstStyle/>
-        <a:p>
-          <a:endParaRPr lang="en-GB"/>
-        </a:p>
-      </dgm:t>
-    </dgm:pt>
-    <dgm:pt modelId="{E16B1802-228F-014F-9533-ECFBE83229A2}" type="sibTrans" cxnId="{BC267897-282A-A247-ABA7-9DA2D488DC62}">
-      <dgm:prSet/>
-      <dgm:spPr/>
-      <dgm:t>
-        <a:bodyPr/>
-        <a:lstStyle/>
-        <a:p>
-          <a:endParaRPr lang="en-GB"/>
-        </a:p>
-      </dgm:t>
-    </dgm:pt>
-    <dgm:pt modelId="{E6693980-67ED-3A45-AC68-462E03F41108}" type="pres">
-      <dgm:prSet presAssocID="{B97148FC-8022-4E41-90BF-3A26D1D8E529}" presName="cycle" presStyleCnt="0">
-        <dgm:presLayoutVars>
-          <dgm:dir/>
-          <dgm:resizeHandles val="exact"/>
-        </dgm:presLayoutVars>
-      </dgm:prSet>
-      <dgm:spPr/>
-    </dgm:pt>
-    <dgm:pt modelId="{B513119F-EF57-CC4D-B321-5389838214AA}" type="pres">
-      <dgm:prSet presAssocID="{3DAD6F9E-42C4-9C4C-9CBF-4BFD5A74CD4E}" presName="node" presStyleLbl="node1" presStyleIdx="0" presStyleCnt="6">
-        <dgm:presLayoutVars>
-          <dgm:bulletEnabled val="1"/>
-        </dgm:presLayoutVars>
-      </dgm:prSet>
-      <dgm:spPr/>
-    </dgm:pt>
-    <dgm:pt modelId="{3F37B7B6-ECE0-D949-B612-345EBC33CF99}" type="pres">
-      <dgm:prSet presAssocID="{3DAD6F9E-42C4-9C4C-9CBF-4BFD5A74CD4E}" presName="spNode" presStyleCnt="0"/>
-      <dgm:spPr/>
-    </dgm:pt>
-    <dgm:pt modelId="{64234121-9420-6E4B-9813-FE7CDCFF06CC}" type="pres">
-      <dgm:prSet presAssocID="{E7C3FA4C-E972-3D43-87CC-FEED9075893B}" presName="sibTrans" presStyleLbl="sibTrans1D1" presStyleIdx="0" presStyleCnt="6"/>
-      <dgm:spPr/>
-    </dgm:pt>
-    <dgm:pt modelId="{F55F4D2D-C738-B64A-8FCE-D2EE61193C80}" type="pres">
-      <dgm:prSet presAssocID="{DBCCD44D-8FA5-4745-BDD7-D1B4B5994643}" presName="node" presStyleLbl="node1" presStyleIdx="1" presStyleCnt="6">
-        <dgm:presLayoutVars>
-          <dgm:bulletEnabled val="1"/>
-        </dgm:presLayoutVars>
-      </dgm:prSet>
-      <dgm:spPr/>
-    </dgm:pt>
-    <dgm:pt modelId="{96E26667-A3E9-394C-A4DE-AD4C3670BE18}" type="pres">
-      <dgm:prSet presAssocID="{DBCCD44D-8FA5-4745-BDD7-D1B4B5994643}" presName="spNode" presStyleCnt="0"/>
-      <dgm:spPr/>
-    </dgm:pt>
-    <dgm:pt modelId="{351EC126-16D9-3F44-8792-574690044FAD}" type="pres">
-      <dgm:prSet presAssocID="{E06B33AC-3350-6A47-A563-EA9F91B33095}" presName="sibTrans" presStyleLbl="sibTrans1D1" presStyleIdx="1" presStyleCnt="6"/>
-      <dgm:spPr/>
-    </dgm:pt>
-    <dgm:pt modelId="{393E29D0-504D-1C4C-AFCF-16ACBE48BF82}" type="pres">
-      <dgm:prSet presAssocID="{51604D7E-B1CE-4A4E-A7A1-0CB05BADDC77}" presName="node" presStyleLbl="node1" presStyleIdx="2" presStyleCnt="6">
-        <dgm:presLayoutVars>
-          <dgm:bulletEnabled val="1"/>
-        </dgm:presLayoutVars>
-      </dgm:prSet>
-      <dgm:spPr/>
-    </dgm:pt>
-    <dgm:pt modelId="{13C6419D-BAAB-9F41-9BE7-3744E6FAD355}" type="pres">
-      <dgm:prSet presAssocID="{51604D7E-B1CE-4A4E-A7A1-0CB05BADDC77}" presName="spNode" presStyleCnt="0"/>
-      <dgm:spPr/>
-    </dgm:pt>
-    <dgm:pt modelId="{2BA852DD-3CFA-DD4F-BAF2-A10FB3275BF2}" type="pres">
-      <dgm:prSet presAssocID="{471C13BE-B2A6-514C-9302-17C35D76F71A}" presName="sibTrans" presStyleLbl="sibTrans1D1" presStyleIdx="2" presStyleCnt="6"/>
-      <dgm:spPr/>
-    </dgm:pt>
-    <dgm:pt modelId="{E4496E0D-FD86-7844-89A1-3C1D3AC747AA}" type="pres">
-      <dgm:prSet presAssocID="{15D52097-5850-A642-A977-0348AA2963FA}" presName="node" presStyleLbl="node1" presStyleIdx="3" presStyleCnt="6">
-        <dgm:presLayoutVars>
-          <dgm:bulletEnabled val="1"/>
-        </dgm:presLayoutVars>
-      </dgm:prSet>
-      <dgm:spPr/>
-    </dgm:pt>
-    <dgm:pt modelId="{63B7EE1E-FA48-714E-AA65-95105242BA19}" type="pres">
-      <dgm:prSet presAssocID="{15D52097-5850-A642-A977-0348AA2963FA}" presName="spNode" presStyleCnt="0"/>
-      <dgm:spPr/>
-    </dgm:pt>
-    <dgm:pt modelId="{248590C3-C8E7-5443-BFDD-2A8D52788C5D}" type="pres">
-      <dgm:prSet presAssocID="{C123C68C-6D48-B841-9BD5-3D529B83B9D4}" presName="sibTrans" presStyleLbl="sibTrans1D1" presStyleIdx="3" presStyleCnt="6"/>
-      <dgm:spPr/>
-    </dgm:pt>
-    <dgm:pt modelId="{C9FEBAAD-D528-EE40-B0E0-23E4A0043BE8}" type="pres">
-      <dgm:prSet presAssocID="{8DB640C8-4593-0440-BE91-A4C826E5650F}" presName="node" presStyleLbl="node1" presStyleIdx="4" presStyleCnt="6">
-        <dgm:presLayoutVars>
-          <dgm:bulletEnabled val="1"/>
-        </dgm:presLayoutVars>
-      </dgm:prSet>
-      <dgm:spPr/>
-    </dgm:pt>
-    <dgm:pt modelId="{DC386814-EE5B-F844-B86C-E3C386A97265}" type="pres">
-      <dgm:prSet presAssocID="{8DB640C8-4593-0440-BE91-A4C826E5650F}" presName="spNode" presStyleCnt="0"/>
-      <dgm:spPr/>
-    </dgm:pt>
-    <dgm:pt modelId="{767246D9-AD61-784C-B10D-4948D0B82340}" type="pres">
-      <dgm:prSet presAssocID="{4AE7C4B4-A10E-C644-9777-7BF73F80F40A}" presName="sibTrans" presStyleLbl="sibTrans1D1" presStyleIdx="4" presStyleCnt="6"/>
-      <dgm:spPr/>
-    </dgm:pt>
-    <dgm:pt modelId="{FF196E73-934D-9442-87C0-3038C52A66E9}" type="pres">
-      <dgm:prSet presAssocID="{FA798CD4-4D65-B045-9270-A196157B8BCB}" presName="node" presStyleLbl="node1" presStyleIdx="5" presStyleCnt="6">
-        <dgm:presLayoutVars>
-          <dgm:bulletEnabled val="1"/>
-        </dgm:presLayoutVars>
-      </dgm:prSet>
-      <dgm:spPr/>
-    </dgm:pt>
-    <dgm:pt modelId="{FEC5D680-F1B3-E245-8544-58FB311D4D0E}" type="pres">
-      <dgm:prSet presAssocID="{FA798CD4-4D65-B045-9270-A196157B8BCB}" presName="spNode" presStyleCnt="0"/>
-      <dgm:spPr/>
-    </dgm:pt>
-    <dgm:pt modelId="{C23323CF-63B9-4A4A-819C-42397A90D8DD}" type="pres">
-      <dgm:prSet presAssocID="{E16B1802-228F-014F-9533-ECFBE83229A2}" presName="sibTrans" presStyleLbl="sibTrans1D1" presStyleIdx="5" presStyleCnt="6"/>
-      <dgm:spPr/>
-    </dgm:pt>
-  </dgm:ptLst>
-  <dgm:cxnLst>
-    <dgm:cxn modelId="{45E9D908-CA39-DC4D-BB49-FE15BB3D3B77}" srcId="{B97148FC-8022-4E41-90BF-3A26D1D8E529}" destId="{51604D7E-B1CE-4A4E-A7A1-0CB05BADDC77}" srcOrd="2" destOrd="0" parTransId="{AA24F77B-D71B-2D4F-8E5D-8BF14ACFB230}" sibTransId="{471C13BE-B2A6-514C-9302-17C35D76F71A}"/>
-    <dgm:cxn modelId="{2CF3450B-432F-CE40-A5DD-0AF5D7C13951}" type="presOf" srcId="{15D52097-5850-A642-A977-0348AA2963FA}" destId="{E4496E0D-FD86-7844-89A1-3C1D3AC747AA}" srcOrd="0" destOrd="0" presId="urn:microsoft.com/office/officeart/2005/8/layout/cycle5"/>
-    <dgm:cxn modelId="{2692FF34-354E-9646-92F8-973336C22353}" srcId="{B97148FC-8022-4E41-90BF-3A26D1D8E529}" destId="{8DB640C8-4593-0440-BE91-A4C826E5650F}" srcOrd="4" destOrd="0" parTransId="{44B0A483-2303-DA42-BD1F-8FDC220D2F06}" sibTransId="{4AE7C4B4-A10E-C644-9777-7BF73F80F40A}"/>
-    <dgm:cxn modelId="{B3BECD4A-D9FF-AE4E-AEAC-1D48955E1AAE}" type="presOf" srcId="{51604D7E-B1CE-4A4E-A7A1-0CB05BADDC77}" destId="{393E29D0-504D-1C4C-AFCF-16ACBE48BF82}" srcOrd="0" destOrd="0" presId="urn:microsoft.com/office/officeart/2005/8/layout/cycle5"/>
-    <dgm:cxn modelId="{F175A150-D7DA-A246-BE39-64FFC520C555}" srcId="{B97148FC-8022-4E41-90BF-3A26D1D8E529}" destId="{DBCCD44D-8FA5-4745-BDD7-D1B4B5994643}" srcOrd="1" destOrd="0" parTransId="{9083FE28-FE83-E148-B4E4-81989D158B4E}" sibTransId="{E06B33AC-3350-6A47-A563-EA9F91B33095}"/>
-    <dgm:cxn modelId="{662F2F55-46A7-BD45-9029-109355C46F43}" type="presOf" srcId="{C123C68C-6D48-B841-9BD5-3D529B83B9D4}" destId="{248590C3-C8E7-5443-BFDD-2A8D52788C5D}" srcOrd="0" destOrd="0" presId="urn:microsoft.com/office/officeart/2005/8/layout/cycle5"/>
-    <dgm:cxn modelId="{2986DC56-3699-844A-9D18-C45F3FCF59F3}" type="presOf" srcId="{DBCCD44D-8FA5-4745-BDD7-D1B4B5994643}" destId="{F55F4D2D-C738-B64A-8FCE-D2EE61193C80}" srcOrd="0" destOrd="0" presId="urn:microsoft.com/office/officeart/2005/8/layout/cycle5"/>
-    <dgm:cxn modelId="{F37C8958-FF41-5347-922D-2C2A29C1F032}" type="presOf" srcId="{8DB640C8-4593-0440-BE91-A4C826E5650F}" destId="{C9FEBAAD-D528-EE40-B0E0-23E4A0043BE8}" srcOrd="0" destOrd="0" presId="urn:microsoft.com/office/officeart/2005/8/layout/cycle5"/>
-    <dgm:cxn modelId="{1BF33975-D3DE-8E44-B787-90F1F5653375}" type="presOf" srcId="{FA798CD4-4D65-B045-9270-A196157B8BCB}" destId="{FF196E73-934D-9442-87C0-3038C52A66E9}" srcOrd="0" destOrd="0" presId="urn:microsoft.com/office/officeart/2005/8/layout/cycle5"/>
-    <dgm:cxn modelId="{8CD95589-9396-304B-A360-259C3CF3D00D}" srcId="{B97148FC-8022-4E41-90BF-3A26D1D8E529}" destId="{3DAD6F9E-42C4-9C4C-9CBF-4BFD5A74CD4E}" srcOrd="0" destOrd="0" parTransId="{50CD3392-183E-8647-9173-C2507C854A21}" sibTransId="{E7C3FA4C-E972-3D43-87CC-FEED9075893B}"/>
-    <dgm:cxn modelId="{7178D791-6841-CE48-864F-D4BACCF7BE29}" type="presOf" srcId="{471C13BE-B2A6-514C-9302-17C35D76F71A}" destId="{2BA852DD-3CFA-DD4F-BAF2-A10FB3275BF2}" srcOrd="0" destOrd="0" presId="urn:microsoft.com/office/officeart/2005/8/layout/cycle5"/>
-    <dgm:cxn modelId="{BC267897-282A-A247-ABA7-9DA2D488DC62}" srcId="{B97148FC-8022-4E41-90BF-3A26D1D8E529}" destId="{FA798CD4-4D65-B045-9270-A196157B8BCB}" srcOrd="5" destOrd="0" parTransId="{28F3D07C-434C-524B-8370-7A0CA5EC74E6}" sibTransId="{E16B1802-228F-014F-9533-ECFBE83229A2}"/>
-    <dgm:cxn modelId="{638460A1-37B6-B445-8B4B-23A61F25444B}" type="presOf" srcId="{3DAD6F9E-42C4-9C4C-9CBF-4BFD5A74CD4E}" destId="{B513119F-EF57-CC4D-B321-5389838214AA}" srcOrd="0" destOrd="0" presId="urn:microsoft.com/office/officeart/2005/8/layout/cycle5"/>
-    <dgm:cxn modelId="{C18A34BC-F959-814C-8CC2-7EE4760C828E}" type="presOf" srcId="{E06B33AC-3350-6A47-A563-EA9F91B33095}" destId="{351EC126-16D9-3F44-8792-574690044FAD}" srcOrd="0" destOrd="0" presId="urn:microsoft.com/office/officeart/2005/8/layout/cycle5"/>
-    <dgm:cxn modelId="{5D1C47BC-B2D2-BB4E-87FB-94D34273A144}" type="presOf" srcId="{4AE7C4B4-A10E-C644-9777-7BF73F80F40A}" destId="{767246D9-AD61-784C-B10D-4948D0B82340}" srcOrd="0" destOrd="0" presId="urn:microsoft.com/office/officeart/2005/8/layout/cycle5"/>
-    <dgm:cxn modelId="{EFB800D5-E05C-F54B-A180-BCC3CE232150}" type="presOf" srcId="{E16B1802-228F-014F-9533-ECFBE83229A2}" destId="{C23323CF-63B9-4A4A-819C-42397A90D8DD}" srcOrd="0" destOrd="0" presId="urn:microsoft.com/office/officeart/2005/8/layout/cycle5"/>
-    <dgm:cxn modelId="{787CB9DC-4BF8-214F-8127-61684B5342CD}" srcId="{B97148FC-8022-4E41-90BF-3A26D1D8E529}" destId="{15D52097-5850-A642-A977-0348AA2963FA}" srcOrd="3" destOrd="0" parTransId="{26FCF447-A234-7043-8666-AC6B823E9329}" sibTransId="{C123C68C-6D48-B841-9BD5-3D529B83B9D4}"/>
-    <dgm:cxn modelId="{F7945DDD-52BD-9248-914F-1DCA7C4A3475}" type="presOf" srcId="{B97148FC-8022-4E41-90BF-3A26D1D8E529}" destId="{E6693980-67ED-3A45-AC68-462E03F41108}" srcOrd="0" destOrd="0" presId="urn:microsoft.com/office/officeart/2005/8/layout/cycle5"/>
-    <dgm:cxn modelId="{2B1DEEEA-F500-2B43-B4F5-F758D83FE481}" type="presOf" srcId="{E7C3FA4C-E972-3D43-87CC-FEED9075893B}" destId="{64234121-9420-6E4B-9813-FE7CDCFF06CC}" srcOrd="0" destOrd="0" presId="urn:microsoft.com/office/officeart/2005/8/layout/cycle5"/>
-    <dgm:cxn modelId="{8367C414-3EA9-1F43-B376-AB367A04C682}" type="presParOf" srcId="{E6693980-67ED-3A45-AC68-462E03F41108}" destId="{B513119F-EF57-CC4D-B321-5389838214AA}" srcOrd="0" destOrd="0" presId="urn:microsoft.com/office/officeart/2005/8/layout/cycle5"/>
-    <dgm:cxn modelId="{89686604-84D4-8C46-94C7-90E3E4EFDF0F}" type="presParOf" srcId="{E6693980-67ED-3A45-AC68-462E03F41108}" destId="{3F37B7B6-ECE0-D949-B612-345EBC33CF99}" srcOrd="1" destOrd="0" presId="urn:microsoft.com/office/officeart/2005/8/layout/cycle5"/>
-    <dgm:cxn modelId="{5860F6E3-D2AF-0C48-903F-0993FFE507B0}" type="presParOf" srcId="{E6693980-67ED-3A45-AC68-462E03F41108}" destId="{64234121-9420-6E4B-9813-FE7CDCFF06CC}" srcOrd="2" destOrd="0" presId="urn:microsoft.com/office/officeart/2005/8/layout/cycle5"/>
-    <dgm:cxn modelId="{7C45C476-E23C-034A-9AFF-855A194BDBF4}" type="presParOf" srcId="{E6693980-67ED-3A45-AC68-462E03F41108}" destId="{F55F4D2D-C738-B64A-8FCE-D2EE61193C80}" srcOrd="3" destOrd="0" presId="urn:microsoft.com/office/officeart/2005/8/layout/cycle5"/>
-    <dgm:cxn modelId="{D7D54A14-C74E-984F-877B-5A1E09194794}" type="presParOf" srcId="{E6693980-67ED-3A45-AC68-462E03F41108}" destId="{96E26667-A3E9-394C-A4DE-AD4C3670BE18}" srcOrd="4" destOrd="0" presId="urn:microsoft.com/office/officeart/2005/8/layout/cycle5"/>
-    <dgm:cxn modelId="{7CD712E4-F2D4-EF44-AC75-70F2DF245C01}" type="presParOf" srcId="{E6693980-67ED-3A45-AC68-462E03F41108}" destId="{351EC126-16D9-3F44-8792-574690044FAD}" srcOrd="5" destOrd="0" presId="urn:microsoft.com/office/officeart/2005/8/layout/cycle5"/>
-    <dgm:cxn modelId="{2DB88A26-F394-5740-BEB3-341DE03C2952}" type="presParOf" srcId="{E6693980-67ED-3A45-AC68-462E03F41108}" destId="{393E29D0-504D-1C4C-AFCF-16ACBE48BF82}" srcOrd="6" destOrd="0" presId="urn:microsoft.com/office/officeart/2005/8/layout/cycle5"/>
-    <dgm:cxn modelId="{26745DB4-B033-684A-9BB0-EAB2714D9E9A}" type="presParOf" srcId="{E6693980-67ED-3A45-AC68-462E03F41108}" destId="{13C6419D-BAAB-9F41-9BE7-3744E6FAD355}" srcOrd="7" destOrd="0" presId="urn:microsoft.com/office/officeart/2005/8/layout/cycle5"/>
-    <dgm:cxn modelId="{08290314-84DC-684B-AFDC-E7A978BFAA22}" type="presParOf" srcId="{E6693980-67ED-3A45-AC68-462E03F41108}" destId="{2BA852DD-3CFA-DD4F-BAF2-A10FB3275BF2}" srcOrd="8" destOrd="0" presId="urn:microsoft.com/office/officeart/2005/8/layout/cycle5"/>
-    <dgm:cxn modelId="{196D0643-EF98-3041-A941-528EA4F6C5D0}" type="presParOf" srcId="{E6693980-67ED-3A45-AC68-462E03F41108}" destId="{E4496E0D-FD86-7844-89A1-3C1D3AC747AA}" srcOrd="9" destOrd="0" presId="urn:microsoft.com/office/officeart/2005/8/layout/cycle5"/>
-    <dgm:cxn modelId="{67B2DCE5-DBA3-DE42-8D11-11C6344BD93C}" type="presParOf" srcId="{E6693980-67ED-3A45-AC68-462E03F41108}" destId="{63B7EE1E-FA48-714E-AA65-95105242BA19}" srcOrd="10" destOrd="0" presId="urn:microsoft.com/office/officeart/2005/8/layout/cycle5"/>
-    <dgm:cxn modelId="{978AB307-5A37-9147-AC2D-0432D8FCC43D}" type="presParOf" srcId="{E6693980-67ED-3A45-AC68-462E03F41108}" destId="{248590C3-C8E7-5443-BFDD-2A8D52788C5D}" srcOrd="11" destOrd="0" presId="urn:microsoft.com/office/officeart/2005/8/layout/cycle5"/>
-    <dgm:cxn modelId="{4F0152F5-E1E7-2041-BA11-B688EFF1EEB8}" type="presParOf" srcId="{E6693980-67ED-3A45-AC68-462E03F41108}" destId="{C9FEBAAD-D528-EE40-B0E0-23E4A0043BE8}" srcOrd="12" destOrd="0" presId="urn:microsoft.com/office/officeart/2005/8/layout/cycle5"/>
-    <dgm:cxn modelId="{853ADFA0-FA32-0B4D-A685-BA7E1B9E11D1}" type="presParOf" srcId="{E6693980-67ED-3A45-AC68-462E03F41108}" destId="{DC386814-EE5B-F844-B86C-E3C386A97265}" srcOrd="13" destOrd="0" presId="urn:microsoft.com/office/officeart/2005/8/layout/cycle5"/>
-    <dgm:cxn modelId="{43DFB218-45F9-3D48-A0B6-85A51F97F584}" type="presParOf" srcId="{E6693980-67ED-3A45-AC68-462E03F41108}" destId="{767246D9-AD61-784C-B10D-4948D0B82340}" srcOrd="14" destOrd="0" presId="urn:microsoft.com/office/officeart/2005/8/layout/cycle5"/>
-    <dgm:cxn modelId="{57B1BC8F-578D-6C41-8501-3EE015B759B3}" type="presParOf" srcId="{E6693980-67ED-3A45-AC68-462E03F41108}" destId="{FF196E73-934D-9442-87C0-3038C52A66E9}" srcOrd="15" destOrd="0" presId="urn:microsoft.com/office/officeart/2005/8/layout/cycle5"/>
-    <dgm:cxn modelId="{F5F166E6-67B2-554F-9821-4112F3FC0254}" type="presParOf" srcId="{E6693980-67ED-3A45-AC68-462E03F41108}" destId="{FEC5D680-F1B3-E245-8544-58FB311D4D0E}" srcOrd="16" destOrd="0" presId="urn:microsoft.com/office/officeart/2005/8/layout/cycle5"/>
-    <dgm:cxn modelId="{31267A82-4A90-8D45-AE9C-2B5BE39CBD1D}" type="presParOf" srcId="{E6693980-67ED-3A45-AC68-462E03F41108}" destId="{C23323CF-63B9-4A4A-819C-42397A90D8DD}" srcOrd="17" destOrd="0" presId="urn:microsoft.com/office/officeart/2005/8/layout/cycle5"/>
-  </dgm:cxnLst>
-  <dgm:bg/>
-  <dgm:whole/>
-  <dgm:extLst>
-    <a:ext uri="http://schemas.microsoft.com/office/drawing/2008/diagram">
-      <dsp:dataModelExt xmlns:dsp="http://schemas.microsoft.com/office/drawing/2008/diagram" relId="rId7" minVer="http://schemas.openxmlformats.org/drawingml/2006/diagram"/>
-    </a:ext>
-  </dgm:extLst>
-</dgm:dataModel>
-</file>
-
 <file path=ppt/diagrams/data3.xml><?xml version="1.0" encoding="utf-8"?>
 <dgm:dataModel xmlns:dgm="http://schemas.openxmlformats.org/drawingml/2006/diagram" xmlns:a="http://schemas.openxmlformats.org/drawingml/2006/main">
   <dgm:ptLst>
@@ -3782,593 +3782,6 @@
 </file>
 
 <file path=ppt/diagrams/drawing1.xml><?xml version="1.0" encoding="utf-8"?>
-<dsp:drawing xmlns:dgm="http://schemas.openxmlformats.org/drawingml/2006/diagram" xmlns:dsp="http://schemas.microsoft.com/office/drawing/2008/diagram" xmlns:a="http://schemas.openxmlformats.org/drawingml/2006/main">
-  <dsp:spTree>
-    <dsp:nvGrpSpPr>
-      <dsp:cNvPr id="0" name=""/>
-      <dsp:cNvGrpSpPr/>
-    </dsp:nvGrpSpPr>
-    <dsp:grpSpPr/>
-    <dsp:sp modelId="{F81868EA-ED85-4DD1-81AD-7D520205CD35}">
-      <dsp:nvSpPr>
-        <dsp:cNvPr id="0" name=""/>
-        <dsp:cNvSpPr/>
-      </dsp:nvSpPr>
-      <dsp:spPr>
-        <a:xfrm>
-          <a:off x="622800" y="1275667"/>
-          <a:ext cx="810000" cy="810000"/>
-        </a:xfrm>
-        <a:prstGeom prst="rect">
-          <a:avLst/>
-        </a:prstGeom>
-        <a:blipFill>
-          <a:blip xmlns:r="http://schemas.openxmlformats.org/officeDocument/2006/relationships" r:embed="rId1">
-            <a:extLst>
-              <a:ext uri="{28A0092B-C50C-407E-A947-70E740481C1C}">
-                <a14:useLocalDpi xmlns:a14="http://schemas.microsoft.com/office/drawing/2010/main" val="0"/>
-              </a:ext>
-            </a:extLst>
-          </a:blip>
-          <a:srcRect/>
-          <a:stretch>
-            <a:fillRect/>
-          </a:stretch>
-        </a:blipFill>
-        <a:ln w="12700" cap="flat" cmpd="sng" algn="ctr">
-          <a:solidFill>
-            <a:schemeClr val="lt1">
-              <a:hueOff val="0"/>
-              <a:satOff val="0"/>
-              <a:lumOff val="0"/>
-              <a:alphaOff val="0"/>
-            </a:schemeClr>
-          </a:solidFill>
-          <a:prstDash val="solid"/>
-          <a:miter lim="800000"/>
-        </a:ln>
-        <a:effectLst/>
-      </dsp:spPr>
-      <dsp:style>
-        <a:lnRef idx="2">
-          <a:scrgbClr r="0" g="0" b="0"/>
-        </a:lnRef>
-        <a:fillRef idx="1">
-          <a:scrgbClr r="0" g="0" b="0"/>
-        </a:fillRef>
-        <a:effectRef idx="0">
-          <a:scrgbClr r="0" g="0" b="0"/>
-        </a:effectRef>
-        <a:fontRef idx="minor">
-          <a:schemeClr val="lt1"/>
-        </a:fontRef>
-      </dsp:style>
-    </dsp:sp>
-    <dsp:sp modelId="{E37F9865-72A5-4628-AD9E-919CDE1BE3EB}">
-      <dsp:nvSpPr>
-        <dsp:cNvPr id="0" name=""/>
-        <dsp:cNvSpPr/>
-      </dsp:nvSpPr>
-      <dsp:spPr>
-        <a:xfrm>
-          <a:off x="127800" y="2355670"/>
-          <a:ext cx="1800000" cy="720000"/>
-        </a:xfrm>
-        <a:prstGeom prst="rect">
-          <a:avLst/>
-        </a:prstGeom>
-        <a:noFill/>
-        <a:ln>
-          <a:noFill/>
-        </a:ln>
-        <a:effectLst/>
-      </dsp:spPr>
-      <dsp:style>
-        <a:lnRef idx="0">
-          <a:scrgbClr r="0" g="0" b="0"/>
-        </a:lnRef>
-        <a:fillRef idx="0">
-          <a:scrgbClr r="0" g="0" b="0"/>
-        </a:fillRef>
-        <a:effectRef idx="0">
-          <a:scrgbClr r="0" g="0" b="0"/>
-        </a:effectRef>
-        <a:fontRef idx="minor"/>
-      </dsp:style>
-      <dsp:txBody>
-        <a:bodyPr spcFirstLastPara="0" vert="horz" wrap="square" lIns="0" tIns="0" rIns="0" bIns="0" numCol="1" spcCol="1270" anchor="t" anchorCtr="0">
-          <a:noAutofit/>
-        </a:bodyPr>
-        <a:lstStyle/>
-        <a:p>
-          <a:pPr marL="0" lvl="0" indent="0" algn="ctr" defTabSz="1066800">
-            <a:lnSpc>
-              <a:spcPct val="100000"/>
-            </a:lnSpc>
-            <a:spcBef>
-              <a:spcPct val="0"/>
-            </a:spcBef>
-            <a:spcAft>
-              <a:spcPct val="35000"/>
-            </a:spcAft>
-            <a:buNone/>
-          </a:pPr>
-          <a:r>
-            <a:rPr lang="en-US" sz="2400" kern="1200"/>
-            <a:t>Daunting</a:t>
-          </a:r>
-        </a:p>
-      </dsp:txBody>
-      <dsp:txXfrm>
-        <a:off x="127800" y="2355670"/>
-        <a:ext cx="1800000" cy="720000"/>
-      </dsp:txXfrm>
-    </dsp:sp>
-    <dsp:sp modelId="{7E136D51-3099-4875-B2FB-B168AE9E2246}">
-      <dsp:nvSpPr>
-        <dsp:cNvPr id="0" name=""/>
-        <dsp:cNvSpPr/>
-      </dsp:nvSpPr>
-      <dsp:spPr>
-        <a:xfrm>
-          <a:off x="2737800" y="1275667"/>
-          <a:ext cx="810000" cy="810000"/>
-        </a:xfrm>
-        <a:prstGeom prst="rect">
-          <a:avLst/>
-        </a:prstGeom>
-        <a:blipFill>
-          <a:blip xmlns:r="http://schemas.openxmlformats.org/officeDocument/2006/relationships" r:embed="rId2">
-            <a:extLst>
-              <a:ext uri="{28A0092B-C50C-407E-A947-70E740481C1C}">
-                <a14:useLocalDpi xmlns:a14="http://schemas.microsoft.com/office/drawing/2010/main" val="0"/>
-              </a:ext>
-            </a:extLst>
-          </a:blip>
-          <a:srcRect/>
-          <a:stretch>
-            <a:fillRect/>
-          </a:stretch>
-        </a:blipFill>
-        <a:ln w="12700" cap="flat" cmpd="sng" algn="ctr">
-          <a:solidFill>
-            <a:schemeClr val="lt1">
-              <a:hueOff val="0"/>
-              <a:satOff val="0"/>
-              <a:lumOff val="0"/>
-              <a:alphaOff val="0"/>
-            </a:schemeClr>
-          </a:solidFill>
-          <a:prstDash val="solid"/>
-          <a:miter lim="800000"/>
-        </a:ln>
-        <a:effectLst/>
-      </dsp:spPr>
-      <dsp:style>
-        <a:lnRef idx="2">
-          <a:scrgbClr r="0" g="0" b="0"/>
-        </a:lnRef>
-        <a:fillRef idx="1">
-          <a:scrgbClr r="0" g="0" b="0"/>
-        </a:fillRef>
-        <a:effectRef idx="0">
-          <a:scrgbClr r="0" g="0" b="0"/>
-        </a:effectRef>
-        <a:fontRef idx="minor">
-          <a:schemeClr val="lt1"/>
-        </a:fontRef>
-      </dsp:style>
-    </dsp:sp>
-    <dsp:sp modelId="{32DD91DF-2281-405E-9F7C-ED32301510D7}">
-      <dsp:nvSpPr>
-        <dsp:cNvPr id="0" name=""/>
-        <dsp:cNvSpPr/>
-      </dsp:nvSpPr>
-      <dsp:spPr>
-        <a:xfrm>
-          <a:off x="2242800" y="2355670"/>
-          <a:ext cx="1800000" cy="720000"/>
-        </a:xfrm>
-        <a:prstGeom prst="rect">
-          <a:avLst/>
-        </a:prstGeom>
-        <a:noFill/>
-        <a:ln>
-          <a:noFill/>
-        </a:ln>
-        <a:effectLst/>
-      </dsp:spPr>
-      <dsp:style>
-        <a:lnRef idx="0">
-          <a:scrgbClr r="0" g="0" b="0"/>
-        </a:lnRef>
-        <a:fillRef idx="0">
-          <a:scrgbClr r="0" g="0" b="0"/>
-        </a:fillRef>
-        <a:effectRef idx="0">
-          <a:scrgbClr r="0" g="0" b="0"/>
-        </a:effectRef>
-        <a:fontRef idx="minor"/>
-      </dsp:style>
-      <dsp:txBody>
-        <a:bodyPr spcFirstLastPara="0" vert="horz" wrap="square" lIns="0" tIns="0" rIns="0" bIns="0" numCol="1" spcCol="1270" anchor="t" anchorCtr="0">
-          <a:noAutofit/>
-        </a:bodyPr>
-        <a:lstStyle/>
-        <a:p>
-          <a:pPr marL="0" lvl="0" indent="0" algn="ctr" defTabSz="1066800">
-            <a:lnSpc>
-              <a:spcPct val="100000"/>
-            </a:lnSpc>
-            <a:spcBef>
-              <a:spcPct val="0"/>
-            </a:spcBef>
-            <a:spcAft>
-              <a:spcPct val="35000"/>
-            </a:spcAft>
-            <a:buNone/>
-          </a:pPr>
-          <a:r>
-            <a:rPr lang="en-US" sz="2400" kern="1200"/>
-            <a:t>Expensive</a:t>
-          </a:r>
-        </a:p>
-      </dsp:txBody>
-      <dsp:txXfrm>
-        <a:off x="2242800" y="2355670"/>
-        <a:ext cx="1800000" cy="720000"/>
-      </dsp:txXfrm>
-    </dsp:sp>
-    <dsp:sp modelId="{9AC808E3-9A14-4503-A077-BE9895D711FF}">
-      <dsp:nvSpPr>
-        <dsp:cNvPr id="0" name=""/>
-        <dsp:cNvSpPr/>
-      </dsp:nvSpPr>
-      <dsp:spPr>
-        <a:xfrm>
-          <a:off x="4852800" y="1275667"/>
-          <a:ext cx="810000" cy="810000"/>
-        </a:xfrm>
-        <a:prstGeom prst="rect">
-          <a:avLst/>
-        </a:prstGeom>
-        <a:blipFill>
-          <a:blip xmlns:r="http://schemas.openxmlformats.org/officeDocument/2006/relationships" r:embed="rId3">
-            <a:extLst>
-              <a:ext uri="{28A0092B-C50C-407E-A947-70E740481C1C}">
-                <a14:useLocalDpi xmlns:a14="http://schemas.microsoft.com/office/drawing/2010/main" val="0"/>
-              </a:ext>
-            </a:extLst>
-          </a:blip>
-          <a:srcRect/>
-          <a:stretch>
-            <a:fillRect/>
-          </a:stretch>
-        </a:blipFill>
-        <a:ln w="12700" cap="flat" cmpd="sng" algn="ctr">
-          <a:solidFill>
-            <a:schemeClr val="lt1">
-              <a:hueOff val="0"/>
-              <a:satOff val="0"/>
-              <a:lumOff val="0"/>
-              <a:alphaOff val="0"/>
-            </a:schemeClr>
-          </a:solidFill>
-          <a:prstDash val="solid"/>
-          <a:miter lim="800000"/>
-        </a:ln>
-        <a:effectLst/>
-      </dsp:spPr>
-      <dsp:style>
-        <a:lnRef idx="2">
-          <a:scrgbClr r="0" g="0" b="0"/>
-        </a:lnRef>
-        <a:fillRef idx="1">
-          <a:scrgbClr r="0" g="0" b="0"/>
-        </a:fillRef>
-        <a:effectRef idx="0">
-          <a:scrgbClr r="0" g="0" b="0"/>
-        </a:effectRef>
-        <a:fontRef idx="minor">
-          <a:schemeClr val="lt1"/>
-        </a:fontRef>
-      </dsp:style>
-    </dsp:sp>
-    <dsp:sp modelId="{2A588703-9DDD-499F-A81C-88ED121CCC37}">
-      <dsp:nvSpPr>
-        <dsp:cNvPr id="0" name=""/>
-        <dsp:cNvSpPr/>
-      </dsp:nvSpPr>
-      <dsp:spPr>
-        <a:xfrm>
-          <a:off x="4357800" y="2355670"/>
-          <a:ext cx="1800000" cy="720000"/>
-        </a:xfrm>
-        <a:prstGeom prst="rect">
-          <a:avLst/>
-        </a:prstGeom>
-        <a:noFill/>
-        <a:ln>
-          <a:noFill/>
-        </a:ln>
-        <a:effectLst/>
-      </dsp:spPr>
-      <dsp:style>
-        <a:lnRef idx="0">
-          <a:scrgbClr r="0" g="0" b="0"/>
-        </a:lnRef>
-        <a:fillRef idx="0">
-          <a:scrgbClr r="0" g="0" b="0"/>
-        </a:fillRef>
-        <a:effectRef idx="0">
-          <a:scrgbClr r="0" g="0" b="0"/>
-        </a:effectRef>
-        <a:fontRef idx="minor"/>
-      </dsp:style>
-      <dsp:txBody>
-        <a:bodyPr spcFirstLastPara="0" vert="horz" wrap="square" lIns="0" tIns="0" rIns="0" bIns="0" numCol="1" spcCol="1270" anchor="t" anchorCtr="0">
-          <a:noAutofit/>
-        </a:bodyPr>
-        <a:lstStyle/>
-        <a:p>
-          <a:pPr marL="0" lvl="0" indent="0" algn="ctr" defTabSz="1066800">
-            <a:lnSpc>
-              <a:spcPct val="100000"/>
-            </a:lnSpc>
-            <a:spcBef>
-              <a:spcPct val="0"/>
-            </a:spcBef>
-            <a:spcAft>
-              <a:spcPct val="35000"/>
-            </a:spcAft>
-            <a:buNone/>
-          </a:pPr>
-          <a:r>
-            <a:rPr lang="en-US" sz="2400" kern="1200"/>
-            <a:t>Tiring</a:t>
-          </a:r>
-        </a:p>
-      </dsp:txBody>
-      <dsp:txXfrm>
-        <a:off x="4357800" y="2355670"/>
-        <a:ext cx="1800000" cy="720000"/>
-      </dsp:txXfrm>
-    </dsp:sp>
-    <dsp:sp modelId="{DFFAC764-CD98-46B0-B080-A254258E478F}">
-      <dsp:nvSpPr>
-        <dsp:cNvPr id="0" name=""/>
-        <dsp:cNvSpPr/>
-      </dsp:nvSpPr>
-      <dsp:spPr>
-        <a:xfrm>
-          <a:off x="6967800" y="1275667"/>
-          <a:ext cx="810000" cy="810000"/>
-        </a:xfrm>
-        <a:prstGeom prst="rect">
-          <a:avLst/>
-        </a:prstGeom>
-        <a:blipFill>
-          <a:blip xmlns:r="http://schemas.openxmlformats.org/officeDocument/2006/relationships" r:embed="rId4">
-            <a:extLst>
-              <a:ext uri="{28A0092B-C50C-407E-A947-70E740481C1C}">
-                <a14:useLocalDpi xmlns:a14="http://schemas.microsoft.com/office/drawing/2010/main" val="0"/>
-              </a:ext>
-            </a:extLst>
-          </a:blip>
-          <a:srcRect/>
-          <a:stretch>
-            <a:fillRect/>
-          </a:stretch>
-        </a:blipFill>
-        <a:ln w="12700" cap="flat" cmpd="sng" algn="ctr">
-          <a:solidFill>
-            <a:schemeClr val="lt1">
-              <a:hueOff val="0"/>
-              <a:satOff val="0"/>
-              <a:lumOff val="0"/>
-              <a:alphaOff val="0"/>
-            </a:schemeClr>
-          </a:solidFill>
-          <a:prstDash val="solid"/>
-          <a:miter lim="800000"/>
-        </a:ln>
-        <a:effectLst/>
-      </dsp:spPr>
-      <dsp:style>
-        <a:lnRef idx="2">
-          <a:scrgbClr r="0" g="0" b="0"/>
-        </a:lnRef>
-        <a:fillRef idx="1">
-          <a:scrgbClr r="0" g="0" b="0"/>
-        </a:fillRef>
-        <a:effectRef idx="0">
-          <a:scrgbClr r="0" g="0" b="0"/>
-        </a:effectRef>
-        <a:fontRef idx="minor">
-          <a:schemeClr val="lt1"/>
-        </a:fontRef>
-      </dsp:style>
-    </dsp:sp>
-    <dsp:sp modelId="{BDDE1CD8-A48F-4F90-A18E-EEB00D072172}">
-      <dsp:nvSpPr>
-        <dsp:cNvPr id="0" name=""/>
-        <dsp:cNvSpPr/>
-      </dsp:nvSpPr>
-      <dsp:spPr>
-        <a:xfrm>
-          <a:off x="6472800" y="2355670"/>
-          <a:ext cx="1800000" cy="720000"/>
-        </a:xfrm>
-        <a:prstGeom prst="rect">
-          <a:avLst/>
-        </a:prstGeom>
-        <a:noFill/>
-        <a:ln>
-          <a:noFill/>
-        </a:ln>
-        <a:effectLst/>
-      </dsp:spPr>
-      <dsp:style>
-        <a:lnRef idx="0">
-          <a:scrgbClr r="0" g="0" b="0"/>
-        </a:lnRef>
-        <a:fillRef idx="0">
-          <a:scrgbClr r="0" g="0" b="0"/>
-        </a:fillRef>
-        <a:effectRef idx="0">
-          <a:scrgbClr r="0" g="0" b="0"/>
-        </a:effectRef>
-        <a:fontRef idx="minor"/>
-      </dsp:style>
-      <dsp:txBody>
-        <a:bodyPr spcFirstLastPara="0" vert="horz" wrap="square" lIns="0" tIns="0" rIns="0" bIns="0" numCol="1" spcCol="1270" anchor="t" anchorCtr="0">
-          <a:noAutofit/>
-        </a:bodyPr>
-        <a:lstStyle/>
-        <a:p>
-          <a:pPr marL="0" lvl="0" indent="0" algn="ctr" defTabSz="1066800">
-            <a:lnSpc>
-              <a:spcPct val="100000"/>
-            </a:lnSpc>
-            <a:spcBef>
-              <a:spcPct val="0"/>
-            </a:spcBef>
-            <a:spcAft>
-              <a:spcPct val="35000"/>
-            </a:spcAft>
-            <a:buNone/>
-          </a:pPr>
-          <a:r>
-            <a:rPr lang="en-US" sz="2400" kern="1200"/>
-            <a:t>Educational</a:t>
-          </a:r>
-        </a:p>
-      </dsp:txBody>
-      <dsp:txXfrm>
-        <a:off x="6472800" y="2355670"/>
-        <a:ext cx="1800000" cy="720000"/>
-      </dsp:txXfrm>
-    </dsp:sp>
-    <dsp:sp modelId="{912308C1-17B2-4F06-B309-44B9AD64CA78}">
-      <dsp:nvSpPr>
-        <dsp:cNvPr id="0" name=""/>
-        <dsp:cNvSpPr/>
-      </dsp:nvSpPr>
-      <dsp:spPr>
-        <a:xfrm>
-          <a:off x="9082800" y="1275667"/>
-          <a:ext cx="810000" cy="810000"/>
-        </a:xfrm>
-        <a:prstGeom prst="rect">
-          <a:avLst/>
-        </a:prstGeom>
-        <a:blipFill>
-          <a:blip xmlns:r="http://schemas.openxmlformats.org/officeDocument/2006/relationships" r:embed="rId5">
-            <a:extLst>
-              <a:ext uri="{28A0092B-C50C-407E-A947-70E740481C1C}">
-                <a14:useLocalDpi xmlns:a14="http://schemas.microsoft.com/office/drawing/2010/main" val="0"/>
-              </a:ext>
-            </a:extLst>
-          </a:blip>
-          <a:srcRect/>
-          <a:stretch>
-            <a:fillRect/>
-          </a:stretch>
-        </a:blipFill>
-        <a:ln w="12700" cap="flat" cmpd="sng" algn="ctr">
-          <a:solidFill>
-            <a:schemeClr val="lt1">
-              <a:hueOff val="0"/>
-              <a:satOff val="0"/>
-              <a:lumOff val="0"/>
-              <a:alphaOff val="0"/>
-            </a:schemeClr>
-          </a:solidFill>
-          <a:prstDash val="solid"/>
-          <a:miter lim="800000"/>
-        </a:ln>
-        <a:effectLst/>
-      </dsp:spPr>
-      <dsp:style>
-        <a:lnRef idx="2">
-          <a:scrgbClr r="0" g="0" b="0"/>
-        </a:lnRef>
-        <a:fillRef idx="1">
-          <a:scrgbClr r="0" g="0" b="0"/>
-        </a:fillRef>
-        <a:effectRef idx="0">
-          <a:scrgbClr r="0" g="0" b="0"/>
-        </a:effectRef>
-        <a:fontRef idx="minor">
-          <a:schemeClr val="lt1"/>
-        </a:fontRef>
-      </dsp:style>
-    </dsp:sp>
-    <dsp:sp modelId="{123FD291-D000-47C2-8AA7-728FEEE28F39}">
-      <dsp:nvSpPr>
-        <dsp:cNvPr id="0" name=""/>
-        <dsp:cNvSpPr/>
-      </dsp:nvSpPr>
-      <dsp:spPr>
-        <a:xfrm>
-          <a:off x="8587800" y="2355670"/>
-          <a:ext cx="1800000" cy="720000"/>
-        </a:xfrm>
-        <a:prstGeom prst="rect">
-          <a:avLst/>
-        </a:prstGeom>
-        <a:noFill/>
-        <a:ln>
-          <a:noFill/>
-        </a:ln>
-        <a:effectLst/>
-      </dsp:spPr>
-      <dsp:style>
-        <a:lnRef idx="0">
-          <a:scrgbClr r="0" g="0" b="0"/>
-        </a:lnRef>
-        <a:fillRef idx="0">
-          <a:scrgbClr r="0" g="0" b="0"/>
-        </a:fillRef>
-        <a:effectRef idx="0">
-          <a:scrgbClr r="0" g="0" b="0"/>
-        </a:effectRef>
-        <a:fontRef idx="minor"/>
-      </dsp:style>
-      <dsp:txBody>
-        <a:bodyPr spcFirstLastPara="0" vert="horz" wrap="square" lIns="0" tIns="0" rIns="0" bIns="0" numCol="1" spcCol="1270" anchor="t" anchorCtr="0">
-          <a:noAutofit/>
-        </a:bodyPr>
-        <a:lstStyle/>
-        <a:p>
-          <a:pPr marL="0" lvl="0" indent="0" algn="ctr" defTabSz="1066800">
-            <a:lnSpc>
-              <a:spcPct val="100000"/>
-            </a:lnSpc>
-            <a:spcBef>
-              <a:spcPct val="0"/>
-            </a:spcBef>
-            <a:spcAft>
-              <a:spcPct val="35000"/>
-            </a:spcAft>
-            <a:buNone/>
-          </a:pPr>
-          <a:r>
-            <a:rPr lang="en-US" sz="2400" kern="1200"/>
-            <a:t>Team building</a:t>
-          </a:r>
-        </a:p>
-      </dsp:txBody>
-      <dsp:txXfrm>
-        <a:off x="8587800" y="2355670"/>
-        <a:ext cx="1800000" cy="720000"/>
-      </dsp:txXfrm>
-    </dsp:sp>
-  </dsp:spTree>
-</dsp:drawing>
-</file>
-
-<file path=ppt/diagrams/drawing2.xml><?xml version="1.0" encoding="utf-8"?>
 <dsp:drawing xmlns:dgm="http://schemas.openxmlformats.org/drawingml/2006/diagram" xmlns:dsp="http://schemas.microsoft.com/office/drawing/2008/diagram" xmlns:a="http://schemas.openxmlformats.org/drawingml/2006/main">
   <dsp:spTree>
     <dsp:nvGrpSpPr>
@@ -5148,6 +4561,593 @@
 </dsp:drawing>
 </file>
 
+<file path=ppt/diagrams/drawing2.xml><?xml version="1.0" encoding="utf-8"?>
+<dsp:drawing xmlns:dgm="http://schemas.openxmlformats.org/drawingml/2006/diagram" xmlns:dsp="http://schemas.microsoft.com/office/drawing/2008/diagram" xmlns:a="http://schemas.openxmlformats.org/drawingml/2006/main">
+  <dsp:spTree>
+    <dsp:nvGrpSpPr>
+      <dsp:cNvPr id="0" name=""/>
+      <dsp:cNvGrpSpPr/>
+    </dsp:nvGrpSpPr>
+    <dsp:grpSpPr/>
+    <dsp:sp modelId="{F81868EA-ED85-4DD1-81AD-7D520205CD35}">
+      <dsp:nvSpPr>
+        <dsp:cNvPr id="0" name=""/>
+        <dsp:cNvSpPr/>
+      </dsp:nvSpPr>
+      <dsp:spPr>
+        <a:xfrm>
+          <a:off x="622800" y="1275667"/>
+          <a:ext cx="810000" cy="810000"/>
+        </a:xfrm>
+        <a:prstGeom prst="rect">
+          <a:avLst/>
+        </a:prstGeom>
+        <a:blipFill>
+          <a:blip xmlns:r="http://schemas.openxmlformats.org/officeDocument/2006/relationships" r:embed="rId1">
+            <a:extLst>
+              <a:ext uri="{28A0092B-C50C-407E-A947-70E740481C1C}">
+                <a14:useLocalDpi xmlns:a14="http://schemas.microsoft.com/office/drawing/2010/main" val="0"/>
+              </a:ext>
+            </a:extLst>
+          </a:blip>
+          <a:srcRect/>
+          <a:stretch>
+            <a:fillRect/>
+          </a:stretch>
+        </a:blipFill>
+        <a:ln w="12700" cap="flat" cmpd="sng" algn="ctr">
+          <a:solidFill>
+            <a:schemeClr val="lt1">
+              <a:hueOff val="0"/>
+              <a:satOff val="0"/>
+              <a:lumOff val="0"/>
+              <a:alphaOff val="0"/>
+            </a:schemeClr>
+          </a:solidFill>
+          <a:prstDash val="solid"/>
+          <a:miter lim="800000"/>
+        </a:ln>
+        <a:effectLst/>
+      </dsp:spPr>
+      <dsp:style>
+        <a:lnRef idx="2">
+          <a:scrgbClr r="0" g="0" b="0"/>
+        </a:lnRef>
+        <a:fillRef idx="1">
+          <a:scrgbClr r="0" g="0" b="0"/>
+        </a:fillRef>
+        <a:effectRef idx="0">
+          <a:scrgbClr r="0" g="0" b="0"/>
+        </a:effectRef>
+        <a:fontRef idx="minor">
+          <a:schemeClr val="lt1"/>
+        </a:fontRef>
+      </dsp:style>
+    </dsp:sp>
+    <dsp:sp modelId="{E37F9865-72A5-4628-AD9E-919CDE1BE3EB}">
+      <dsp:nvSpPr>
+        <dsp:cNvPr id="0" name=""/>
+        <dsp:cNvSpPr/>
+      </dsp:nvSpPr>
+      <dsp:spPr>
+        <a:xfrm>
+          <a:off x="127800" y="2355670"/>
+          <a:ext cx="1800000" cy="720000"/>
+        </a:xfrm>
+        <a:prstGeom prst="rect">
+          <a:avLst/>
+        </a:prstGeom>
+        <a:noFill/>
+        <a:ln>
+          <a:noFill/>
+        </a:ln>
+        <a:effectLst/>
+      </dsp:spPr>
+      <dsp:style>
+        <a:lnRef idx="0">
+          <a:scrgbClr r="0" g="0" b="0"/>
+        </a:lnRef>
+        <a:fillRef idx="0">
+          <a:scrgbClr r="0" g="0" b="0"/>
+        </a:fillRef>
+        <a:effectRef idx="0">
+          <a:scrgbClr r="0" g="0" b="0"/>
+        </a:effectRef>
+        <a:fontRef idx="minor"/>
+      </dsp:style>
+      <dsp:txBody>
+        <a:bodyPr spcFirstLastPara="0" vert="horz" wrap="square" lIns="0" tIns="0" rIns="0" bIns="0" numCol="1" spcCol="1270" anchor="t" anchorCtr="0">
+          <a:noAutofit/>
+        </a:bodyPr>
+        <a:lstStyle/>
+        <a:p>
+          <a:pPr marL="0" lvl="0" indent="0" algn="ctr" defTabSz="1066800">
+            <a:lnSpc>
+              <a:spcPct val="100000"/>
+            </a:lnSpc>
+            <a:spcBef>
+              <a:spcPct val="0"/>
+            </a:spcBef>
+            <a:spcAft>
+              <a:spcPct val="35000"/>
+            </a:spcAft>
+            <a:buNone/>
+          </a:pPr>
+          <a:r>
+            <a:rPr lang="en-US" sz="2400" kern="1200"/>
+            <a:t>Daunting</a:t>
+          </a:r>
+        </a:p>
+      </dsp:txBody>
+      <dsp:txXfrm>
+        <a:off x="127800" y="2355670"/>
+        <a:ext cx="1800000" cy="720000"/>
+      </dsp:txXfrm>
+    </dsp:sp>
+    <dsp:sp modelId="{7E136D51-3099-4875-B2FB-B168AE9E2246}">
+      <dsp:nvSpPr>
+        <dsp:cNvPr id="0" name=""/>
+        <dsp:cNvSpPr/>
+      </dsp:nvSpPr>
+      <dsp:spPr>
+        <a:xfrm>
+          <a:off x="2737800" y="1275667"/>
+          <a:ext cx="810000" cy="810000"/>
+        </a:xfrm>
+        <a:prstGeom prst="rect">
+          <a:avLst/>
+        </a:prstGeom>
+        <a:blipFill>
+          <a:blip xmlns:r="http://schemas.openxmlformats.org/officeDocument/2006/relationships" r:embed="rId2">
+            <a:extLst>
+              <a:ext uri="{28A0092B-C50C-407E-A947-70E740481C1C}">
+                <a14:useLocalDpi xmlns:a14="http://schemas.microsoft.com/office/drawing/2010/main" val="0"/>
+              </a:ext>
+            </a:extLst>
+          </a:blip>
+          <a:srcRect/>
+          <a:stretch>
+            <a:fillRect/>
+          </a:stretch>
+        </a:blipFill>
+        <a:ln w="12700" cap="flat" cmpd="sng" algn="ctr">
+          <a:solidFill>
+            <a:schemeClr val="lt1">
+              <a:hueOff val="0"/>
+              <a:satOff val="0"/>
+              <a:lumOff val="0"/>
+              <a:alphaOff val="0"/>
+            </a:schemeClr>
+          </a:solidFill>
+          <a:prstDash val="solid"/>
+          <a:miter lim="800000"/>
+        </a:ln>
+        <a:effectLst/>
+      </dsp:spPr>
+      <dsp:style>
+        <a:lnRef idx="2">
+          <a:scrgbClr r="0" g="0" b="0"/>
+        </a:lnRef>
+        <a:fillRef idx="1">
+          <a:scrgbClr r="0" g="0" b="0"/>
+        </a:fillRef>
+        <a:effectRef idx="0">
+          <a:scrgbClr r="0" g="0" b="0"/>
+        </a:effectRef>
+        <a:fontRef idx="minor">
+          <a:schemeClr val="lt1"/>
+        </a:fontRef>
+      </dsp:style>
+    </dsp:sp>
+    <dsp:sp modelId="{32DD91DF-2281-405E-9F7C-ED32301510D7}">
+      <dsp:nvSpPr>
+        <dsp:cNvPr id="0" name=""/>
+        <dsp:cNvSpPr/>
+      </dsp:nvSpPr>
+      <dsp:spPr>
+        <a:xfrm>
+          <a:off x="2242800" y="2355670"/>
+          <a:ext cx="1800000" cy="720000"/>
+        </a:xfrm>
+        <a:prstGeom prst="rect">
+          <a:avLst/>
+        </a:prstGeom>
+        <a:noFill/>
+        <a:ln>
+          <a:noFill/>
+        </a:ln>
+        <a:effectLst/>
+      </dsp:spPr>
+      <dsp:style>
+        <a:lnRef idx="0">
+          <a:scrgbClr r="0" g="0" b="0"/>
+        </a:lnRef>
+        <a:fillRef idx="0">
+          <a:scrgbClr r="0" g="0" b="0"/>
+        </a:fillRef>
+        <a:effectRef idx="0">
+          <a:scrgbClr r="0" g="0" b="0"/>
+        </a:effectRef>
+        <a:fontRef idx="minor"/>
+      </dsp:style>
+      <dsp:txBody>
+        <a:bodyPr spcFirstLastPara="0" vert="horz" wrap="square" lIns="0" tIns="0" rIns="0" bIns="0" numCol="1" spcCol="1270" anchor="t" anchorCtr="0">
+          <a:noAutofit/>
+        </a:bodyPr>
+        <a:lstStyle/>
+        <a:p>
+          <a:pPr marL="0" lvl="0" indent="0" algn="ctr" defTabSz="1066800">
+            <a:lnSpc>
+              <a:spcPct val="100000"/>
+            </a:lnSpc>
+            <a:spcBef>
+              <a:spcPct val="0"/>
+            </a:spcBef>
+            <a:spcAft>
+              <a:spcPct val="35000"/>
+            </a:spcAft>
+            <a:buNone/>
+          </a:pPr>
+          <a:r>
+            <a:rPr lang="en-US" sz="2400" kern="1200"/>
+            <a:t>Expensive</a:t>
+          </a:r>
+        </a:p>
+      </dsp:txBody>
+      <dsp:txXfrm>
+        <a:off x="2242800" y="2355670"/>
+        <a:ext cx="1800000" cy="720000"/>
+      </dsp:txXfrm>
+    </dsp:sp>
+    <dsp:sp modelId="{9AC808E3-9A14-4503-A077-BE9895D711FF}">
+      <dsp:nvSpPr>
+        <dsp:cNvPr id="0" name=""/>
+        <dsp:cNvSpPr/>
+      </dsp:nvSpPr>
+      <dsp:spPr>
+        <a:xfrm>
+          <a:off x="4852800" y="1275667"/>
+          <a:ext cx="810000" cy="810000"/>
+        </a:xfrm>
+        <a:prstGeom prst="rect">
+          <a:avLst/>
+        </a:prstGeom>
+        <a:blipFill>
+          <a:blip xmlns:r="http://schemas.openxmlformats.org/officeDocument/2006/relationships" r:embed="rId3">
+            <a:extLst>
+              <a:ext uri="{28A0092B-C50C-407E-A947-70E740481C1C}">
+                <a14:useLocalDpi xmlns:a14="http://schemas.microsoft.com/office/drawing/2010/main" val="0"/>
+              </a:ext>
+            </a:extLst>
+          </a:blip>
+          <a:srcRect/>
+          <a:stretch>
+            <a:fillRect/>
+          </a:stretch>
+        </a:blipFill>
+        <a:ln w="12700" cap="flat" cmpd="sng" algn="ctr">
+          <a:solidFill>
+            <a:schemeClr val="lt1">
+              <a:hueOff val="0"/>
+              <a:satOff val="0"/>
+              <a:lumOff val="0"/>
+              <a:alphaOff val="0"/>
+            </a:schemeClr>
+          </a:solidFill>
+          <a:prstDash val="solid"/>
+          <a:miter lim="800000"/>
+        </a:ln>
+        <a:effectLst/>
+      </dsp:spPr>
+      <dsp:style>
+        <a:lnRef idx="2">
+          <a:scrgbClr r="0" g="0" b="0"/>
+        </a:lnRef>
+        <a:fillRef idx="1">
+          <a:scrgbClr r="0" g="0" b="0"/>
+        </a:fillRef>
+        <a:effectRef idx="0">
+          <a:scrgbClr r="0" g="0" b="0"/>
+        </a:effectRef>
+        <a:fontRef idx="minor">
+          <a:schemeClr val="lt1"/>
+        </a:fontRef>
+      </dsp:style>
+    </dsp:sp>
+    <dsp:sp modelId="{2A588703-9DDD-499F-A81C-88ED121CCC37}">
+      <dsp:nvSpPr>
+        <dsp:cNvPr id="0" name=""/>
+        <dsp:cNvSpPr/>
+      </dsp:nvSpPr>
+      <dsp:spPr>
+        <a:xfrm>
+          <a:off x="4357800" y="2355670"/>
+          <a:ext cx="1800000" cy="720000"/>
+        </a:xfrm>
+        <a:prstGeom prst="rect">
+          <a:avLst/>
+        </a:prstGeom>
+        <a:noFill/>
+        <a:ln>
+          <a:noFill/>
+        </a:ln>
+        <a:effectLst/>
+      </dsp:spPr>
+      <dsp:style>
+        <a:lnRef idx="0">
+          <a:scrgbClr r="0" g="0" b="0"/>
+        </a:lnRef>
+        <a:fillRef idx="0">
+          <a:scrgbClr r="0" g="0" b="0"/>
+        </a:fillRef>
+        <a:effectRef idx="0">
+          <a:scrgbClr r="0" g="0" b="0"/>
+        </a:effectRef>
+        <a:fontRef idx="minor"/>
+      </dsp:style>
+      <dsp:txBody>
+        <a:bodyPr spcFirstLastPara="0" vert="horz" wrap="square" lIns="0" tIns="0" rIns="0" bIns="0" numCol="1" spcCol="1270" anchor="t" anchorCtr="0">
+          <a:noAutofit/>
+        </a:bodyPr>
+        <a:lstStyle/>
+        <a:p>
+          <a:pPr marL="0" lvl="0" indent="0" algn="ctr" defTabSz="1066800">
+            <a:lnSpc>
+              <a:spcPct val="100000"/>
+            </a:lnSpc>
+            <a:spcBef>
+              <a:spcPct val="0"/>
+            </a:spcBef>
+            <a:spcAft>
+              <a:spcPct val="35000"/>
+            </a:spcAft>
+            <a:buNone/>
+          </a:pPr>
+          <a:r>
+            <a:rPr lang="en-US" sz="2400" kern="1200"/>
+            <a:t>Tiring</a:t>
+          </a:r>
+        </a:p>
+      </dsp:txBody>
+      <dsp:txXfrm>
+        <a:off x="4357800" y="2355670"/>
+        <a:ext cx="1800000" cy="720000"/>
+      </dsp:txXfrm>
+    </dsp:sp>
+    <dsp:sp modelId="{DFFAC764-CD98-46B0-B080-A254258E478F}">
+      <dsp:nvSpPr>
+        <dsp:cNvPr id="0" name=""/>
+        <dsp:cNvSpPr/>
+      </dsp:nvSpPr>
+      <dsp:spPr>
+        <a:xfrm>
+          <a:off x="6967800" y="1275667"/>
+          <a:ext cx="810000" cy="810000"/>
+        </a:xfrm>
+        <a:prstGeom prst="rect">
+          <a:avLst/>
+        </a:prstGeom>
+        <a:blipFill>
+          <a:blip xmlns:r="http://schemas.openxmlformats.org/officeDocument/2006/relationships" r:embed="rId4">
+            <a:extLst>
+              <a:ext uri="{28A0092B-C50C-407E-A947-70E740481C1C}">
+                <a14:useLocalDpi xmlns:a14="http://schemas.microsoft.com/office/drawing/2010/main" val="0"/>
+              </a:ext>
+            </a:extLst>
+          </a:blip>
+          <a:srcRect/>
+          <a:stretch>
+            <a:fillRect/>
+          </a:stretch>
+        </a:blipFill>
+        <a:ln w="12700" cap="flat" cmpd="sng" algn="ctr">
+          <a:solidFill>
+            <a:schemeClr val="lt1">
+              <a:hueOff val="0"/>
+              <a:satOff val="0"/>
+              <a:lumOff val="0"/>
+              <a:alphaOff val="0"/>
+            </a:schemeClr>
+          </a:solidFill>
+          <a:prstDash val="solid"/>
+          <a:miter lim="800000"/>
+        </a:ln>
+        <a:effectLst/>
+      </dsp:spPr>
+      <dsp:style>
+        <a:lnRef idx="2">
+          <a:scrgbClr r="0" g="0" b="0"/>
+        </a:lnRef>
+        <a:fillRef idx="1">
+          <a:scrgbClr r="0" g="0" b="0"/>
+        </a:fillRef>
+        <a:effectRef idx="0">
+          <a:scrgbClr r="0" g="0" b="0"/>
+        </a:effectRef>
+        <a:fontRef idx="minor">
+          <a:schemeClr val="lt1"/>
+        </a:fontRef>
+      </dsp:style>
+    </dsp:sp>
+    <dsp:sp modelId="{BDDE1CD8-A48F-4F90-A18E-EEB00D072172}">
+      <dsp:nvSpPr>
+        <dsp:cNvPr id="0" name=""/>
+        <dsp:cNvSpPr/>
+      </dsp:nvSpPr>
+      <dsp:spPr>
+        <a:xfrm>
+          <a:off x="6472800" y="2355670"/>
+          <a:ext cx="1800000" cy="720000"/>
+        </a:xfrm>
+        <a:prstGeom prst="rect">
+          <a:avLst/>
+        </a:prstGeom>
+        <a:noFill/>
+        <a:ln>
+          <a:noFill/>
+        </a:ln>
+        <a:effectLst/>
+      </dsp:spPr>
+      <dsp:style>
+        <a:lnRef idx="0">
+          <a:scrgbClr r="0" g="0" b="0"/>
+        </a:lnRef>
+        <a:fillRef idx="0">
+          <a:scrgbClr r="0" g="0" b="0"/>
+        </a:fillRef>
+        <a:effectRef idx="0">
+          <a:scrgbClr r="0" g="0" b="0"/>
+        </a:effectRef>
+        <a:fontRef idx="minor"/>
+      </dsp:style>
+      <dsp:txBody>
+        <a:bodyPr spcFirstLastPara="0" vert="horz" wrap="square" lIns="0" tIns="0" rIns="0" bIns="0" numCol="1" spcCol="1270" anchor="t" anchorCtr="0">
+          <a:noAutofit/>
+        </a:bodyPr>
+        <a:lstStyle/>
+        <a:p>
+          <a:pPr marL="0" lvl="0" indent="0" algn="ctr" defTabSz="1066800">
+            <a:lnSpc>
+              <a:spcPct val="100000"/>
+            </a:lnSpc>
+            <a:spcBef>
+              <a:spcPct val="0"/>
+            </a:spcBef>
+            <a:spcAft>
+              <a:spcPct val="35000"/>
+            </a:spcAft>
+            <a:buNone/>
+          </a:pPr>
+          <a:r>
+            <a:rPr lang="en-US" sz="2400" kern="1200"/>
+            <a:t>Educational</a:t>
+          </a:r>
+        </a:p>
+      </dsp:txBody>
+      <dsp:txXfrm>
+        <a:off x="6472800" y="2355670"/>
+        <a:ext cx="1800000" cy="720000"/>
+      </dsp:txXfrm>
+    </dsp:sp>
+    <dsp:sp modelId="{912308C1-17B2-4F06-B309-44B9AD64CA78}">
+      <dsp:nvSpPr>
+        <dsp:cNvPr id="0" name=""/>
+        <dsp:cNvSpPr/>
+      </dsp:nvSpPr>
+      <dsp:spPr>
+        <a:xfrm>
+          <a:off x="9082800" y="1275667"/>
+          <a:ext cx="810000" cy="810000"/>
+        </a:xfrm>
+        <a:prstGeom prst="rect">
+          <a:avLst/>
+        </a:prstGeom>
+        <a:blipFill>
+          <a:blip xmlns:r="http://schemas.openxmlformats.org/officeDocument/2006/relationships" r:embed="rId5">
+            <a:extLst>
+              <a:ext uri="{28A0092B-C50C-407E-A947-70E740481C1C}">
+                <a14:useLocalDpi xmlns:a14="http://schemas.microsoft.com/office/drawing/2010/main" val="0"/>
+              </a:ext>
+            </a:extLst>
+          </a:blip>
+          <a:srcRect/>
+          <a:stretch>
+            <a:fillRect/>
+          </a:stretch>
+        </a:blipFill>
+        <a:ln w="12700" cap="flat" cmpd="sng" algn="ctr">
+          <a:solidFill>
+            <a:schemeClr val="lt1">
+              <a:hueOff val="0"/>
+              <a:satOff val="0"/>
+              <a:lumOff val="0"/>
+              <a:alphaOff val="0"/>
+            </a:schemeClr>
+          </a:solidFill>
+          <a:prstDash val="solid"/>
+          <a:miter lim="800000"/>
+        </a:ln>
+        <a:effectLst/>
+      </dsp:spPr>
+      <dsp:style>
+        <a:lnRef idx="2">
+          <a:scrgbClr r="0" g="0" b="0"/>
+        </a:lnRef>
+        <a:fillRef idx="1">
+          <a:scrgbClr r="0" g="0" b="0"/>
+        </a:fillRef>
+        <a:effectRef idx="0">
+          <a:scrgbClr r="0" g="0" b="0"/>
+        </a:effectRef>
+        <a:fontRef idx="minor">
+          <a:schemeClr val="lt1"/>
+        </a:fontRef>
+      </dsp:style>
+    </dsp:sp>
+    <dsp:sp modelId="{123FD291-D000-47C2-8AA7-728FEEE28F39}">
+      <dsp:nvSpPr>
+        <dsp:cNvPr id="0" name=""/>
+        <dsp:cNvSpPr/>
+      </dsp:nvSpPr>
+      <dsp:spPr>
+        <a:xfrm>
+          <a:off x="8587800" y="2355670"/>
+          <a:ext cx="1800000" cy="720000"/>
+        </a:xfrm>
+        <a:prstGeom prst="rect">
+          <a:avLst/>
+        </a:prstGeom>
+        <a:noFill/>
+        <a:ln>
+          <a:noFill/>
+        </a:ln>
+        <a:effectLst/>
+      </dsp:spPr>
+      <dsp:style>
+        <a:lnRef idx="0">
+          <a:scrgbClr r="0" g="0" b="0"/>
+        </a:lnRef>
+        <a:fillRef idx="0">
+          <a:scrgbClr r="0" g="0" b="0"/>
+        </a:fillRef>
+        <a:effectRef idx="0">
+          <a:scrgbClr r="0" g="0" b="0"/>
+        </a:effectRef>
+        <a:fontRef idx="minor"/>
+      </dsp:style>
+      <dsp:txBody>
+        <a:bodyPr spcFirstLastPara="0" vert="horz" wrap="square" lIns="0" tIns="0" rIns="0" bIns="0" numCol="1" spcCol="1270" anchor="t" anchorCtr="0">
+          <a:noAutofit/>
+        </a:bodyPr>
+        <a:lstStyle/>
+        <a:p>
+          <a:pPr marL="0" lvl="0" indent="0" algn="ctr" defTabSz="1066800">
+            <a:lnSpc>
+              <a:spcPct val="100000"/>
+            </a:lnSpc>
+            <a:spcBef>
+              <a:spcPct val="0"/>
+            </a:spcBef>
+            <a:spcAft>
+              <a:spcPct val="35000"/>
+            </a:spcAft>
+            <a:buNone/>
+          </a:pPr>
+          <a:r>
+            <a:rPr lang="en-US" sz="2400" kern="1200"/>
+            <a:t>Team building</a:t>
+          </a:r>
+        </a:p>
+      </dsp:txBody>
+      <dsp:txXfrm>
+        <a:off x="8587800" y="2355670"/>
+        <a:ext cx="1800000" cy="720000"/>
+      </dsp:txXfrm>
+    </dsp:sp>
+  </dsp:spTree>
+</dsp:drawing>
+</file>
+
 <file path=ppt/diagrams/drawing3.xml><?xml version="1.0" encoding="utf-8"?>
 <dsp:drawing xmlns:dgm="http://schemas.openxmlformats.org/drawingml/2006/diagram" xmlns:dsp="http://schemas.microsoft.com/office/drawing/2008/diagram" xmlns:a="http://schemas.openxmlformats.org/drawingml/2006/main">
   <dsp:spTree>
@@ -5620,196 +5620,6 @@
 </file>
 
 <file path=ppt/diagrams/layout1.xml><?xml version="1.0" encoding="utf-8"?>
-<dgm:layoutDef xmlns:dgm="http://schemas.openxmlformats.org/drawingml/2006/diagram" xmlns:a="http://schemas.openxmlformats.org/drawingml/2006/main" uniqueId="urn:microsoft.com/office/officeart/2018/2/layout/IconLabelList">
-  <dgm:title val="Icon Label List"/>
-  <dgm:desc val="Use to show non-sequential or grouped chunks of information accompanied by a related visuals. Works best with icons or small pictures with short text captions."/>
-  <dgm:catLst>
-    <dgm:cat type="icon" pri="500"/>
-  </dgm:catLst>
-  <dgm:sampData useDef="1">
-    <dgm:dataModel>
-      <dgm:ptLst/>
-      <dgm:bg/>
-      <dgm:whole/>
-    </dgm:dataModel>
-  </dgm:sampData>
-  <dgm:styleData useDef="1">
-    <dgm:dataModel>
-      <dgm:ptLst/>
-      <dgm:bg/>
-      <dgm:whole/>
-    </dgm:dataModel>
-  </dgm:styleData>
-  <dgm:clrData useDef="1">
-    <dgm:dataModel>
-      <dgm:ptLst/>
-      <dgm:bg/>
-      <dgm:whole/>
-    </dgm:dataModel>
-  </dgm:clrData>
-  <dgm:layoutNode name="root">
-    <dgm:varLst>
-      <dgm:dir/>
-      <dgm:resizeHandles val="exact"/>
-    </dgm:varLst>
-    <dgm:choose name="Name0">
-      <dgm:if name="Name1" axis="self" func="var" arg="dir" op="equ" val="norm">
-        <dgm:alg type="snake">
-          <dgm:param type="grDir" val="tL"/>
-          <dgm:param type="flowDir" val="row"/>
-          <dgm:param type="contDir" val="sameDir"/>
-          <dgm:param type="off" val="ctr"/>
-          <dgm:param type="vertAlign" val="mid"/>
-          <dgm:param type="horzAlign" val="ctr"/>
-        </dgm:alg>
-      </dgm:if>
-      <dgm:else name="Name2">
-        <dgm:alg type="snake">
-          <dgm:param type="grDir" val="tR"/>
-          <dgm:param type="flowDir" val="row"/>
-          <dgm:param type="contDir" val="sameDir"/>
-          <dgm:param type="off" val="ctr"/>
-          <dgm:param type="vertAlign" val="mid"/>
-          <dgm:param type="horzAlign" val="ctr"/>
-        </dgm:alg>
-      </dgm:else>
-    </dgm:choose>
-    <dgm:shape xmlns:r="http://schemas.openxmlformats.org/officeDocument/2006/relationships" r:blip="">
-      <dgm:adjLst/>
-    </dgm:shape>
-    <dgm:presOf/>
-    <dgm:choose name="Name3">
-      <dgm:if name="Name4" axis="ch" ptType="node" func="cnt" op="lte" val="2">
-        <dgm:constrLst>
-          <dgm:constr type="h" for="ch" forName="compNode" refType="h" fact="0.4"/>
-          <dgm:constr type="w" for="ch" forName="compNode" val="120"/>
-          <dgm:constr type="w" for="ch" forName="sibTrans" refType="w" refFor="ch" refForName="compNode" fact="0.175"/>
-          <dgm:constr type="sp" refType="w" refFor="ch" refForName="compNode" op="equ" fact="0.25"/>
-          <dgm:constr type="primFontSz" for="des" ptType="node" op="equ" val="50"/>
-          <dgm:constr type="h" for="des" forName="compNode" op="equ"/>
-          <dgm:constr type="h" for="des" forName="textRect" op="equ"/>
-        </dgm:constrLst>
-      </dgm:if>
-      <dgm:if name="Name5" axis="ch" ptType="node" func="cnt" op="lte" val="4">
-        <dgm:constrLst>
-          <dgm:constr type="h" for="ch" forName="compNode" refType="h" fact="0.4"/>
-          <dgm:constr type="w" for="ch" forName="compNode" refType="w"/>
-          <dgm:constr type="w" for="ch" forName="sibTrans" refType="w" refFor="ch" refForName="compNode" fact="0.175"/>
-          <dgm:constr type="sp" refType="w" refFor="ch" refForName="compNode" op="equ" fact="0.25"/>
-          <dgm:constr type="primFontSz" for="des" ptType="node" op="equ" val="36"/>
-          <dgm:constr type="h" for="des" forName="compNode" op="equ"/>
-          <dgm:constr type="h" for="des" forName="textRect" op="equ"/>
-        </dgm:constrLst>
-      </dgm:if>
-      <dgm:else name="Name6">
-        <dgm:constrLst>
-          <dgm:constr type="h" for="ch" forName="compNode" refType="h" fact="0.4"/>
-          <dgm:constr type="w" for="ch" forName="compNode" refType="w"/>
-          <dgm:constr type="w" for="ch" forName="sibTrans" refType="w" refFor="ch" refForName="compNode" fact="0.175"/>
-          <dgm:constr type="sp" refType="w" refFor="ch" refForName="compNode" op="equ" fact="0.25"/>
-          <dgm:constr type="primFontSz" for="des" ptType="node" op="equ" val="24"/>
-          <dgm:constr type="h" for="des" forName="compNode" op="equ"/>
-          <dgm:constr type="h" for="des" forName="textRect" op="equ"/>
-        </dgm:constrLst>
-      </dgm:else>
-    </dgm:choose>
-    <dgm:ruleLst>
-      <dgm:rule type="w" for="ch" forName="compNode" val="50" fact="NaN" max="NaN"/>
-    </dgm:ruleLst>
-    <dgm:forEach name="Name7" axis="ch" ptType="node">
-      <dgm:layoutNode name="compNode">
-        <dgm:alg type="composite"/>
-        <dgm:shape xmlns:r="http://schemas.openxmlformats.org/officeDocument/2006/relationships" r:blip="">
-          <dgm:adjLst/>
-        </dgm:shape>
-        <dgm:presOf axis="self"/>
-        <dgm:constrLst>
-          <dgm:constr type="w" for="ch" forName="iconRect" refType="w" fact="0.45"/>
-          <dgm:constr type="h" for="ch" forName="iconRect" refType="w" refFor="ch" refForName="iconRect"/>
-          <dgm:constr type="ctrX" for="ch" forName="iconRect" refType="w" fact="0.5"/>
-          <dgm:constr type="t" for="ch" forName="iconRect"/>
-          <dgm:constr type="h" for="ch" forName="spaceRect" refType="h" fact="0.15"/>
-          <dgm:constr type="w" for="ch" forName="spaceRect" refType="w"/>
-          <dgm:constr type="l" for="ch" forName="spaceRect"/>
-          <dgm:constr type="t" for="ch" forName="spaceRect" refType="b" refFor="ch" refForName="iconRect"/>
-          <dgm:constr type="h" for="ch" forName="textRect" val="20"/>
-          <dgm:constr type="w" for="ch" forName="textRect" refType="w"/>
-          <dgm:constr type="l" for="ch" forName="textRect"/>
-          <dgm:constr type="t" for="ch" forName="textRect" refType="b" refFor="ch" refForName="spaceRect"/>
-        </dgm:constrLst>
-        <dgm:ruleLst>
-          <dgm:rule type="h" val="INF" fact="NaN" max="NaN"/>
-        </dgm:ruleLst>
-        <dgm:layoutNode name="iconRect" styleLbl="node1">
-          <dgm:alg type="sp"/>
-          <dgm:shape xmlns:r="http://schemas.openxmlformats.org/officeDocument/2006/relationships" type="rect" r:blip="" blipPhldr="1">
-            <dgm:adjLst/>
-          </dgm:shape>
-          <dgm:presOf/>
-          <dgm:constrLst/>
-          <dgm:ruleLst/>
-        </dgm:layoutNode>
-        <dgm:layoutNode name="spaceRect">
-          <dgm:alg type="sp"/>
-          <dgm:shape xmlns:r="http://schemas.openxmlformats.org/officeDocument/2006/relationships" r:blip="">
-            <dgm:adjLst/>
-          </dgm:shape>
-          <dgm:presOf/>
-          <dgm:constrLst/>
-          <dgm:ruleLst/>
-        </dgm:layoutNode>
-        <dgm:layoutNode name="textRect" styleLbl="revTx">
-          <dgm:varLst>
-            <dgm:chMax val="1"/>
-            <dgm:chPref val="1"/>
-          </dgm:varLst>
-          <dgm:alg type="tx">
-            <dgm:param type="txAnchorVert" val="t"/>
-          </dgm:alg>
-          <dgm:shape xmlns:r="http://schemas.openxmlformats.org/officeDocument/2006/relationships" type="rect" r:blip="">
-            <dgm:adjLst/>
-          </dgm:shape>
-          <dgm:presOf axis="self" ptType="node"/>
-          <dgm:constrLst>
-            <dgm:constr type="lMarg"/>
-            <dgm:constr type="rMarg"/>
-            <dgm:constr type="tMarg"/>
-            <dgm:constr type="bMarg"/>
-          </dgm:constrLst>
-          <dgm:ruleLst>
-            <dgm:rule type="primFontSz" val="11" fact="NaN" max="NaN"/>
-            <dgm:rule type="h" val="INF" fact="NaN" max="NaN"/>
-          </dgm:ruleLst>
-        </dgm:layoutNode>
-      </dgm:layoutNode>
-      <dgm:forEach name="Name8" axis="followSib" ptType="sibTrans" cnt="1">
-        <dgm:layoutNode name="sibTrans">
-          <dgm:alg type="sp"/>
-          <dgm:shape xmlns:r="http://schemas.openxmlformats.org/officeDocument/2006/relationships" r:blip="">
-            <dgm:adjLst/>
-          </dgm:shape>
-          <dgm:presOf axis="self"/>
-          <dgm:constrLst/>
-          <dgm:ruleLst/>
-        </dgm:layoutNode>
-      </dgm:forEach>
-    </dgm:forEach>
-  </dgm:layoutNode>
-  <dgm:extLst>
-    <a:ext uri="{68A01E43-0DF5-4B5B-8FA6-DAF915123BFB}">
-      <dgm1612:lstStyle xmlns:dgm1612="http://schemas.microsoft.com/office/drawing/2016/12/diagram">
-        <a:lvl1pPr>
-          <a:lnSpc>
-            <a:spcPct val="100000"/>
-          </a:lnSpc>
-        </a:lvl1pPr>
-      </dgm1612:lstStyle>
-    </a:ext>
-  </dgm:extLst>
-</dgm:layoutDef>
-</file>
-
-<file path=ppt/diagrams/layout2.xml><?xml version="1.0" encoding="utf-8"?>
 <dgm:layoutDef xmlns:dgm="http://schemas.openxmlformats.org/drawingml/2006/diagram" xmlns:a="http://schemas.openxmlformats.org/drawingml/2006/main" uniqueId="urn:microsoft.com/office/officeart/2005/8/layout/cycle5">
   <dgm:title val=""/>
   <dgm:desc val=""/>
@@ -6014,6 +5824,196 @@
       </dgm:choose>
     </dgm:forEach>
   </dgm:layoutNode>
+</dgm:layoutDef>
+</file>
+
+<file path=ppt/diagrams/layout2.xml><?xml version="1.0" encoding="utf-8"?>
+<dgm:layoutDef xmlns:dgm="http://schemas.openxmlformats.org/drawingml/2006/diagram" xmlns:a="http://schemas.openxmlformats.org/drawingml/2006/main" uniqueId="urn:microsoft.com/office/officeart/2018/2/layout/IconLabelList">
+  <dgm:title val="Icon Label List"/>
+  <dgm:desc val="Use to show non-sequential or grouped chunks of information accompanied by a related visuals. Works best with icons or small pictures with short text captions."/>
+  <dgm:catLst>
+    <dgm:cat type="icon" pri="500"/>
+  </dgm:catLst>
+  <dgm:sampData useDef="1">
+    <dgm:dataModel>
+      <dgm:ptLst/>
+      <dgm:bg/>
+      <dgm:whole/>
+    </dgm:dataModel>
+  </dgm:sampData>
+  <dgm:styleData useDef="1">
+    <dgm:dataModel>
+      <dgm:ptLst/>
+      <dgm:bg/>
+      <dgm:whole/>
+    </dgm:dataModel>
+  </dgm:styleData>
+  <dgm:clrData useDef="1">
+    <dgm:dataModel>
+      <dgm:ptLst/>
+      <dgm:bg/>
+      <dgm:whole/>
+    </dgm:dataModel>
+  </dgm:clrData>
+  <dgm:layoutNode name="root">
+    <dgm:varLst>
+      <dgm:dir/>
+      <dgm:resizeHandles val="exact"/>
+    </dgm:varLst>
+    <dgm:choose name="Name0">
+      <dgm:if name="Name1" axis="self" func="var" arg="dir" op="equ" val="norm">
+        <dgm:alg type="snake">
+          <dgm:param type="grDir" val="tL"/>
+          <dgm:param type="flowDir" val="row"/>
+          <dgm:param type="contDir" val="sameDir"/>
+          <dgm:param type="off" val="ctr"/>
+          <dgm:param type="vertAlign" val="mid"/>
+          <dgm:param type="horzAlign" val="ctr"/>
+        </dgm:alg>
+      </dgm:if>
+      <dgm:else name="Name2">
+        <dgm:alg type="snake">
+          <dgm:param type="grDir" val="tR"/>
+          <dgm:param type="flowDir" val="row"/>
+          <dgm:param type="contDir" val="sameDir"/>
+          <dgm:param type="off" val="ctr"/>
+          <dgm:param type="vertAlign" val="mid"/>
+          <dgm:param type="horzAlign" val="ctr"/>
+        </dgm:alg>
+      </dgm:else>
+    </dgm:choose>
+    <dgm:shape xmlns:r="http://schemas.openxmlformats.org/officeDocument/2006/relationships" r:blip="">
+      <dgm:adjLst/>
+    </dgm:shape>
+    <dgm:presOf/>
+    <dgm:choose name="Name3">
+      <dgm:if name="Name4" axis="ch" ptType="node" func="cnt" op="lte" val="2">
+        <dgm:constrLst>
+          <dgm:constr type="h" for="ch" forName="compNode" refType="h" fact="0.4"/>
+          <dgm:constr type="w" for="ch" forName="compNode" val="120"/>
+          <dgm:constr type="w" for="ch" forName="sibTrans" refType="w" refFor="ch" refForName="compNode" fact="0.175"/>
+          <dgm:constr type="sp" refType="w" refFor="ch" refForName="compNode" op="equ" fact="0.25"/>
+          <dgm:constr type="primFontSz" for="des" ptType="node" op="equ" val="50"/>
+          <dgm:constr type="h" for="des" forName="compNode" op="equ"/>
+          <dgm:constr type="h" for="des" forName="textRect" op="equ"/>
+        </dgm:constrLst>
+      </dgm:if>
+      <dgm:if name="Name5" axis="ch" ptType="node" func="cnt" op="lte" val="4">
+        <dgm:constrLst>
+          <dgm:constr type="h" for="ch" forName="compNode" refType="h" fact="0.4"/>
+          <dgm:constr type="w" for="ch" forName="compNode" refType="w"/>
+          <dgm:constr type="w" for="ch" forName="sibTrans" refType="w" refFor="ch" refForName="compNode" fact="0.175"/>
+          <dgm:constr type="sp" refType="w" refFor="ch" refForName="compNode" op="equ" fact="0.25"/>
+          <dgm:constr type="primFontSz" for="des" ptType="node" op="equ" val="36"/>
+          <dgm:constr type="h" for="des" forName="compNode" op="equ"/>
+          <dgm:constr type="h" for="des" forName="textRect" op="equ"/>
+        </dgm:constrLst>
+      </dgm:if>
+      <dgm:else name="Name6">
+        <dgm:constrLst>
+          <dgm:constr type="h" for="ch" forName="compNode" refType="h" fact="0.4"/>
+          <dgm:constr type="w" for="ch" forName="compNode" refType="w"/>
+          <dgm:constr type="w" for="ch" forName="sibTrans" refType="w" refFor="ch" refForName="compNode" fact="0.175"/>
+          <dgm:constr type="sp" refType="w" refFor="ch" refForName="compNode" op="equ" fact="0.25"/>
+          <dgm:constr type="primFontSz" for="des" ptType="node" op="equ" val="24"/>
+          <dgm:constr type="h" for="des" forName="compNode" op="equ"/>
+          <dgm:constr type="h" for="des" forName="textRect" op="equ"/>
+        </dgm:constrLst>
+      </dgm:else>
+    </dgm:choose>
+    <dgm:ruleLst>
+      <dgm:rule type="w" for="ch" forName="compNode" val="50" fact="NaN" max="NaN"/>
+    </dgm:ruleLst>
+    <dgm:forEach name="Name7" axis="ch" ptType="node">
+      <dgm:layoutNode name="compNode">
+        <dgm:alg type="composite"/>
+        <dgm:shape xmlns:r="http://schemas.openxmlformats.org/officeDocument/2006/relationships" r:blip="">
+          <dgm:adjLst/>
+        </dgm:shape>
+        <dgm:presOf axis="self"/>
+        <dgm:constrLst>
+          <dgm:constr type="w" for="ch" forName="iconRect" refType="w" fact="0.45"/>
+          <dgm:constr type="h" for="ch" forName="iconRect" refType="w" refFor="ch" refForName="iconRect"/>
+          <dgm:constr type="ctrX" for="ch" forName="iconRect" refType="w" fact="0.5"/>
+          <dgm:constr type="t" for="ch" forName="iconRect"/>
+          <dgm:constr type="h" for="ch" forName="spaceRect" refType="h" fact="0.15"/>
+          <dgm:constr type="w" for="ch" forName="spaceRect" refType="w"/>
+          <dgm:constr type="l" for="ch" forName="spaceRect"/>
+          <dgm:constr type="t" for="ch" forName="spaceRect" refType="b" refFor="ch" refForName="iconRect"/>
+          <dgm:constr type="h" for="ch" forName="textRect" val="20"/>
+          <dgm:constr type="w" for="ch" forName="textRect" refType="w"/>
+          <dgm:constr type="l" for="ch" forName="textRect"/>
+          <dgm:constr type="t" for="ch" forName="textRect" refType="b" refFor="ch" refForName="spaceRect"/>
+        </dgm:constrLst>
+        <dgm:ruleLst>
+          <dgm:rule type="h" val="INF" fact="NaN" max="NaN"/>
+        </dgm:ruleLst>
+        <dgm:layoutNode name="iconRect" styleLbl="node1">
+          <dgm:alg type="sp"/>
+          <dgm:shape xmlns:r="http://schemas.openxmlformats.org/officeDocument/2006/relationships" type="rect" r:blip="" blipPhldr="1">
+            <dgm:adjLst/>
+          </dgm:shape>
+          <dgm:presOf/>
+          <dgm:constrLst/>
+          <dgm:ruleLst/>
+        </dgm:layoutNode>
+        <dgm:layoutNode name="spaceRect">
+          <dgm:alg type="sp"/>
+          <dgm:shape xmlns:r="http://schemas.openxmlformats.org/officeDocument/2006/relationships" r:blip="">
+            <dgm:adjLst/>
+          </dgm:shape>
+          <dgm:presOf/>
+          <dgm:constrLst/>
+          <dgm:ruleLst/>
+        </dgm:layoutNode>
+        <dgm:layoutNode name="textRect" styleLbl="revTx">
+          <dgm:varLst>
+            <dgm:chMax val="1"/>
+            <dgm:chPref val="1"/>
+          </dgm:varLst>
+          <dgm:alg type="tx">
+            <dgm:param type="txAnchorVert" val="t"/>
+          </dgm:alg>
+          <dgm:shape xmlns:r="http://schemas.openxmlformats.org/officeDocument/2006/relationships" type="rect" r:blip="">
+            <dgm:adjLst/>
+          </dgm:shape>
+          <dgm:presOf axis="self" ptType="node"/>
+          <dgm:constrLst>
+            <dgm:constr type="lMarg"/>
+            <dgm:constr type="rMarg"/>
+            <dgm:constr type="tMarg"/>
+            <dgm:constr type="bMarg"/>
+          </dgm:constrLst>
+          <dgm:ruleLst>
+            <dgm:rule type="primFontSz" val="11" fact="NaN" max="NaN"/>
+            <dgm:rule type="h" val="INF" fact="NaN" max="NaN"/>
+          </dgm:ruleLst>
+        </dgm:layoutNode>
+      </dgm:layoutNode>
+      <dgm:forEach name="Name8" axis="followSib" ptType="sibTrans" cnt="1">
+        <dgm:layoutNode name="sibTrans">
+          <dgm:alg type="sp"/>
+          <dgm:shape xmlns:r="http://schemas.openxmlformats.org/officeDocument/2006/relationships" r:blip="">
+            <dgm:adjLst/>
+          </dgm:shape>
+          <dgm:presOf axis="self"/>
+          <dgm:constrLst/>
+          <dgm:ruleLst/>
+        </dgm:layoutNode>
+      </dgm:forEach>
+    </dgm:forEach>
+  </dgm:layoutNode>
+  <dgm:extLst>
+    <a:ext uri="{68A01E43-0DF5-4B5B-8FA6-DAF915123BFB}">
+      <dgm1612:lstStyle xmlns:dgm1612="http://schemas.microsoft.com/office/drawing/2016/12/diagram">
+        <a:lvl1pPr>
+          <a:lnSpc>
+            <a:spcPct val="100000"/>
+          </a:lnSpc>
+        </a:lvl1pPr>
+      </dgm1612:lstStyle>
+    </a:ext>
+  </dgm:extLst>
 </dgm:layoutDef>
 </file>
 
@@ -9428,7 +9428,7 @@
           <a:p>
             <a:fld id="{FA6AF098-6159-9746-9D8A-604C3B2DE162}" type="datetimeFigureOut">
               <a:rPr lang="en-US" smtClean="0"/>
-              <a:t>12/11/20</a:t>
+              <a:t>1/23/21</a:t>
             </a:fld>
             <a:endParaRPr lang="en-US"/>
           </a:p>
@@ -9741,40 +9741,18 @@
           <a:lstStyle/>
           <a:p>
             <a:r>
-              <a:rPr lang="en-US" dirty="0"/>
-              <a:t>I have been supporting applications for over 7 years, from greenfield startups to long running corporate apps. </a:t>
-            </a:r>
-          </a:p>
-          <a:p>
-            <a:endParaRPr lang="en-US" dirty="0"/>
-          </a:p>
-          <a:p>
-            <a:r>
-              <a:rPr lang="en-US" dirty="0"/>
-              <a:t>https://</a:t>
-            </a:r>
-            <a:r>
-              <a:rPr lang="en-US" dirty="0" err="1"/>
-              <a:t>app.sli.do</a:t>
-            </a:r>
-            <a:r>
-              <a:rPr lang="en-US" dirty="0"/>
-              <a:t>/event/vg7bm29x/live/questions</a:t>
-            </a:r>
-          </a:p>
-          <a:p>
-            <a:endParaRPr lang="en-US" dirty="0"/>
-          </a:p>
-          <a:p>
-            <a:r>
-              <a:rPr lang="en-US" dirty="0"/>
-              <a:t>NOTES: Work on how you transition and have a story </a:t>
-            </a:r>
-            <a:r>
-              <a:rPr lang="en-US"/>
-              <a:t>per slide</a:t>
-            </a:r>
-            <a:endParaRPr lang="en-US" dirty="0"/>
+              <a:rPr lang="en-US" sz="2400" dirty="0"/>
+              <a:t>I have been supporting applications since 2010, from greenfield startups to long running corporate apps. </a:t>
+            </a:r>
+          </a:p>
+          <a:p>
+            <a:endParaRPr lang="en-US" sz="2400" dirty="0"/>
+          </a:p>
+          <a:p>
+            <a:r>
+              <a:rPr lang="en-US" sz="2400" dirty="0"/>
+              <a:t>I think that production support is one of those topics that is rarely discussed with staff involved with software delivery, and after a particularly intense 3 year project, my company asked me to write down my learnings, and that is how this presentation came about</a:t>
+            </a:r>
           </a:p>
         </p:txBody>
       </p:sp>
@@ -9860,7 +9838,7 @@
           <a:p>
             <a:r>
               <a:rPr lang="en-US" dirty="0"/>
-              <a:t>When a personal app of mine reached 30,000 downloads a few years back, I was really worried because I had no structure of maintaining that user base. And I realized that what I put out there into the wild, might get used by a lot of people.</a:t>
+              <a:t>I think it’s imperative that we consider software support a critical component of the software development lifecycle. If people are not involved with the maintenance of software, they may not be capable of spotting errors in new software or features that are developed by the team.</a:t>
             </a:r>
           </a:p>
           <a:p>
@@ -9869,7 +9847,7 @@
           <a:p>
             <a:r>
               <a:rPr lang="en-US" dirty="0"/>
-              <a:t>Rushing out to buy a mobile BLE printer when the sales team were at an international client</a:t>
+              <a:t>This is not advocating for blanket overnight production support, however I do believe that we should be a part of making our systems better</a:t>
             </a:r>
           </a:p>
           <a:p>
@@ -9877,148 +9855,12 @@
           </a:p>
           <a:p>
             <a:r>
-              <a:rPr lang="en-GB" sz="1200" b="0" i="0" kern="1200" dirty="0">
-                <a:solidFill>
-                  <a:schemeClr val="tx1"/>
-                </a:solidFill>
-                <a:effectLst/>
-                <a:latin typeface="+mn-lt"/>
-                <a:ea typeface="+mn-ea"/>
-                <a:cs typeface="+mn-cs"/>
-              </a:rPr>
-              <a:t>20th of April to the 20th of May 2018: TSB had over 1.9 million customers with no access to their accounts</a:t>
-            </a:r>
-          </a:p>
-          <a:p>
-            <a:r>
-              <a:rPr lang="en-GB" sz="1200" b="0" i="0" kern="1200" dirty="0">
-                <a:solidFill>
-                  <a:schemeClr val="tx1"/>
-                </a:solidFill>
-                <a:effectLst/>
-                <a:latin typeface="+mn-lt"/>
-                <a:ea typeface="+mn-ea"/>
-                <a:cs typeface="+mn-cs"/>
-              </a:rPr>
-              <a:t>December 2018: O2 3rd party certificate non-renewal lead to </a:t>
-            </a:r>
-            <a:r>
-              <a:rPr lang="en-US" sz="1200" b="0" i="0" kern="1200" dirty="0">
-                <a:solidFill>
-                  <a:schemeClr val="tx1"/>
-                </a:solidFill>
-                <a:effectLst/>
-                <a:latin typeface="+mn-lt"/>
-                <a:ea typeface="+mn-ea"/>
-                <a:cs typeface="+mn-cs"/>
-              </a:rPr>
-              <a:t>30 Million customers with no cellular access</a:t>
-            </a:r>
-          </a:p>
-          <a:p>
-            <a:endParaRPr lang="en-US" sz="1200" b="0" i="0" kern="1200" dirty="0">
-              <a:solidFill>
-                <a:schemeClr val="tx1"/>
-              </a:solidFill>
-              <a:effectLst/>
-              <a:latin typeface="+mn-lt"/>
-              <a:ea typeface="+mn-ea"/>
-              <a:cs typeface="+mn-cs"/>
-            </a:endParaRPr>
-          </a:p>
-          <a:p>
-            <a:r>
-              <a:rPr lang="en-US" sz="1200" b="0" i="0" kern="1200" dirty="0">
-                <a:solidFill>
-                  <a:schemeClr val="tx1"/>
-                </a:solidFill>
-                <a:effectLst/>
-                <a:latin typeface="+mn-lt"/>
-                <a:ea typeface="+mn-ea"/>
-                <a:cs typeface="+mn-cs"/>
-              </a:rPr>
-              <a:t>July 2020: Virgin Media is focused in media reports when 10,000 customer complaints were registered on </a:t>
-            </a:r>
-            <a:r>
-              <a:rPr lang="en-US" sz="1200" b="0" i="0" kern="1200" dirty="0" err="1">
-                <a:solidFill>
-                  <a:schemeClr val="tx1"/>
-                </a:solidFill>
-                <a:effectLst/>
-                <a:latin typeface="+mn-lt"/>
-                <a:ea typeface="+mn-ea"/>
-                <a:cs typeface="+mn-cs"/>
-              </a:rPr>
-              <a:t>DownDetector</a:t>
-            </a:r>
-            <a:r>
-              <a:rPr lang="en-US" sz="1200" b="0" i="0" kern="1200" dirty="0">
-                <a:solidFill>
-                  <a:schemeClr val="tx1"/>
-                </a:solidFill>
-                <a:effectLst/>
-                <a:latin typeface="+mn-lt"/>
-                <a:ea typeface="+mn-ea"/>
-                <a:cs typeface="+mn-cs"/>
-              </a:rPr>
-              <a:t> – 2</a:t>
-            </a:r>
-            <a:r>
-              <a:rPr lang="en-US" sz="1200" b="0" i="0" kern="1200" baseline="30000" dirty="0">
-                <a:solidFill>
-                  <a:schemeClr val="tx1"/>
-                </a:solidFill>
-                <a:effectLst/>
-                <a:latin typeface="+mn-lt"/>
-                <a:ea typeface="+mn-ea"/>
-                <a:cs typeface="+mn-cs"/>
-              </a:rPr>
-              <a:t>nd</a:t>
-            </a:r>
-            <a:r>
-              <a:rPr lang="en-US" sz="1200" b="0" i="0" kern="1200" dirty="0">
-                <a:solidFill>
-                  <a:schemeClr val="tx1"/>
-                </a:solidFill>
-                <a:effectLst/>
-                <a:latin typeface="+mn-lt"/>
-                <a:ea typeface="+mn-ea"/>
-                <a:cs typeface="+mn-cs"/>
-              </a:rPr>
-              <a:t> outage in 2 weeks</a:t>
-            </a:r>
-          </a:p>
-          <a:p>
-            <a:endParaRPr lang="en-US" sz="1200" b="0" i="0" kern="1200" dirty="0">
-              <a:solidFill>
-                <a:schemeClr val="tx1"/>
-              </a:solidFill>
-              <a:effectLst/>
-              <a:latin typeface="+mn-lt"/>
-              <a:ea typeface="+mn-ea"/>
-              <a:cs typeface="+mn-cs"/>
-            </a:endParaRPr>
-          </a:p>
-          <a:p>
-            <a:r>
-              <a:rPr lang="en-US" sz="1200" b="0" i="0" kern="1200" dirty="0">
-                <a:solidFill>
-                  <a:schemeClr val="tx1"/>
-                </a:solidFill>
-                <a:effectLst/>
-                <a:latin typeface="+mn-lt"/>
-                <a:ea typeface="+mn-ea"/>
-                <a:cs typeface="+mn-cs"/>
-              </a:rPr>
-              <a:t>July 2020: Facebook SDK’s cause Spotify, Pinterest, Tinder and other apps to fail</a:t>
-            </a:r>
+              <a:rPr lang="en-US" dirty="0"/>
+              <a:t>Other benefits of ensuring that software is maintained includes working with other team members with whom we may not usually work, and gaining practical domain level understanding</a:t>
+            </a:r>
+          </a:p>
+          <a:p>
             <a:endParaRPr lang="en-US" dirty="0"/>
-          </a:p>
-          <a:p>
-            <a:r>
-              <a:rPr lang="en-US" dirty="0"/>
-              <a:t>Aug 2020: Spotify TLS (Transport Layer Security) certificate was not up to date</a:t>
-            </a:r>
           </a:p>
           <a:p>
             <a:endParaRPr lang="en-US" dirty="0"/>
@@ -10051,7 +9893,7 @@
     </p:spTree>
     <p:extLst>
       <p:ext uri="{BB962C8B-B14F-4D97-AF65-F5344CB8AC3E}">
-        <p14:creationId xmlns:p14="http://schemas.microsoft.com/office/powerpoint/2010/main" val="1594046815"/>
+        <p14:creationId xmlns:p14="http://schemas.microsoft.com/office/powerpoint/2010/main" val="3197289261"/>
       </p:ext>
     </p:extLst>
   </p:cSld>
@@ -10107,11 +9949,196 @@
           <a:p>
             <a:r>
               <a:rPr lang="en-US" dirty="0"/>
-              <a:t>This is not advocating for blanket overnight production support, however I do believe that we should be a part of making our systems better</a:t>
+              <a:t>A few years ago, personal app of mine unexpectedly reached 30,000 downloads, The app was supposed to be a joke, someone created a reddit page and it’s popularity briefly soared. I was really concerned because I had no mechanism of supporting that user base. And I realized that no matter what I put out there into the wild, it might get used by a lot of people.</a:t>
             </a:r>
           </a:p>
           <a:p>
             <a:endParaRPr lang="en-US" dirty="0"/>
+          </a:p>
+          <a:p>
+            <a:r>
+              <a:rPr lang="en-GB" sz="1200" b="0" i="0" kern="1200" dirty="0">
+                <a:solidFill>
+                  <a:schemeClr val="tx1"/>
+                </a:solidFill>
+                <a:effectLst/>
+                <a:latin typeface="+mn-lt"/>
+                <a:ea typeface="+mn-ea"/>
+                <a:cs typeface="+mn-cs"/>
+              </a:rPr>
+              <a:t>20th of April to the 20th of May 2018: TSB had over 1.9 million customers with no access to their accounts</a:t>
+            </a:r>
+          </a:p>
+          <a:p>
+            <a:r>
+              <a:rPr lang="en-GB" sz="1200" b="0" i="0" kern="1200" dirty="0">
+                <a:solidFill>
+                  <a:schemeClr val="tx1"/>
+                </a:solidFill>
+                <a:effectLst/>
+                <a:latin typeface="+mn-lt"/>
+                <a:ea typeface="+mn-ea"/>
+                <a:cs typeface="+mn-cs"/>
+              </a:rPr>
+              <a:t>December 2018: O2 3rd party certificate non-renewal lead to </a:t>
+            </a:r>
+            <a:r>
+              <a:rPr lang="en-US" sz="1200" b="0" i="0" kern="1200" dirty="0">
+                <a:solidFill>
+                  <a:schemeClr val="tx1"/>
+                </a:solidFill>
+                <a:effectLst/>
+                <a:latin typeface="+mn-lt"/>
+                <a:ea typeface="+mn-ea"/>
+                <a:cs typeface="+mn-cs"/>
+              </a:rPr>
+              <a:t>30 Million customers with no cellular access</a:t>
+            </a:r>
+          </a:p>
+          <a:p>
+            <a:endParaRPr lang="en-US" sz="1200" b="0" i="0" kern="1200" dirty="0">
+              <a:solidFill>
+                <a:schemeClr val="tx1"/>
+              </a:solidFill>
+              <a:effectLst/>
+              <a:latin typeface="+mn-lt"/>
+              <a:ea typeface="+mn-ea"/>
+              <a:cs typeface="+mn-cs"/>
+            </a:endParaRPr>
+          </a:p>
+          <a:p>
+            <a:r>
+              <a:rPr lang="en-US" sz="1200" b="0" i="0" kern="1200" dirty="0">
+                <a:solidFill>
+                  <a:schemeClr val="tx1"/>
+                </a:solidFill>
+                <a:effectLst/>
+                <a:latin typeface="+mn-lt"/>
+                <a:ea typeface="+mn-ea"/>
+                <a:cs typeface="+mn-cs"/>
+              </a:rPr>
+              <a:t>July 2020: Virgin Media is focused in media reports when 10,000 customer complaints were registered on </a:t>
+            </a:r>
+            <a:r>
+              <a:rPr lang="en-US" sz="1200" b="0" i="0" kern="1200" dirty="0" err="1">
+                <a:solidFill>
+                  <a:schemeClr val="tx1"/>
+                </a:solidFill>
+                <a:effectLst/>
+                <a:latin typeface="+mn-lt"/>
+                <a:ea typeface="+mn-ea"/>
+                <a:cs typeface="+mn-cs"/>
+              </a:rPr>
+              <a:t>DownDetector</a:t>
+            </a:r>
+            <a:r>
+              <a:rPr lang="en-US" sz="1200" b="0" i="0" kern="1200" dirty="0">
+                <a:solidFill>
+                  <a:schemeClr val="tx1"/>
+                </a:solidFill>
+                <a:effectLst/>
+                <a:latin typeface="+mn-lt"/>
+                <a:ea typeface="+mn-ea"/>
+                <a:cs typeface="+mn-cs"/>
+              </a:rPr>
+              <a:t> – 2</a:t>
+            </a:r>
+            <a:r>
+              <a:rPr lang="en-US" sz="1200" b="0" i="0" kern="1200" baseline="30000" dirty="0">
+                <a:solidFill>
+                  <a:schemeClr val="tx1"/>
+                </a:solidFill>
+                <a:effectLst/>
+                <a:latin typeface="+mn-lt"/>
+                <a:ea typeface="+mn-ea"/>
+                <a:cs typeface="+mn-cs"/>
+              </a:rPr>
+              <a:t>nd</a:t>
+            </a:r>
+            <a:r>
+              <a:rPr lang="en-US" sz="1200" b="0" i="0" kern="1200" dirty="0">
+                <a:solidFill>
+                  <a:schemeClr val="tx1"/>
+                </a:solidFill>
+                <a:effectLst/>
+                <a:latin typeface="+mn-lt"/>
+                <a:ea typeface="+mn-ea"/>
+                <a:cs typeface="+mn-cs"/>
+              </a:rPr>
+              <a:t> outage in 2 weeks</a:t>
+            </a:r>
+          </a:p>
+          <a:p>
+            <a:endParaRPr lang="en-US" sz="1200" b="0" i="0" kern="1200" dirty="0">
+              <a:solidFill>
+                <a:schemeClr val="tx1"/>
+              </a:solidFill>
+              <a:effectLst/>
+              <a:latin typeface="+mn-lt"/>
+              <a:ea typeface="+mn-ea"/>
+              <a:cs typeface="+mn-cs"/>
+            </a:endParaRPr>
+          </a:p>
+          <a:p>
+            <a:r>
+              <a:rPr lang="en-US" sz="1200" b="0" i="0" kern="1200" dirty="0">
+                <a:solidFill>
+                  <a:schemeClr val="tx1"/>
+                </a:solidFill>
+                <a:effectLst/>
+                <a:latin typeface="+mn-lt"/>
+                <a:ea typeface="+mn-ea"/>
+                <a:cs typeface="+mn-cs"/>
+              </a:rPr>
+              <a:t>July 2020: Facebook SDK’s cause Spotify, Pinterest, Tinder and other apps to fail</a:t>
+            </a:r>
+            <a:endParaRPr lang="en-US" dirty="0"/>
+          </a:p>
+          <a:p>
+            <a:r>
+              <a:rPr lang="en-US" dirty="0"/>
+              <a:t>Aug 2020: Spotify TLS (Transport Layer Security) certificate was not up to date</a:t>
+            </a:r>
+          </a:p>
+          <a:p>
+            <a:endParaRPr lang="en-US" dirty="0"/>
+          </a:p>
+          <a:p>
+            <a:r>
+              <a:rPr lang="en-US" dirty="0"/>
+              <a:t>Dec 14 2020: Google single sign on went down for an hour, preventing user access to YouTube, Gmail and other services</a:t>
+            </a:r>
+          </a:p>
+          <a:p>
+            <a:r>
+              <a:rPr lang="en-US" dirty="0"/>
+              <a:t>Most recently Signal, a messenger app, has suddenly gained popularity due to </a:t>
+            </a:r>
+            <a:r>
+              <a:rPr lang="en-US" dirty="0" err="1"/>
+              <a:t>cconsumer</a:t>
+            </a:r>
+            <a:r>
+              <a:rPr lang="en-US" dirty="0"/>
+              <a:t> reluctance to adhere to privacy policy changes in WhatsApp</a:t>
+            </a:r>
+          </a:p>
+          <a:p>
+            <a:endParaRPr lang="en-US" dirty="0"/>
+          </a:p>
+          <a:p>
+            <a:r>
+              <a:rPr lang="en-US" dirty="0"/>
+              <a:t>There is no </a:t>
+            </a:r>
+            <a:r>
+              <a:rPr lang="en-US" dirty="0" err="1"/>
+              <a:t>doubtt</a:t>
+            </a:r>
+            <a:r>
+              <a:rPr lang="en-US" dirty="0"/>
+              <a:t> that even the biggest of giants are capable of slip ups, and how we manage ourselves can make all the difference.</a:t>
+            </a:r>
           </a:p>
         </p:txBody>
       </p:sp>
@@ -10141,7 +10168,7 @@
     </p:spTree>
     <p:extLst>
       <p:ext uri="{BB962C8B-B14F-4D97-AF65-F5344CB8AC3E}">
-        <p14:creationId xmlns:p14="http://schemas.microsoft.com/office/powerpoint/2010/main" val="3197289261"/>
+        <p14:creationId xmlns:p14="http://schemas.microsoft.com/office/powerpoint/2010/main" val="1594046815"/>
       </p:ext>
     </p:extLst>
   </p:cSld>
@@ -10333,7 +10360,7 @@
             </a:r>
           </a:p>
           <a:p>
-            <a:pPr marL="0" marR="0" lvl="0" indent="0" algn="l" defTabSz="914400" rtl="0" eaLnBrk="1" fontAlgn="auto" latinLnBrk="0" hangingPunct="1">
+            <a:pPr marL="171450" marR="0" lvl="0" indent="-171450" algn="l" defTabSz="914400" rtl="0" eaLnBrk="1" fontAlgn="auto" latinLnBrk="0" hangingPunct="1">
               <a:lnSpc>
                 <a:spcPct val="100000"/>
               </a:lnSpc>
@@ -10345,14 +10372,45 @@
               </a:spcAft>
               <a:buClrTx/>
               <a:buSzTx/>
-              <a:buFontTx/>
-              <a:buNone/>
+              <a:buFont typeface="Arial" panose="020B0604020202020204" pitchFamily="34" charset="0"/>
+              <a:buChar char="•"/>
               <a:tabLst/>
               <a:defRPr/>
             </a:pPr>
             <a:r>
               <a:rPr lang="en-US" dirty="0"/>
-              <a:t>* Hardware Secure Module – Primary on load balancing and Secondary at communications management</a:t>
+              <a:t>Hardware Secure Module – Primary on load balancing and Secondary at communications management</a:t>
+            </a:r>
+          </a:p>
+          <a:p>
+            <a:pPr marL="171450" marR="0" lvl="0" indent="-171450" algn="l" defTabSz="914400" rtl="0" eaLnBrk="1" fontAlgn="auto" latinLnBrk="0" hangingPunct="1">
+              <a:lnSpc>
+                <a:spcPct val="100000"/>
+              </a:lnSpc>
+              <a:spcBef>
+                <a:spcPts val="0"/>
+              </a:spcBef>
+              <a:spcAft>
+                <a:spcPts val="0"/>
+              </a:spcAft>
+              <a:buClrTx/>
+              <a:buSzTx/>
+              <a:buFont typeface="Arial" panose="020B0604020202020204" pitchFamily="34" charset="0"/>
+              <a:buChar char="•"/>
+              <a:tabLst/>
+              <a:defRPr/>
+            </a:pPr>
+            <a:r>
+              <a:rPr lang="en-US" dirty="0"/>
+              <a:t>BLE </a:t>
+            </a:r>
+            <a:r>
+              <a:rPr lang="en-US" dirty="0" err="1"/>
+              <a:t>printer:The</a:t>
+            </a:r>
+            <a:r>
+              <a:rPr lang="en-US" dirty="0"/>
+              <a:t> sales team called me from an international client and I had to run out and source a mobile Bluetooth low energy printer</a:t>
             </a:r>
           </a:p>
         </p:txBody>
@@ -10466,64 +10524,54 @@
           <a:p>
             <a:r>
               <a:rPr lang="en-US" dirty="0"/>
-              <a:t>Know where your report came from:</a:t>
-            </a:r>
-          </a:p>
-          <a:p>
-            <a:r>
-              <a:rPr lang="en-GB" sz="1200" b="0" i="0" kern="1200" dirty="0">
-                <a:solidFill>
-                  <a:schemeClr val="tx1"/>
-                </a:solidFill>
-                <a:effectLst/>
-                <a:latin typeface="+mn-lt"/>
-                <a:ea typeface="+mn-ea"/>
-                <a:cs typeface="+mn-cs"/>
-              </a:rPr>
-              <a:t> - Social media / Call centre complaints - some experience is being affected and is more likely a subset of devices (e.g. Samsung Android devices) or a downstream service could be slow.</a:t>
-            </a:r>
-          </a:p>
-          <a:p>
-            <a:r>
-              <a:rPr lang="en-GB" sz="1200" b="0" i="0" kern="1200" dirty="0">
-                <a:solidFill>
-                  <a:schemeClr val="tx1"/>
-                </a:solidFill>
-                <a:effectLst/>
-                <a:latin typeface="+mn-lt"/>
-                <a:ea typeface="+mn-ea"/>
-                <a:cs typeface="+mn-cs"/>
-              </a:rPr>
-              <a:t> - Historic baseline delta spike - normally these are anomalies, like people doing more or less transactions during Christmas or New Years.</a:t>
-            </a:r>
-          </a:p>
-          <a:p>
-            <a:r>
-              <a:rPr lang="en-GB" sz="1200" b="0" i="0" kern="1200" dirty="0">
-                <a:solidFill>
-                  <a:schemeClr val="tx1"/>
-                </a:solidFill>
-                <a:effectLst/>
-                <a:latin typeface="+mn-lt"/>
-                <a:ea typeface="+mn-ea"/>
-                <a:cs typeface="+mn-cs"/>
-              </a:rPr>
-              <a:t> - Management personal account - sometimes a high level manager with a production account will report a problem to the support team. These are normally a personal connectivity issue.</a:t>
-            </a:r>
-          </a:p>
-          <a:p>
-            <a:r>
-              <a:rPr lang="en-GB" sz="1200" b="0" i="0" kern="1200" dirty="0">
-                <a:solidFill>
-                  <a:schemeClr val="tx1"/>
-                </a:solidFill>
-                <a:effectLst/>
-                <a:latin typeface="+mn-lt"/>
-                <a:ea typeface="+mn-ea"/>
-                <a:cs typeface="+mn-cs"/>
-              </a:rPr>
-              <a:t> - Crash rate increase - these are the most concerning as there is usually something really serious going on.</a:t>
-            </a:r>
+              <a:t>Questions that are useful are those that are asked with a specific purpose. Questions can be asked</a:t>
+            </a:r>
+          </a:p>
+          <a:p>
+            <a:pPr marL="171450" indent="-171450">
+              <a:buFont typeface="Arial" panose="020B0604020202020204" pitchFamily="34" charset="0"/>
+              <a:buChar char="•"/>
+            </a:pPr>
+            <a:r>
+              <a:rPr lang="en-US" dirty="0"/>
+              <a:t>Because the answer is important</a:t>
+            </a:r>
+          </a:p>
+          <a:p>
+            <a:pPr marL="171450" indent="-171450">
+              <a:buFont typeface="Arial" panose="020B0604020202020204" pitchFamily="34" charset="0"/>
+              <a:buChar char="•"/>
+            </a:pPr>
+            <a:r>
+              <a:rPr lang="en-US" dirty="0"/>
+              <a:t>Because the question itself is important</a:t>
+            </a:r>
+          </a:p>
+          <a:p>
+            <a:pPr marL="171450" indent="-171450">
+              <a:buFont typeface="Arial" panose="020B0604020202020204" pitchFamily="34" charset="0"/>
+              <a:buChar char="•"/>
+            </a:pPr>
+            <a:r>
+              <a:rPr lang="en-US" dirty="0"/>
+              <a:t>Because the process of answering the question is important</a:t>
+            </a:r>
+          </a:p>
+          <a:p>
+            <a:pPr marL="171450" indent="-171450">
+              <a:buFont typeface="Arial" panose="020B0604020202020204" pitchFamily="34" charset="0"/>
+              <a:buChar char="•"/>
+            </a:pPr>
+            <a:endParaRPr lang="en-US" dirty="0"/>
+          </a:p>
+          <a:p>
+            <a:r>
+              <a:rPr lang="en-US" dirty="0"/>
+              <a:t>What is vital is that questions are not used to intimidate</a:t>
+            </a:r>
+          </a:p>
+          <a:p>
+            <a:endParaRPr lang="en-US" dirty="0"/>
           </a:p>
           <a:p>
             <a:endParaRPr lang="en-US" dirty="0"/>
@@ -10667,6 +10715,9 @@
               </a:rPr>
               <a:t> - Reflection: how would we do it differently?</a:t>
             </a:r>
+          </a:p>
+          <a:p>
+            <a:endParaRPr lang="en-US" dirty="0"/>
           </a:p>
           <a:p>
             <a:endParaRPr lang="en-US" dirty="0"/>
@@ -10776,6 +10827,72 @@
           <a:p>
             <a:r>
               <a:rPr lang="en-US" dirty="0"/>
+              <a:t>When identifying the source your report came from:</a:t>
+            </a:r>
+          </a:p>
+          <a:p>
+            <a:r>
+              <a:rPr lang="en-GB" sz="1200" b="0" i="0" kern="1200" dirty="0">
+                <a:solidFill>
+                  <a:schemeClr val="tx1"/>
+                </a:solidFill>
+                <a:effectLst/>
+                <a:latin typeface="+mn-lt"/>
+                <a:ea typeface="+mn-ea"/>
+                <a:cs typeface="+mn-cs"/>
+              </a:rPr>
+              <a:t> - Social media / Call centre complaints - some experience is being affected and is more likely a subset of devices (e.g. Samsung Android devices) or a downstream service could be slow.</a:t>
+            </a:r>
+          </a:p>
+          <a:p>
+            <a:r>
+              <a:rPr lang="en-GB" sz="1200" b="0" i="0" kern="1200" dirty="0">
+                <a:solidFill>
+                  <a:schemeClr val="tx1"/>
+                </a:solidFill>
+                <a:effectLst/>
+                <a:latin typeface="+mn-lt"/>
+                <a:ea typeface="+mn-ea"/>
+                <a:cs typeface="+mn-cs"/>
+              </a:rPr>
+              <a:t> - Historic baseline delta spike - normally these are anomalies, like people doing more or less transactions during Christmas or New Years.</a:t>
+            </a:r>
+          </a:p>
+          <a:p>
+            <a:r>
+              <a:rPr lang="en-GB" sz="1200" b="0" i="0" kern="1200" dirty="0">
+                <a:solidFill>
+                  <a:schemeClr val="tx1"/>
+                </a:solidFill>
+                <a:effectLst/>
+                <a:latin typeface="+mn-lt"/>
+                <a:ea typeface="+mn-ea"/>
+                <a:cs typeface="+mn-cs"/>
+              </a:rPr>
+              <a:t> - Management personal account - sometimes a high level manager with a production account will report a problem to the support team. These are normally a personal connectivity issue.</a:t>
+            </a:r>
+          </a:p>
+          <a:p>
+            <a:r>
+              <a:rPr lang="en-GB" sz="1200" b="0" i="0" kern="1200" dirty="0">
+                <a:solidFill>
+                  <a:schemeClr val="tx1"/>
+                </a:solidFill>
+                <a:effectLst/>
+                <a:latin typeface="+mn-lt"/>
+                <a:ea typeface="+mn-ea"/>
+                <a:cs typeface="+mn-cs"/>
+              </a:rPr>
+              <a:t> - Crash rate increase - these are the most concerning as there is usually something really serious going on.</a:t>
+            </a:r>
+            <a:endParaRPr lang="en-US" dirty="0"/>
+          </a:p>
+          <a:p>
+            <a:endParaRPr lang="en-US" dirty="0"/>
+          </a:p>
+          <a:p>
+            <a:r>
+              <a:rPr lang="en-US" dirty="0"/>
               <a:t>Ensure </a:t>
             </a:r>
           </a:p>
@@ -10975,6 +11092,16 @@
             <a:r>
               <a:rPr lang="en-US" dirty="0"/>
               <a:t> - Once I was being pushed so hard for a fix I ended up creating 10 pull requests because people would not stop ”just pinging” me</a:t>
+            </a:r>
+          </a:p>
+          <a:p>
+            <a:pPr marL="0" indent="0">
+              <a:buFont typeface="Arial" panose="020B0604020202020204" pitchFamily="34" charset="0"/>
+              <a:buNone/>
+            </a:pPr>
+            <a:r>
+              <a:rPr lang="en-US" dirty="0"/>
+              <a:t> - A IP6 issue on some android devices was resulting packet loss, and was actually the service providers job to fix, but we had no way of measuring that</a:t>
             </a:r>
           </a:p>
         </p:txBody>
@@ -11181,7 +11308,16 @@
           <a:p>
             <a:r>
               <a:rPr lang="en-US" dirty="0"/>
-              <a:t>It’s dangerous to be the guy everyone relies on, it’s just as bad NOT being that guy</a:t>
+              <a:t>It’s dangerous to be the guy everyone relies on, but you never want to be someone that people HAVE to rely on</a:t>
+            </a:r>
+          </a:p>
+          <a:p>
+            <a:endParaRPr lang="en-US" dirty="0"/>
+          </a:p>
+          <a:p>
+            <a:r>
+              <a:rPr lang="en-US" dirty="0"/>
+              <a:t>Stories – through oversight, I ended up being the only person on the support team with production access to a certain feature. If that feature went down, I would need to be called out every time.</a:t>
             </a:r>
           </a:p>
         </p:txBody>
@@ -11455,7 +11591,7 @@
           <a:p>
             <a:fld id="{99599B4E-256E-AD40-A7B8-8F0574836C36}" type="datetimeFigureOut">
               <a:rPr lang="en-US" smtClean="0"/>
-              <a:t>12/11/20</a:t>
+              <a:t>1/23/21</a:t>
             </a:fld>
             <a:endParaRPr lang="en-US"/>
           </a:p>
@@ -11655,7 +11791,7 @@
           <a:p>
             <a:fld id="{99599B4E-256E-AD40-A7B8-8F0574836C36}" type="datetimeFigureOut">
               <a:rPr lang="en-US" smtClean="0"/>
-              <a:t>12/11/20</a:t>
+              <a:t>1/23/21</a:t>
             </a:fld>
             <a:endParaRPr lang="en-US"/>
           </a:p>
@@ -11865,7 +12001,7 @@
           <a:p>
             <a:fld id="{99599B4E-256E-AD40-A7B8-8F0574836C36}" type="datetimeFigureOut">
               <a:rPr lang="en-US" smtClean="0"/>
-              <a:t>12/11/20</a:t>
+              <a:t>1/23/21</a:t>
             </a:fld>
             <a:endParaRPr lang="en-US"/>
           </a:p>
@@ -12065,7 +12201,7 @@
           <a:p>
             <a:fld id="{99599B4E-256E-AD40-A7B8-8F0574836C36}" type="datetimeFigureOut">
               <a:rPr lang="en-US" smtClean="0"/>
-              <a:t>12/11/20</a:t>
+              <a:t>1/23/21</a:t>
             </a:fld>
             <a:endParaRPr lang="en-US"/>
           </a:p>
@@ -12341,7 +12477,7 @@
           <a:p>
             <a:fld id="{99599B4E-256E-AD40-A7B8-8F0574836C36}" type="datetimeFigureOut">
               <a:rPr lang="en-US" smtClean="0"/>
-              <a:t>12/11/20</a:t>
+              <a:t>1/23/21</a:t>
             </a:fld>
             <a:endParaRPr lang="en-US"/>
           </a:p>
@@ -12609,7 +12745,7 @@
           <a:p>
             <a:fld id="{99599B4E-256E-AD40-A7B8-8F0574836C36}" type="datetimeFigureOut">
               <a:rPr lang="en-US" smtClean="0"/>
-              <a:t>12/11/20</a:t>
+              <a:t>1/23/21</a:t>
             </a:fld>
             <a:endParaRPr lang="en-US"/>
           </a:p>
@@ -13024,7 +13160,7 @@
           <a:p>
             <a:fld id="{99599B4E-256E-AD40-A7B8-8F0574836C36}" type="datetimeFigureOut">
               <a:rPr lang="en-US" smtClean="0"/>
-              <a:t>12/11/20</a:t>
+              <a:t>1/23/21</a:t>
             </a:fld>
             <a:endParaRPr lang="en-US"/>
           </a:p>
@@ -13166,7 +13302,7 @@
           <a:p>
             <a:fld id="{99599B4E-256E-AD40-A7B8-8F0574836C36}" type="datetimeFigureOut">
               <a:rPr lang="en-US" smtClean="0"/>
-              <a:t>12/11/20</a:t>
+              <a:t>1/23/21</a:t>
             </a:fld>
             <a:endParaRPr lang="en-US"/>
           </a:p>
@@ -13279,7 +13415,7 @@
           <a:p>
             <a:fld id="{99599B4E-256E-AD40-A7B8-8F0574836C36}" type="datetimeFigureOut">
               <a:rPr lang="en-US" smtClean="0"/>
-              <a:t>12/11/20</a:t>
+              <a:t>1/23/21</a:t>
             </a:fld>
             <a:endParaRPr lang="en-US"/>
           </a:p>
@@ -13592,7 +13728,7 @@
           <a:p>
             <a:fld id="{99599B4E-256E-AD40-A7B8-8F0574836C36}" type="datetimeFigureOut">
               <a:rPr lang="en-US" smtClean="0"/>
-              <a:t>12/11/20</a:t>
+              <a:t>1/23/21</a:t>
             </a:fld>
             <a:endParaRPr lang="en-US"/>
           </a:p>
@@ -13881,7 +14017,7 @@
           <a:p>
             <a:fld id="{99599B4E-256E-AD40-A7B8-8F0574836C36}" type="datetimeFigureOut">
               <a:rPr lang="en-US" smtClean="0"/>
-              <a:t>12/11/20</a:t>
+              <a:t>1/23/21</a:t>
             </a:fld>
             <a:endParaRPr lang="en-US"/>
           </a:p>
@@ -14124,7 +14260,7 @@
           <a:p>
             <a:fld id="{99599B4E-256E-AD40-A7B8-8F0574836C36}" type="datetimeFigureOut">
               <a:rPr lang="en-US" smtClean="0"/>
-              <a:t>12/11/20</a:t>
+              <a:t>1/23/21</a:t>
             </a:fld>
             <a:endParaRPr lang="en-US"/>
           </a:p>
@@ -14888,95 +15024,6 @@
 <file path=ppt/slides/slide2.xml><?xml version="1.0" encoding="utf-8"?>
 <p:sld xmlns:a="http://schemas.openxmlformats.org/drawingml/2006/main" xmlns:r="http://schemas.openxmlformats.org/officeDocument/2006/relationships" xmlns:p="http://schemas.openxmlformats.org/presentationml/2006/main">
   <p:cSld>
-    <p:spTree>
-      <p:nvGrpSpPr>
-        <p:cNvPr id="1" name=""/>
-        <p:cNvGrpSpPr/>
-        <p:nvPr/>
-      </p:nvGrpSpPr>
-      <p:grpSpPr>
-        <a:xfrm>
-          <a:off x="0" y="0"/>
-          <a:ext cx="0" cy="0"/>
-          <a:chOff x="0" y="0"/>
-          <a:chExt cx="0" cy="0"/>
-        </a:xfrm>
-      </p:grpSpPr>
-      <p:sp>
-        <p:nvSpPr>
-          <p:cNvPr id="2" name="Title 1">
-            <a:extLst>
-              <a:ext uri="{FF2B5EF4-FFF2-40B4-BE49-F238E27FC236}">
-                <a16:creationId xmlns:a16="http://schemas.microsoft.com/office/drawing/2014/main" id="{3F241BAB-EF7F-134E-BA49-4C2F3030B4F7}"/>
-              </a:ext>
-            </a:extLst>
-          </p:cNvPr>
-          <p:cNvSpPr>
-            <a:spLocks noGrp="1"/>
-          </p:cNvSpPr>
-          <p:nvPr>
-            <p:ph type="title"/>
-          </p:nvPr>
-        </p:nvSpPr>
-        <p:spPr/>
-        <p:txBody>
-          <a:bodyPr/>
-          <a:lstStyle/>
-          <a:p>
-            <a:r>
-              <a:rPr lang="en-US" dirty="0"/>
-              <a:t>Supporting a production application</a:t>
-            </a:r>
-          </a:p>
-        </p:txBody>
-      </p:sp>
-      <p:graphicFrame>
-        <p:nvGraphicFramePr>
-          <p:cNvPr id="5" name="Content Placeholder 2">
-            <a:extLst>
-              <a:ext uri="{FF2B5EF4-FFF2-40B4-BE49-F238E27FC236}">
-                <a16:creationId xmlns:a16="http://schemas.microsoft.com/office/drawing/2014/main" id="{D2CAD7BB-D124-4A10-9353-0575A899B3C9}"/>
-              </a:ext>
-            </a:extLst>
-          </p:cNvPr>
-          <p:cNvGraphicFramePr>
-            <a:graphicFrameLocks noGrp="1"/>
-          </p:cNvGraphicFramePr>
-          <p:nvPr>
-            <p:ph idx="1"/>
-            <p:extLst>
-              <p:ext uri="{D42A27DB-BD31-4B8C-83A1-F6EECF244321}">
-                <p14:modId xmlns:p14="http://schemas.microsoft.com/office/powerpoint/2010/main" val="180642728"/>
-              </p:ext>
-            </p:extLst>
-          </p:nvPr>
-        </p:nvGraphicFramePr>
-        <p:xfrm>
-          <a:off x="838200" y="1825625"/>
-          <a:ext cx="10515600" cy="4351338"/>
-        </p:xfrm>
-        <a:graphic>
-          <a:graphicData uri="http://schemas.openxmlformats.org/drawingml/2006/diagram">
-            <dgm:relIds xmlns:dgm="http://schemas.openxmlformats.org/drawingml/2006/diagram" xmlns:r="http://schemas.openxmlformats.org/officeDocument/2006/relationships" r:dm="rId3" r:lo="rId4" r:qs="rId5" r:cs="rId6"/>
-          </a:graphicData>
-        </a:graphic>
-      </p:graphicFrame>
-    </p:spTree>
-    <p:extLst>
-      <p:ext uri="{BB962C8B-B14F-4D97-AF65-F5344CB8AC3E}">
-        <p14:creationId xmlns:p14="http://schemas.microsoft.com/office/powerpoint/2010/main" val="1774402811"/>
-      </p:ext>
-    </p:extLst>
-  </p:cSld>
-  <p:clrMapOvr>
-    <a:masterClrMapping/>
-  </p:clrMapOvr>
-</p:sld>
-</file>
-
-<file path=ppt/slides/slide3.xml><?xml version="1.0" encoding="utf-8"?>
-<p:sld xmlns:a="http://schemas.openxmlformats.org/drawingml/2006/main" xmlns:r="http://schemas.openxmlformats.org/officeDocument/2006/relationships" xmlns:p="http://schemas.openxmlformats.org/presentationml/2006/main">
-  <p:cSld>
     <p:bg>
       <p:bgPr>
         <a:solidFill>
@@ -15436,6 +15483,95 @@
     <p:extLst>
       <p:ext uri="{BB962C8B-B14F-4D97-AF65-F5344CB8AC3E}">
         <p14:creationId xmlns:p14="http://schemas.microsoft.com/office/powerpoint/2010/main" val="1961603102"/>
+      </p:ext>
+    </p:extLst>
+  </p:cSld>
+  <p:clrMapOvr>
+    <a:masterClrMapping/>
+  </p:clrMapOvr>
+</p:sld>
+</file>
+
+<file path=ppt/slides/slide3.xml><?xml version="1.0" encoding="utf-8"?>
+<p:sld xmlns:a="http://schemas.openxmlformats.org/drawingml/2006/main" xmlns:r="http://schemas.openxmlformats.org/officeDocument/2006/relationships" xmlns:p="http://schemas.openxmlformats.org/presentationml/2006/main">
+  <p:cSld>
+    <p:spTree>
+      <p:nvGrpSpPr>
+        <p:cNvPr id="1" name=""/>
+        <p:cNvGrpSpPr/>
+        <p:nvPr/>
+      </p:nvGrpSpPr>
+      <p:grpSpPr>
+        <a:xfrm>
+          <a:off x="0" y="0"/>
+          <a:ext cx="0" cy="0"/>
+          <a:chOff x="0" y="0"/>
+          <a:chExt cx="0" cy="0"/>
+        </a:xfrm>
+      </p:grpSpPr>
+      <p:sp>
+        <p:nvSpPr>
+          <p:cNvPr id="2" name="Title 1">
+            <a:extLst>
+              <a:ext uri="{FF2B5EF4-FFF2-40B4-BE49-F238E27FC236}">
+                <a16:creationId xmlns:a16="http://schemas.microsoft.com/office/drawing/2014/main" id="{3F241BAB-EF7F-134E-BA49-4C2F3030B4F7}"/>
+              </a:ext>
+            </a:extLst>
+          </p:cNvPr>
+          <p:cNvSpPr>
+            <a:spLocks noGrp="1"/>
+          </p:cNvSpPr>
+          <p:nvPr>
+            <p:ph type="title"/>
+          </p:nvPr>
+        </p:nvSpPr>
+        <p:spPr/>
+        <p:txBody>
+          <a:bodyPr/>
+          <a:lstStyle/>
+          <a:p>
+            <a:r>
+              <a:rPr lang="en-US" dirty="0"/>
+              <a:t>Supporting a production application</a:t>
+            </a:r>
+          </a:p>
+        </p:txBody>
+      </p:sp>
+      <p:graphicFrame>
+        <p:nvGraphicFramePr>
+          <p:cNvPr id="5" name="Content Placeholder 2">
+            <a:extLst>
+              <a:ext uri="{FF2B5EF4-FFF2-40B4-BE49-F238E27FC236}">
+                <a16:creationId xmlns:a16="http://schemas.microsoft.com/office/drawing/2014/main" id="{D2CAD7BB-D124-4A10-9353-0575A899B3C9}"/>
+              </a:ext>
+            </a:extLst>
+          </p:cNvPr>
+          <p:cNvGraphicFramePr>
+            <a:graphicFrameLocks noGrp="1"/>
+          </p:cNvGraphicFramePr>
+          <p:nvPr>
+            <p:ph idx="1"/>
+            <p:extLst>
+              <p:ext uri="{D42A27DB-BD31-4B8C-83A1-F6EECF244321}">
+                <p14:modId xmlns:p14="http://schemas.microsoft.com/office/powerpoint/2010/main" val="180642728"/>
+              </p:ext>
+            </p:extLst>
+          </p:nvPr>
+        </p:nvGraphicFramePr>
+        <p:xfrm>
+          <a:off x="838200" y="1825625"/>
+          <a:ext cx="10515600" cy="4351338"/>
+        </p:xfrm>
+        <a:graphic>
+          <a:graphicData uri="http://schemas.openxmlformats.org/drawingml/2006/diagram">
+            <dgm:relIds xmlns:dgm="http://schemas.openxmlformats.org/drawingml/2006/diagram" xmlns:r="http://schemas.openxmlformats.org/officeDocument/2006/relationships" r:dm="rId3" r:lo="rId4" r:qs="rId5" r:cs="rId6"/>
+          </a:graphicData>
+        </a:graphic>
+      </p:graphicFrame>
+    </p:spTree>
+    <p:extLst>
+      <p:ext uri="{BB962C8B-B14F-4D97-AF65-F5344CB8AC3E}">
+        <p14:creationId xmlns:p14="http://schemas.microsoft.com/office/powerpoint/2010/main" val="1774402811"/>
       </p:ext>
     </p:extLst>
   </p:cSld>

</xml_diff>